<commit_message>
Improvements on "03.2. Conditional Statements - Advanced *" slides
</commit_message>
<xml_diff>
--- a/Courses/Software-Sciences/Module-1-OOP-New/03.2-Conditional-Statements-Advanced/03.2-Conditional-Statements-Advanced.pptx
+++ b/Courses/Software-Sciences/Module-1-OOP-New/03.2-Conditional-Statements-Advanced/03.2-Conditional-Statements-Advanced.pptx
@@ -270,7 +270,7 @@
             </a:lvl1pPr>
           </a:lstStyle>
           <a:p>
-            <a:endParaRPr lang="bg-BG"/>
+            <a:endParaRPr lang="bg-BG" dirty="0"/>
           </a:p>
         </p:txBody>
       </p:sp>
@@ -309,9 +309,9 @@
           <a:p>
             <a:fld id="{4E087215-0C8F-4762-A664-737A353EC9A4}" type="datetimeFigureOut">
               <a:rPr lang="bg-BG" smtClean="0"/>
-              <a:t>18.01.23 г.</a:t>
+              <a:t>2.02.23 г.</a:t>
             </a:fld>
-            <a:endParaRPr lang="bg-BG"/>
+            <a:endParaRPr lang="bg-BG" dirty="0"/>
           </a:p>
         </p:txBody>
       </p:sp>
@@ -467,7 +467,7 @@
             </a:lvl1pPr>
           </a:lstStyle>
           <a:p>
-            <a:endParaRPr lang="en-US"/>
+            <a:endParaRPr lang="en-US" dirty="0"/>
           </a:p>
         </p:txBody>
       </p:sp>
@@ -500,9 +500,9 @@
           <a:p>
             <a:fld id="{72D84649-876A-46C9-8472-14CB09C070D8}" type="datetimeFigureOut">
               <a:rPr lang="en-US" smtClean="0"/>
-              <a:t>1/18/23</a:t>
+              <a:t>2/2/23</a:t>
             </a:fld>
-            <a:endParaRPr lang="en-US"/>
+            <a:endParaRPr lang="en-US" dirty="0"/>
           </a:p>
         </p:txBody>
       </p:sp>
@@ -535,7 +535,7 @@
           <a:bodyPr vert="horz" lIns="91440" tIns="45720" rIns="91440" bIns="45720" rtlCol="0" anchor="ctr"/>
           <a:lstStyle/>
           <a:p>
-            <a:endParaRPr lang="en-US"/>
+            <a:endParaRPr lang="en-US" dirty="0"/>
           </a:p>
         </p:txBody>
       </p:sp>
@@ -1124,7 +1124,7 @@
           <a:p>
             <a:fld id="{2BF067CD-8E6B-4360-9AA8-C5DF2A48A6D1}" type="slidenum">
               <a:rPr lang="en-US" smtClean="0"/>
-              <a:t>28</a:t>
+              <a:t>9</a:t>
             </a:fld>
             <a:endParaRPr lang="en-US" dirty="0"/>
           </a:p>
@@ -1166,7 +1166,7 @@
     </p:spTree>
     <p:extLst>
       <p:ext uri="{BB962C8B-B14F-4D97-AF65-F5344CB8AC3E}">
-        <p14:creationId xmlns:p14="http://schemas.microsoft.com/office/powerpoint/2010/main" val="3678078821"/>
+        <p14:creationId xmlns:p14="http://schemas.microsoft.com/office/powerpoint/2010/main" val="4201259562"/>
       </p:ext>
     </p:extLst>
   </p:cSld>
@@ -1220,18 +1220,18 @@
           <a:bodyPr/>
           <a:lstStyle/>
           <a:p>
-            <a:endParaRPr lang="en-US"/>
+            <a:endParaRPr lang="en-BG" dirty="0"/>
           </a:p>
         </p:txBody>
       </p:sp>
       <p:sp>
         <p:nvSpPr>
-          <p:cNvPr id="5" name="Slide Number Placeholder 4"/>
+          <p:cNvPr id="4" name="Slide Number Placeholder 3"/>
           <p:cNvSpPr>
             <a:spLocks noGrp="1"/>
           </p:cNvSpPr>
           <p:nvPr>
-            <p:ph type="sldNum" sz="quarter" idx="11"/>
+            <p:ph type="sldNum" sz="quarter" idx="5"/>
           </p:nvPr>
         </p:nvSpPr>
         <p:spPr/>
@@ -1239,10 +1239,9 @@
           <a:bodyPr/>
           <a:lstStyle/>
           <a:p>
-            <a:fld id="{3EBA5BD7-F043-4D1B-AA17-CD412FC534DE}" type="slidenum">
+            <a:fld id="{2BF067CD-8E6B-4360-9AA8-C5DF2A48A6D1}" type="slidenum">
               <a:rPr lang="en-US" smtClean="0"/>
-              <a:pPr/>
-              <a:t>29</a:t>
+              <a:t>28</a:t>
             </a:fld>
             <a:endParaRPr lang="en-US" dirty="0"/>
           </a:p>
@@ -1250,13 +1249,7 @@
       </p:sp>
       <p:sp>
         <p:nvSpPr>
-          <p:cNvPr id="7" name="Footer Placeholder 7">
-            <a:extLst>
-              <a:ext uri="{FF2B5EF4-FFF2-40B4-BE49-F238E27FC236}">
-                <a16:creationId xmlns:a16="http://schemas.microsoft.com/office/drawing/2014/main" id="{BDC55C3C-DC72-46EC-BF3D-CC472E387871}"/>
-              </a:ext>
-            </a:extLst>
-          </p:cNvPr>
+          <p:cNvPr id="5" name="Footer Placeholder 4"/>
           <p:cNvSpPr>
             <a:spLocks noGrp="1"/>
           </p:cNvSpPr>
@@ -1264,22 +1257,10 @@
             <p:ph type="ftr" sz="quarter" idx="4"/>
           </p:nvPr>
         </p:nvSpPr>
-        <p:spPr>
-          <a:xfrm>
-            <a:off x="-1" y="8847000"/>
-            <a:ext cx="6488999" cy="297000"/>
-          </a:xfrm>
-          <a:prstGeom prst="rect">
-            <a:avLst/>
-          </a:prstGeom>
-        </p:spPr>
+        <p:spPr/>
         <p:txBody>
-          <a:bodyPr vert="horz" lIns="91440" tIns="45720" rIns="91440" bIns="45720" rtlCol="0" anchor="b"/>
-          <a:lstStyle>
-            <a:lvl1pPr algn="l">
-              <a:defRPr sz="1100"/>
-            </a:lvl1pPr>
-          </a:lstStyle>
+          <a:bodyPr/>
+          <a:lstStyle/>
           <a:p>
             <a:r>
               <a:rPr lang="en-US" dirty="0"/>
@@ -1301,7 +1282,7 @@
     </p:spTree>
     <p:extLst>
       <p:ext uri="{BB962C8B-B14F-4D97-AF65-F5344CB8AC3E}">
-        <p14:creationId xmlns:p14="http://schemas.microsoft.com/office/powerpoint/2010/main" val="3019087334"/>
+        <p14:creationId xmlns:p14="http://schemas.microsoft.com/office/powerpoint/2010/main" val="3678078821"/>
       </p:ext>
     </p:extLst>
   </p:cSld>
@@ -1355,7 +1336,142 @@
           <a:bodyPr/>
           <a:lstStyle/>
           <a:p>
-            <a:endParaRPr lang="en-US"/>
+            <a:endParaRPr lang="en-US" dirty="0"/>
+          </a:p>
+        </p:txBody>
+      </p:sp>
+      <p:sp>
+        <p:nvSpPr>
+          <p:cNvPr id="5" name="Slide Number Placeholder 4"/>
+          <p:cNvSpPr>
+            <a:spLocks noGrp="1"/>
+          </p:cNvSpPr>
+          <p:nvPr>
+            <p:ph type="sldNum" sz="quarter" idx="11"/>
+          </p:nvPr>
+        </p:nvSpPr>
+        <p:spPr/>
+        <p:txBody>
+          <a:bodyPr/>
+          <a:lstStyle/>
+          <a:p>
+            <a:fld id="{3EBA5BD7-F043-4D1B-AA17-CD412FC534DE}" type="slidenum">
+              <a:rPr lang="en-US" smtClean="0"/>
+              <a:pPr/>
+              <a:t>29</a:t>
+            </a:fld>
+            <a:endParaRPr lang="en-US" dirty="0"/>
+          </a:p>
+        </p:txBody>
+      </p:sp>
+      <p:sp>
+        <p:nvSpPr>
+          <p:cNvPr id="7" name="Footer Placeholder 7">
+            <a:extLst>
+              <a:ext uri="{FF2B5EF4-FFF2-40B4-BE49-F238E27FC236}">
+                <a16:creationId xmlns:a16="http://schemas.microsoft.com/office/drawing/2014/main" id="{BDC55C3C-DC72-46EC-BF3D-CC472E387871}"/>
+              </a:ext>
+            </a:extLst>
+          </p:cNvPr>
+          <p:cNvSpPr>
+            <a:spLocks noGrp="1"/>
+          </p:cNvSpPr>
+          <p:nvPr>
+            <p:ph type="ftr" sz="quarter" idx="4"/>
+          </p:nvPr>
+        </p:nvSpPr>
+        <p:spPr>
+          <a:xfrm>
+            <a:off x="-1" y="8847000"/>
+            <a:ext cx="6488999" cy="297000"/>
+          </a:xfrm>
+          <a:prstGeom prst="rect">
+            <a:avLst/>
+          </a:prstGeom>
+        </p:spPr>
+        <p:txBody>
+          <a:bodyPr vert="horz" lIns="91440" tIns="45720" rIns="91440" bIns="45720" rtlCol="0" anchor="b"/>
+          <a:lstStyle>
+            <a:lvl1pPr algn="l">
+              <a:defRPr sz="1100"/>
+            </a:lvl1pPr>
+          </a:lstStyle>
+          <a:p>
+            <a:r>
+              <a:rPr lang="en-US" dirty="0"/>
+              <a:t>© SoftUni – </a:t>
+            </a:r>
+            <a:r>
+              <a:rPr lang="en-US" u="sng" dirty="0">
+                <a:hlinkClick r:id="rId3"/>
+              </a:rPr>
+              <a:t>https://softuni.org</a:t>
+            </a:r>
+            <a:r>
+              <a:rPr lang="en-US" dirty="0"/>
+              <a:t>. Copyrighted document. Unauthorized copy or reproduction is not permitted.</a:t>
+            </a:r>
+          </a:p>
+        </p:txBody>
+      </p:sp>
+    </p:spTree>
+    <p:extLst>
+      <p:ext uri="{BB962C8B-B14F-4D97-AF65-F5344CB8AC3E}">
+        <p14:creationId xmlns:p14="http://schemas.microsoft.com/office/powerpoint/2010/main" val="3019087334"/>
+      </p:ext>
+    </p:extLst>
+  </p:cSld>
+  <p:clrMapOvr>
+    <a:masterClrMapping/>
+  </p:clrMapOvr>
+</p:notes>
+</file>
+
+<file path=ppt/notesSlides/notesSlide6.xml><?xml version="1.0" encoding="utf-8"?>
+<p:notes xmlns:a="http://schemas.openxmlformats.org/drawingml/2006/main" xmlns:r="http://schemas.openxmlformats.org/officeDocument/2006/relationships" xmlns:p="http://schemas.openxmlformats.org/presentationml/2006/main">
+  <p:cSld>
+    <p:spTree>
+      <p:nvGrpSpPr>
+        <p:cNvPr id="1" name=""/>
+        <p:cNvGrpSpPr/>
+        <p:nvPr/>
+      </p:nvGrpSpPr>
+      <p:grpSpPr>
+        <a:xfrm>
+          <a:off x="0" y="0"/>
+          <a:ext cx="0" cy="0"/>
+          <a:chOff x="0" y="0"/>
+          <a:chExt cx="0" cy="0"/>
+        </a:xfrm>
+      </p:grpSpPr>
+      <p:sp>
+        <p:nvSpPr>
+          <p:cNvPr id="2" name="Slide Image Placeholder 1"/>
+          <p:cNvSpPr>
+            <a:spLocks noGrp="1" noRot="1" noChangeAspect="1"/>
+          </p:cNvSpPr>
+          <p:nvPr>
+            <p:ph type="sldImg"/>
+          </p:nvPr>
+        </p:nvSpPr>
+        <p:spPr/>
+      </p:sp>
+      <p:sp>
+        <p:nvSpPr>
+          <p:cNvPr id="3" name="Notes Placeholder 2"/>
+          <p:cNvSpPr>
+            <a:spLocks noGrp="1"/>
+          </p:cNvSpPr>
+          <p:nvPr>
+            <p:ph type="body" idx="1"/>
+          </p:nvPr>
+        </p:nvSpPr>
+        <p:spPr/>
+        <p:txBody>
+          <a:bodyPr/>
+          <a:lstStyle/>
+          <a:p>
+            <a:endParaRPr lang="en-US" dirty="0"/>
           </a:p>
         </p:txBody>
       </p:sp>
@@ -1552,7 +1668,7 @@
 </p:notes>
 </file>
 
-<file path=ppt/notesSlides/notesSlide6.xml><?xml version="1.0" encoding="utf-8"?>
+<file path=ppt/notesSlides/notesSlide7.xml><?xml version="1.0" encoding="utf-8"?>
 <p:notes xmlns:a="http://schemas.openxmlformats.org/drawingml/2006/main" xmlns:r="http://schemas.openxmlformats.org/officeDocument/2006/relationships" xmlns:p="http://schemas.openxmlformats.org/presentationml/2006/main">
   <p:cSld>
     <p:spTree>
@@ -1596,7 +1712,7 @@
           <a:bodyPr/>
           <a:lstStyle/>
           <a:p>
-            <a:endParaRPr lang="en-US"/>
+            <a:endParaRPr lang="en-US" dirty="0"/>
           </a:p>
         </p:txBody>
       </p:sp>
@@ -1793,7 +1909,7 @@
 </p:notes>
 </file>
 
-<file path=ppt/notesSlides/notesSlide7.xml><?xml version="1.0" encoding="utf-8"?>
+<file path=ppt/notesSlides/notesSlide8.xml><?xml version="1.0" encoding="utf-8"?>
 <p:notes xmlns:a="http://schemas.openxmlformats.org/drawingml/2006/main" xmlns:r="http://schemas.openxmlformats.org/officeDocument/2006/relationships" xmlns:p="http://schemas.openxmlformats.org/presentationml/2006/main">
   <p:cSld>
     <p:spTree>
@@ -1837,7 +1953,7 @@
           <a:bodyPr/>
           <a:lstStyle/>
           <a:p>
-            <a:endParaRPr lang="en-US"/>
+            <a:endParaRPr lang="en-US" dirty="0"/>
           </a:p>
         </p:txBody>
       </p:sp>
@@ -2115,7 +2231,7 @@
               <a:tabLst/>
               <a:defRPr/>
             </a:pPr>
-            <a:endParaRPr kumimoji="0" lang="en-US" altLang="ko-KR" sz="2398" b="0" i="0" u="none" strike="noStrike" kern="1200" cap="none" spc="0" normalizeH="0" baseline="0" noProof="0">
+            <a:endParaRPr kumimoji="0" lang="en-US" altLang="ko-KR" sz="2398" b="0" i="0" u="none" strike="noStrike" kern="1200" cap="none" spc="0" normalizeH="0" baseline="0" noProof="0" dirty="0">
               <a:ln>
                 <a:noFill/>
               </a:ln>
@@ -2744,7 +2860,7 @@
               <a:tabLst/>
               <a:defRPr/>
             </a:pPr>
-            <a:endParaRPr kumimoji="0" lang="en-US" altLang="ko-KR" sz="2398" b="0" i="0" u="none" strike="noStrike" kern="1200" cap="none" spc="0" normalizeH="0" baseline="0" noProof="0">
+            <a:endParaRPr kumimoji="0" lang="en-US" altLang="ko-KR" sz="2398" b="0" i="0" u="none" strike="noStrike" kern="1200" cap="none" spc="0" normalizeH="0" baseline="0" noProof="0" dirty="0">
               <a:ln>
                 <a:noFill/>
               </a:ln>
@@ -2867,7 +2983,7 @@
               <a:tabLst/>
               <a:defRPr/>
             </a:pPr>
-            <a:endParaRPr kumimoji="0" lang="en-US" altLang="ko-KR" sz="2398" b="0" i="0" u="none" strike="noStrike" kern="1200" cap="none" spc="0" normalizeH="0" baseline="0" noProof="0">
+            <a:endParaRPr kumimoji="0" lang="en-US" altLang="ko-KR" sz="2398" b="0" i="0" u="none" strike="noStrike" kern="1200" cap="none" spc="0" normalizeH="0" baseline="0" noProof="0" dirty="0">
               <a:ln>
                 <a:noFill/>
               </a:ln>
@@ -3140,7 +3256,7 @@
               <a:tabLst/>
               <a:defRPr/>
             </a:pPr>
-            <a:endParaRPr kumimoji="0" lang="en-US" altLang="ko-KR" sz="2398" b="0" i="0" u="none" strike="noStrike" kern="1200" cap="none" spc="0" normalizeH="0" baseline="0" noProof="0">
+            <a:endParaRPr kumimoji="0" lang="en-US" altLang="ko-KR" sz="2398" b="0" i="0" u="none" strike="noStrike" kern="1200" cap="none" spc="0" normalizeH="0" baseline="0" noProof="0" dirty="0">
               <a:ln>
                 <a:noFill/>
               </a:ln>
@@ -3326,7 +3442,7 @@
               <a:pPr/>
               <a:t>‹#›</a:t>
             </a:fld>
-            <a:endParaRPr lang="en-US" noProof="0"/>
+            <a:endParaRPr lang="en-US" noProof="0" dirty="0"/>
           </a:p>
         </p:txBody>
       </p:sp>
@@ -3480,7 +3596,7 @@
           </a:lstStyle>
           <a:p>
             <a:r>
-              <a:rPr lang="en-US" altLang="ko-KR" noProof="0"/>
+              <a:rPr lang="en-US" altLang="ko-KR" noProof="0" dirty="0"/>
               <a:t>Your Picture Here</a:t>
             </a:r>
           </a:p>
@@ -3544,7 +3660,7 @@
               <a:tabLst/>
               <a:defRPr/>
             </a:pPr>
-            <a:endParaRPr kumimoji="0" lang="en-US" altLang="ko-KR" sz="2398" b="0" i="0" u="none" strike="noStrike" kern="1200" cap="none" spc="0" normalizeH="0" baseline="0" noProof="0">
+            <a:endParaRPr kumimoji="0" lang="en-US" altLang="ko-KR" sz="2398" b="0" i="0" u="none" strike="noStrike" kern="1200" cap="none" spc="0" normalizeH="0" baseline="0" noProof="0" dirty="0">
               <a:ln>
                 <a:noFill/>
               </a:ln>
@@ -3619,7 +3735,7 @@
               <a:tabLst/>
               <a:defRPr/>
             </a:pPr>
-            <a:endParaRPr kumimoji="0" lang="en-US" altLang="ko-KR" sz="2398" b="0" i="0" u="none" strike="noStrike" kern="1200" cap="none" spc="0" normalizeH="0" baseline="0" noProof="0">
+            <a:endParaRPr kumimoji="0" lang="en-US" altLang="ko-KR" sz="2398" b="0" i="0" u="none" strike="noStrike" kern="1200" cap="none" spc="0" normalizeH="0" baseline="0" noProof="0" dirty="0">
               <a:ln>
                 <a:noFill/>
               </a:ln>
@@ -3700,7 +3816,7 @@
               <a:tabLst/>
               <a:defRPr/>
             </a:pPr>
-            <a:endParaRPr kumimoji="0" lang="en-US" altLang="ko-KR" sz="2398" b="0" i="0" u="none" strike="noStrike" kern="1200" cap="none" spc="0" normalizeH="0" baseline="0" noProof="0">
+            <a:endParaRPr kumimoji="0" lang="en-US" altLang="ko-KR" sz="2398" b="0" i="0" u="none" strike="noStrike" kern="1200" cap="none" spc="0" normalizeH="0" baseline="0" noProof="0" dirty="0">
               <a:ln>
                 <a:noFill/>
               </a:ln>
@@ -3781,7 +3897,7 @@
               <a:tabLst/>
               <a:defRPr/>
             </a:pPr>
-            <a:endParaRPr kumimoji="0" lang="en-US" altLang="ko-KR" sz="2398" b="0" i="0" u="none" strike="noStrike" kern="1200" cap="none" spc="0" normalizeH="0" baseline="0" noProof="0">
+            <a:endParaRPr kumimoji="0" lang="en-US" altLang="ko-KR" sz="2398" b="0" i="0" u="none" strike="noStrike" kern="1200" cap="none" spc="0" normalizeH="0" baseline="0" noProof="0" dirty="0">
               <a:ln>
                 <a:noFill/>
               </a:ln>
@@ -3985,7 +4101,7 @@
               <a:tabLst/>
               <a:defRPr/>
             </a:pPr>
-            <a:endParaRPr kumimoji="0" lang="en-US" altLang="ko-KR" sz="2398" b="0" i="0" u="none" strike="noStrike" kern="1200" cap="none" spc="0" normalizeH="0" baseline="0" noProof="0">
+            <a:endParaRPr kumimoji="0" lang="en-US" altLang="ko-KR" sz="2398" b="0" i="0" u="none" strike="noStrike" kern="1200" cap="none" spc="0" normalizeH="0" baseline="0" noProof="0" dirty="0">
               <a:ln>
                 <a:noFill/>
               </a:ln>
@@ -5491,7 +5607,7 @@
               <a:tabLst/>
               <a:defRPr/>
             </a:pPr>
-            <a:endParaRPr kumimoji="0" lang="en-US" altLang="ko-KR" sz="2398" b="0" i="0" u="none" strike="noStrike" kern="1200" cap="none" spc="0" normalizeH="0" baseline="0" noProof="0">
+            <a:endParaRPr kumimoji="0" lang="en-US" altLang="ko-KR" sz="2398" b="0" i="0" u="none" strike="noStrike" kern="1200" cap="none" spc="0" normalizeH="0" baseline="0" noProof="0" dirty="0">
               <a:ln>
                 <a:noFill/>
               </a:ln>
@@ -5819,7 +5935,7 @@
               <a:tabLst/>
               <a:defRPr/>
             </a:pPr>
-            <a:endParaRPr kumimoji="0" lang="en-US" altLang="ko-KR" sz="2398" b="0" i="0" u="none" strike="noStrike" kern="1200" cap="none" spc="0" normalizeH="0" baseline="0" noProof="0">
+            <a:endParaRPr kumimoji="0" lang="en-US" altLang="ko-KR" sz="2398" b="0" i="0" u="none" strike="noStrike" kern="1200" cap="none" spc="0" normalizeH="0" baseline="0" noProof="0" dirty="0">
               <a:ln>
                 <a:noFill/>
               </a:ln>
@@ -5989,7 +6105,7 @@
               <a:pPr/>
               <a:t>‹#›</a:t>
             </a:fld>
-            <a:endParaRPr lang="en-US" noProof="0"/>
+            <a:endParaRPr lang="en-US" noProof="0" dirty="0"/>
           </a:p>
         </p:txBody>
       </p:sp>
@@ -6184,7 +6300,7 @@
               <a:tabLst/>
               <a:defRPr/>
             </a:pPr>
-            <a:endParaRPr kumimoji="0" lang="en-US" altLang="ko-KR" sz="2398" b="0" i="0" u="none" strike="noStrike" kern="1200" cap="none" spc="0" normalizeH="0" baseline="0" noProof="0">
+            <a:endParaRPr kumimoji="0" lang="en-US" altLang="ko-KR" sz="2398" b="0" i="0" u="none" strike="noStrike" kern="1200" cap="none" spc="0" normalizeH="0" baseline="0" noProof="0" dirty="0">
               <a:ln>
                 <a:noFill/>
               </a:ln>
@@ -7445,7 +7561,7 @@
               <a:pPr/>
               <a:t>‹#›</a:t>
             </a:fld>
-            <a:endParaRPr lang="en-US" noProof="0"/>
+            <a:endParaRPr lang="en-US" noProof="0" dirty="0"/>
           </a:p>
         </p:txBody>
       </p:sp>
@@ -7513,7 +7629,7 @@
               <a:tabLst/>
               <a:defRPr/>
             </a:pPr>
-            <a:endParaRPr kumimoji="0" lang="en-US" altLang="ko-KR" sz="2398" b="0" i="0" u="none" strike="noStrike" kern="1200" cap="none" spc="0" normalizeH="0" baseline="0" noProof="0">
+            <a:endParaRPr kumimoji="0" lang="en-US" altLang="ko-KR" sz="2398" b="0" i="0" u="none" strike="noStrike" kern="1200" cap="none" spc="0" normalizeH="0" baseline="0" noProof="0" dirty="0">
               <a:ln>
                 <a:noFill/>
               </a:ln>
@@ -7881,7 +7997,7 @@
               <a:tabLst/>
               <a:defRPr/>
             </a:pPr>
-            <a:endParaRPr kumimoji="0" lang="en-US" altLang="ko-KR" sz="2398" b="0" i="0" u="none" strike="noStrike" kern="1200" cap="none" spc="0" normalizeH="0" baseline="0" noProof="0">
+            <a:endParaRPr kumimoji="0" lang="en-US" altLang="ko-KR" sz="2398" b="0" i="0" u="none" strike="noStrike" kern="1200" cap="none" spc="0" normalizeH="0" baseline="0" noProof="0" dirty="0">
               <a:ln>
                 <a:noFill/>
               </a:ln>
@@ -8614,7 +8730,7 @@
           <a:lstStyle/>
           <a:p>
             <a:r>
-              <a:rPr lang="en-GB">
+              <a:rPr lang="en-GB" dirty="0">
                 <a:hlinkClick r:id="rId3"/>
               </a:rPr>
               <a:t>https://softuni.bg</a:t>
@@ -8883,15 +8999,7 @@
           <a:p>
             <a:r>
               <a:rPr lang="bg-BG" dirty="0"/>
-              <a:t>Квартално магазинче</a:t>
-            </a:r>
-            <a:r>
-              <a:rPr lang="en-US" dirty="0"/>
-              <a:t> – </a:t>
-            </a:r>
-            <a:r>
-              <a:rPr lang="bg-BG" dirty="0"/>
-              <a:t>условие (1)</a:t>
+              <a:t>Задача: Квартално магазинче (1)</a:t>
             </a:r>
             <a:endParaRPr lang="en-US" dirty="0"/>
           </a:p>
@@ -8906,13 +9014,13 @@
           <p:nvPr>
             <p:extLst>
               <p:ext uri="{D42A27DB-BD31-4B8C-83A1-F6EECF244321}">
-                <p14:modId xmlns:p14="http://schemas.microsoft.com/office/powerpoint/2010/main" val="4153833789"/>
+                <p14:modId xmlns:p14="http://schemas.microsoft.com/office/powerpoint/2010/main" val="4090551090"/>
               </p:ext>
             </p:extLst>
           </p:nvPr>
         </p:nvGraphicFramePr>
         <p:xfrm>
-          <a:off x="1551892" y="4368261"/>
+          <a:off x="1551890" y="4598901"/>
           <a:ext cx="9088219" cy="1921402"/>
         </p:xfrm>
         <a:graphic>
@@ -11314,6 +11422,104 @@
                                         <p:tgtEl>
                                           <p:spTgt spid="3">
                                             <p:txEl>
+                                              <p:pRg st="2" end="2"/>
+                                            </p:txEl>
+                                          </p:spTgt>
+                                        </p:tgtEl>
+                                        <p:attrNameLst>
+                                          <p:attrName>style.visibility</p:attrName>
+                                        </p:attrNameLst>
+                                      </p:cBhvr>
+                                      <p:to>
+                                        <p:strVal val="visible"/>
+                                      </p:to>
+                                    </p:set>
+                                  </p:childTnLst>
+                                </p:cTn>
+                              </p:par>
+                            </p:childTnLst>
+                          </p:cTn>
+                        </p:par>
+                      </p:childTnLst>
+                    </p:cTn>
+                  </p:par>
+                  <p:par>
+                    <p:cTn id="7" fill="hold">
+                      <p:stCondLst>
+                        <p:cond delay="indefinite"/>
+                      </p:stCondLst>
+                      <p:childTnLst>
+                        <p:par>
+                          <p:cTn id="8" fill="hold">
+                            <p:stCondLst>
+                              <p:cond delay="0"/>
+                            </p:stCondLst>
+                            <p:childTnLst>
+                              <p:par>
+                                <p:cTn id="9" presetID="1" presetClass="entr" presetSubtype="0" fill="hold" nodeType="clickEffect">
+                                  <p:stCondLst>
+                                    <p:cond delay="0"/>
+                                  </p:stCondLst>
+                                  <p:childTnLst>
+                                    <p:set>
+                                      <p:cBhvr>
+                                        <p:cTn id="10" dur="1" fill="hold">
+                                          <p:stCondLst>
+                                            <p:cond delay="0"/>
+                                          </p:stCondLst>
+                                        </p:cTn>
+                                        <p:tgtEl>
+                                          <p:spTgt spid="3">
+                                            <p:txEl>
+                                              <p:pRg st="3" end="3"/>
+                                            </p:txEl>
+                                          </p:spTgt>
+                                        </p:tgtEl>
+                                        <p:attrNameLst>
+                                          <p:attrName>style.visibility</p:attrName>
+                                        </p:attrNameLst>
+                                      </p:cBhvr>
+                                      <p:to>
+                                        <p:strVal val="visible"/>
+                                      </p:to>
+                                    </p:set>
+                                  </p:childTnLst>
+                                </p:cTn>
+                              </p:par>
+                            </p:childTnLst>
+                          </p:cTn>
+                        </p:par>
+                      </p:childTnLst>
+                    </p:cTn>
+                  </p:par>
+                  <p:par>
+                    <p:cTn id="11" fill="hold">
+                      <p:stCondLst>
+                        <p:cond delay="indefinite"/>
+                      </p:stCondLst>
+                      <p:childTnLst>
+                        <p:par>
+                          <p:cTn id="12" fill="hold">
+                            <p:stCondLst>
+                              <p:cond delay="0"/>
+                            </p:stCondLst>
+                            <p:childTnLst>
+                              <p:par>
+                                <p:cTn id="13" presetID="1" presetClass="entr" presetSubtype="0" fill="hold" nodeType="clickEffect">
+                                  <p:stCondLst>
+                                    <p:cond delay="0"/>
+                                  </p:stCondLst>
+                                  <p:childTnLst>
+                                    <p:set>
+                                      <p:cBhvr>
+                                        <p:cTn id="14" dur="1" fill="hold">
+                                          <p:stCondLst>
+                                            <p:cond delay="0"/>
+                                          </p:stCondLst>
+                                        </p:cTn>
+                                        <p:tgtEl>
+                                          <p:spTgt spid="3">
+                                            <p:txEl>
                                               <p:pRg st="4" end="4"/>
                                             </p:txEl>
                                           </p:spTgt>
@@ -11330,14 +11536,14 @@
                                 </p:cTn>
                               </p:par>
                               <p:par>
-                                <p:cTn id="7" presetID="1" presetClass="entr" presetSubtype="0" fill="hold" nodeType="withEffect">
+                                <p:cTn id="15" presetID="1" presetClass="entr" presetSubtype="0" fill="hold" nodeType="withEffect">
                                   <p:stCondLst>
                                     <p:cond delay="0"/>
                                   </p:stCondLst>
                                   <p:childTnLst>
                                     <p:set>
                                       <p:cBhvr>
-                                        <p:cTn id="8" dur="1" fill="hold">
+                                        <p:cTn id="16" dur="1" fill="hold">
                                           <p:stCondLst>
                                             <p:cond delay="0"/>
                                           </p:stCondLst>
@@ -11660,7 +11866,7 @@
             <a:lstStyle/>
             <a:p>
               <a:pPr algn="ctr"/>
-              <a:endParaRPr lang="en-US" sz="2799"/>
+              <a:endParaRPr lang="en-US" sz="2799" dirty="0"/>
             </a:p>
           </p:txBody>
         </p:sp>
@@ -12045,7 +12251,7 @@
           <a:lstStyle/>
           <a:p>
             <a:pPr algn="ctr"/>
-            <a:endParaRPr lang="en-US" sz="2799"/>
+            <a:endParaRPr lang="en-US" sz="2799" dirty="0"/>
           </a:p>
         </p:txBody>
       </p:sp>
@@ -13380,10 +13586,9 @@
                 <a:buSzPct val="70000"/>
               </a:pPr>
               <a:r>
-                <a:rPr lang="en-US" sz="2400"/>
+                <a:rPr lang="en-US" sz="2400" dirty="0"/>
                 <a:t>true</a:t>
               </a:r>
-              <a:endParaRPr lang="en-US" sz="2400" dirty="0"/>
             </a:p>
           </p:txBody>
         </p:sp>
@@ -14124,8 +14329,8 @@
           <a:lstStyle/>
           <a:p>
             <a:r>
-              <a:rPr lang="bg-BG" sz="3599"/>
-              <a:t>Квартално магазинче – решение</a:t>
+              <a:rPr lang="bg-BG" sz="3599" dirty="0"/>
+              <a:t>Решение: Квартално магазинче</a:t>
             </a:r>
             <a:endParaRPr lang="en-US" sz="3799" dirty="0"/>
           </a:p>
@@ -14659,14 +14864,17 @@
               <a:t>Judge: </a:t>
             </a:r>
             <a:r>
-              <a:rPr lang="en-US" sz="1999" dirty="0">
+              <a:rPr lang="en-US" sz="1999" u="sng" dirty="0">
+                <a:solidFill>
+                  <a:schemeClr val="bg1"/>
+                </a:solidFill>
                 <a:hlinkClick r:id="rId2"/>
               </a:rPr>
-              <a:t>https://judge.softuni.bg/Contests/Practice/Index/3155#10</a:t>
-            </a:r>
-            <a:endParaRPr lang="en-US" sz="1999" dirty="0">
+              <a:t>https://judge.softuni.org/Contests/Practice/Index/3896#2</a:t>
+            </a:r>
+            <a:endParaRPr lang="en-US" sz="1999" u="sng" dirty="0">
               <a:solidFill>
-                <a:prstClr val="white"/>
+                <a:schemeClr val="bg1"/>
               </a:solidFill>
             </a:endParaRPr>
           </a:p>
@@ -15233,10 +15441,10 @@
           <a:lstStyle/>
           <a:p>
             <a:r>
-              <a:rPr lang="bg-BG"/>
+              <a:rPr lang="bg-BG" dirty="0"/>
               <a:t>Логически оператори</a:t>
             </a:r>
-            <a:endParaRPr lang="en-GB"/>
+            <a:endParaRPr lang="en-GB" dirty="0"/>
           </a:p>
         </p:txBody>
       </p:sp>
@@ -18340,8 +18548,8 @@
           <a:lstStyle/>
           <a:p>
             <a:r>
-              <a:rPr lang="bg-BG"/>
-              <a:t>Число в интервала – условие</a:t>
+              <a:rPr lang="bg-BG" dirty="0"/>
+              <a:t>Задача: Число в интервала</a:t>
             </a:r>
             <a:endParaRPr lang="en-US" dirty="0"/>
           </a:p>
@@ -18361,7 +18569,7 @@
         </p:nvGrpSpPr>
         <p:grpSpPr>
           <a:xfrm>
-            <a:off x="1210232" y="5157192"/>
+            <a:off x="1551000" y="5675345"/>
             <a:ext cx="2202255" cy="553998"/>
             <a:chOff x="650909" y="5821489"/>
             <a:chExt cx="2202255" cy="553998"/>
@@ -18543,7 +18751,7 @@
             <a:lstStyle/>
             <a:p>
               <a:pPr algn="ctr"/>
-              <a:endParaRPr lang="en-US" sz="2800"/>
+              <a:endParaRPr lang="en-US" sz="2800" dirty="0"/>
             </a:p>
           </p:txBody>
         </p:sp>
@@ -18562,7 +18770,7 @@
         </p:nvGrpSpPr>
         <p:grpSpPr>
           <a:xfrm>
-            <a:off x="5768034" y="5157192"/>
+            <a:off x="8211000" y="5674475"/>
             <a:ext cx="2128166" cy="553998"/>
             <a:chOff x="8902663" y="5766487"/>
             <a:chExt cx="2128166" cy="553998"/>
@@ -18740,7 +18948,7 @@
             <a:lstStyle/>
             <a:p>
               <a:pPr algn="ctr"/>
-              <a:endParaRPr lang="en-US" sz="2800"/>
+              <a:endParaRPr lang="en-US" sz="2800" dirty="0"/>
             </a:p>
           </p:txBody>
         </p:sp>
@@ -18759,7 +18967,7 @@
         </p:nvGrpSpPr>
         <p:grpSpPr>
           <a:xfrm>
-            <a:off x="3881607" y="5157192"/>
+            <a:off x="5188211" y="5674475"/>
             <a:ext cx="1587833" cy="553998"/>
             <a:chOff x="5037444" y="5798858"/>
             <a:chExt cx="1587833" cy="553998"/>
@@ -18937,7 +19145,7 @@
             <a:lstStyle/>
             <a:p>
               <a:pPr algn="ctr"/>
-              <a:endParaRPr lang="en-US" sz="2800"/>
+              <a:endParaRPr lang="en-US" sz="2800" dirty="0"/>
             </a:p>
           </p:txBody>
         </p:sp>
@@ -19283,8 +19491,8 @@
           <a:lstStyle/>
           <a:p>
             <a:r>
-              <a:rPr lang="bg-BG"/>
-              <a:t>Число в интервала – решение</a:t>
+              <a:rPr lang="bg-BG" dirty="0"/>
+              <a:t>Решение: Число в интервала</a:t>
             </a:r>
             <a:endParaRPr lang="en-US" dirty="0"/>
           </a:p>
@@ -19780,14 +19988,17 @@
               <a:t>Judge: </a:t>
             </a:r>
             <a:r>
-              <a:rPr lang="en-US" sz="1999" dirty="0">
+              <a:rPr lang="en-US" sz="1999" u="sng" dirty="0">
+                <a:solidFill>
+                  <a:schemeClr val="bg1"/>
+                </a:solidFill>
                 <a:hlinkClick r:id="rId2"/>
               </a:rPr>
-              <a:t>https://judge.softuni.bg/Contests/Practice/Index/3155#11</a:t>
-            </a:r>
-            <a:endParaRPr lang="en-US" sz="1999" dirty="0">
+              <a:t>https://judge.softuni.org/Contests/Practice/Index/3896#3</a:t>
+            </a:r>
+            <a:endParaRPr lang="en-US" sz="1999" u="sng" dirty="0">
               <a:solidFill>
-                <a:prstClr val="white"/>
+                <a:schemeClr val="bg1"/>
               </a:solidFill>
             </a:endParaRPr>
           </a:p>
@@ -22119,8 +22330,8 @@
           <a:lstStyle/>
           <a:p>
             <a:r>
-              <a:rPr lang="bg-BG"/>
-              <a:t>Билет за кино – условие</a:t>
+              <a:rPr lang="bg-BG" dirty="0"/>
+              <a:t>Задача: Билет за кино</a:t>
             </a:r>
             <a:endParaRPr lang="en-US" dirty="0"/>
           </a:p>
@@ -22140,7 +22351,7 @@
         </p:nvGrpSpPr>
         <p:grpSpPr>
           <a:xfrm>
-            <a:off x="1160585" y="5352581"/>
+            <a:off x="1146000" y="5589000"/>
             <a:ext cx="3201731" cy="531804"/>
             <a:chOff x="872716" y="5980680"/>
             <a:chExt cx="1957226" cy="367750"/>
@@ -22313,7 +22524,7 @@
               <a:pPr algn="ctr" defTabSz="914126">
                 <a:defRPr/>
               </a:pPr>
-              <a:endParaRPr lang="en-US" sz="2799">
+              <a:endParaRPr lang="en-US" sz="2799" dirty="0">
                 <a:solidFill>
                   <a:srgbClr val="FFA000"/>
                 </a:solidFill>
@@ -22337,7 +22548,7 @@
         </p:nvGrpSpPr>
         <p:grpSpPr>
           <a:xfrm>
-            <a:off x="6438527" y="5395670"/>
+            <a:off x="6423942" y="5632089"/>
             <a:ext cx="3204615" cy="531249"/>
             <a:chOff x="872716" y="5964782"/>
             <a:chExt cx="1958989" cy="367365"/>
@@ -22528,7 +22739,7 @@
               <a:pPr algn="ctr" defTabSz="914126">
                 <a:defRPr/>
               </a:pPr>
-              <a:endParaRPr lang="en-US" sz="2799">
+              <a:endParaRPr lang="en-US" sz="2799" dirty="0">
                 <a:solidFill>
                   <a:srgbClr val="FFA000"/>
                 </a:solidFill>
@@ -24205,8 +24416,8 @@
           <a:lstStyle/>
           <a:p>
             <a:r>
-              <a:rPr lang="bg-BG"/>
-              <a:t>Билет за кино – решение</a:t>
+              <a:rPr lang="bg-BG" dirty="0"/>
+              <a:t>Решение: Билет за кино</a:t>
             </a:r>
             <a:endParaRPr lang="en-US" dirty="0"/>
           </a:p>
@@ -24582,7 +24793,7 @@
         </p:nvSpPr>
         <p:spPr>
           <a:xfrm>
-            <a:off x="346649" y="6313139"/>
+            <a:off x="346647" y="6306997"/>
             <a:ext cx="11498705" cy="400006"/>
           </a:xfrm>
           <a:prstGeom prst="rect">
@@ -24711,14 +24922,17 @@
               <a:t>Judge: </a:t>
             </a:r>
             <a:r>
-              <a:rPr lang="en-US" sz="1999" dirty="0">
+              <a:rPr lang="en-US" sz="1999" u="sng" dirty="0">
+                <a:solidFill>
+                  <a:schemeClr val="bg1"/>
+                </a:solidFill>
                 <a:hlinkClick r:id="rId2"/>
               </a:rPr>
-              <a:t>https://judge.softuni.bg/Contests/Practice/Index/3155#13</a:t>
-            </a:r>
-            <a:endParaRPr lang="en-US" sz="1999" dirty="0">
+              <a:t>https://judge.softuni.org/Contests/Practice/Index/3896#4</a:t>
+            </a:r>
+            <a:endParaRPr lang="en-US" sz="1999" u="sng" dirty="0">
               <a:solidFill>
-                <a:prstClr val="white"/>
+                <a:schemeClr val="bg1"/>
               </a:solidFill>
             </a:endParaRPr>
           </a:p>
@@ -25922,10 +26136,9 @@
           <a:lstStyle/>
           <a:p>
             <a:r>
-              <a:rPr lang="bg-BG"/>
-              <a:t>Невалидно число – условие</a:t>
-            </a:r>
-            <a:endParaRPr lang="bg-BG" dirty="0"/>
+              <a:rPr lang="bg-BG" dirty="0"/>
+              <a:t>Задача: Невалидно число</a:t>
+            </a:r>
           </a:p>
         </p:txBody>
       </p:sp>
@@ -25943,7 +26156,7 @@
         </p:nvGrpSpPr>
         <p:grpSpPr>
           <a:xfrm>
-            <a:off x="1657045" y="5408332"/>
+            <a:off x="1461000" y="5661293"/>
             <a:ext cx="3157956" cy="550008"/>
             <a:chOff x="1653861" y="4649433"/>
             <a:chExt cx="2119332" cy="571364"/>
@@ -26153,7 +26366,7 @@
         </p:nvGrpSpPr>
         <p:grpSpPr>
           <a:xfrm>
-            <a:off x="6663326" y="5408484"/>
+            <a:off x="6467281" y="5661445"/>
             <a:ext cx="4561343" cy="560070"/>
             <a:chOff x="1979933" y="5678345"/>
             <a:chExt cx="1719123" cy="560216"/>
@@ -26702,8 +26915,8 @@
           <a:lstStyle/>
           <a:p>
             <a:r>
-              <a:rPr lang="bg-BG"/>
-              <a:t>Невалидно число – решение</a:t>
+              <a:rPr lang="bg-BG" dirty="0"/>
+              <a:t>Решение: Невалидно число</a:t>
             </a:r>
             <a:endParaRPr lang="bg-BG" dirty="0">
               <a:latin typeface="Consolas" pitchFamily="49" charset="0"/>
@@ -26728,7 +26941,7 @@
         </p:nvSpPr>
         <p:spPr bwMode="auto">
           <a:xfrm>
-            <a:off x="1199754" y="1628796"/>
+            <a:off x="1199752" y="1899000"/>
             <a:ext cx="9792489" cy="3816429"/>
           </a:xfrm>
           <a:prstGeom prst="rect">
@@ -26862,7 +27075,7 @@
         </p:nvSpPr>
         <p:spPr>
           <a:xfrm>
-            <a:off x="346647" y="6165304"/>
+            <a:off x="346645" y="6306997"/>
             <a:ext cx="11498705" cy="400006"/>
           </a:xfrm>
           <a:prstGeom prst="rect">
@@ -26991,14 +27204,17 @@
               <a:t>Judge: </a:t>
             </a:r>
             <a:r>
-              <a:rPr lang="en-US" sz="1999" dirty="0">
+              <a:rPr lang="en-US" sz="1999" u="sng" dirty="0">
+                <a:solidFill>
+                  <a:schemeClr val="bg1"/>
+                </a:solidFill>
                 <a:hlinkClick r:id="rId2"/>
               </a:rPr>
-              <a:t>https://judge.softuni.bg/Contests/Practice/Index/3155#15</a:t>
-            </a:r>
-            <a:endParaRPr lang="en-US" sz="1999" dirty="0">
+              <a:t>https://judge.softuni.org/Contests/Practice/Index/3896#5</a:t>
+            </a:r>
+            <a:endParaRPr lang="en-US" sz="1999" u="sng" dirty="0">
               <a:solidFill>
-                <a:prstClr val="white"/>
+                <a:schemeClr val="bg1"/>
               </a:solidFill>
             </a:endParaRPr>
           </a:p>
@@ -28524,7 +28740,7 @@
             <a:lstStyle/>
             <a:p>
               <a:pPr algn="ctr"/>
-              <a:endParaRPr lang="ko-KR" altLang="en-US" sz="2398">
+              <a:endParaRPr lang="ko-KR" altLang="en-US" sz="2398" dirty="0">
                 <a:solidFill>
                   <a:schemeClr val="bg1"/>
                 </a:solidFill>
@@ -28585,7 +28801,7 @@
             <a:lstStyle/>
             <a:p>
               <a:pPr algn="ctr"/>
-              <a:endParaRPr lang="ko-KR" altLang="en-US" sz="2398">
+              <a:endParaRPr lang="ko-KR" altLang="en-US" sz="2398" dirty="0">
                 <a:solidFill>
                   <a:schemeClr val="tx1"/>
                 </a:solidFill>
@@ -30138,15 +30354,7 @@
             </a:pPr>
             <a:r>
               <a:rPr lang="en-GB" sz="2599" dirty="0"/>
-              <a:t>string </a:t>
-            </a:r>
-            <a:r>
-              <a:rPr lang="en-GB" sz="2599" dirty="0" err="1"/>
-              <a:t>currentDay</a:t>
-            </a:r>
-            <a:r>
-              <a:rPr lang="en-GB" sz="2599" dirty="0"/>
-              <a:t> = "Monday"; </a:t>
+              <a:t>string currentDay = "Monday"; </a:t>
             </a:r>
           </a:p>
           <a:p>
@@ -30164,15 +30372,7 @@
             </a:pPr>
             <a:r>
               <a:rPr lang="en-GB" sz="2599" dirty="0"/>
-              <a:t>if (</a:t>
-            </a:r>
-            <a:r>
-              <a:rPr lang="en-GB" sz="2599" dirty="0" err="1"/>
-              <a:t>currentDay</a:t>
-            </a:r>
-            <a:r>
-              <a:rPr lang="en-GB" sz="2599" dirty="0"/>
-              <a:t> == "Monday") </a:t>
+              <a:t>if (currentDay == "Monday") </a:t>
             </a:r>
           </a:p>
           <a:p>
@@ -30224,23 +30424,7 @@
             </a:r>
             <a:r>
               <a:rPr lang="en-GB" sz="2599" dirty="0"/>
-              <a:t> = </a:t>
-            </a:r>
-            <a:r>
-              <a:rPr lang="en-GB" sz="2599" dirty="0" err="1"/>
-              <a:t>double.Parse</a:t>
-            </a:r>
-            <a:r>
-              <a:rPr lang="en-GB" sz="2599" dirty="0"/>
-              <a:t>(</a:t>
-            </a:r>
-            <a:r>
-              <a:rPr lang="en-GB" sz="2599" dirty="0" err="1"/>
-              <a:t>Console.ReadLine</a:t>
-            </a:r>
-            <a:r>
-              <a:rPr lang="en-GB" sz="2599" dirty="0"/>
-              <a:t>());</a:t>
+              <a:t> = double.Parse(Console.ReadLine());</a:t>
             </a:r>
           </a:p>
           <a:p>
@@ -30279,12 +30463,8 @@
               <a:buSzPct val="70000"/>
             </a:pPr>
             <a:r>
-              <a:rPr lang="en-GB" sz="2599" dirty="0" err="1"/>
-              <a:t>Console.WriteLine</a:t>
-            </a:r>
-            <a:r>
               <a:rPr lang="en-GB" sz="2599" dirty="0"/>
-              <a:t>(</a:t>
+              <a:t>Console.WriteLine(</a:t>
             </a:r>
             <a:r>
               <a:rPr lang="en-GB" sz="2599" dirty="0">
@@ -30673,28 +30853,28 @@
           <a:p>
             <a:pPr marL="457063" indent="-457063"/>
             <a:r>
-              <a:rPr lang="en-US" sz="3599"/>
+              <a:rPr lang="bg-BG" sz="3599" dirty="0"/>
               <a:t>Обхват, в който може да бъде използвана</a:t>
             </a:r>
           </a:p>
           <a:p>
             <a:pPr marL="1370618" lvl="2" indent="-457063"/>
             <a:r>
-              <a:rPr lang="en-US" sz="3399"/>
+              <a:rPr lang="bg-BG" sz="3399" dirty="0"/>
               <a:t>Пример: Променливата </a:t>
             </a:r>
             <a:r>
-              <a:rPr lang="en-US" sz="3199" b="1">
+              <a:rPr lang="bg-BG" sz="3199" b="1" dirty="0">
                 <a:latin typeface="Consolas" panose="020B0609020204030204" pitchFamily="49" charset="0"/>
               </a:rPr>
               <a:t>salary</a:t>
             </a:r>
             <a:r>
-              <a:rPr lang="en-US" sz="3399"/>
+              <a:rPr lang="bg-BG" sz="3399" dirty="0"/>
               <a:t> съществува </a:t>
             </a:r>
             <a:r>
-              <a:rPr lang="en-US" sz="3399" b="1">
+              <a:rPr lang="bg-BG" sz="3399" b="1" dirty="0">
                 <a:solidFill>
                   <a:schemeClr val="bg1"/>
                 </a:solidFill>
@@ -30702,20 +30882,19 @@
               <a:t>само</a:t>
             </a:r>
             <a:r>
-              <a:rPr lang="en-US" sz="3399"/>
+              <a:rPr lang="bg-BG" sz="3399" dirty="0"/>
               <a:t> в блока от код на </a:t>
             </a:r>
             <a:r>
-              <a:rPr lang="en-US" sz="3199" b="1">
+              <a:rPr lang="bg-BG" sz="3199" b="1" dirty="0">
                 <a:latin typeface="Consolas" panose="020B0609020204030204" pitchFamily="49" charset="0"/>
               </a:rPr>
               <a:t>if</a:t>
             </a:r>
             <a:r>
-              <a:rPr lang="en-US" sz="3399"/>
+              <a:rPr lang="bg-BG" sz="3399" dirty="0"/>
               <a:t>-конструкцията</a:t>
             </a:r>
-            <a:endParaRPr lang="en-US" sz="3399" dirty="0"/>
           </a:p>
         </p:txBody>
       </p:sp>
@@ -30749,6 +30928,9 @@
                     <p:cTn id="3" fill="hold">
                       <p:stCondLst>
                         <p:cond delay="indefinite"/>
+                        <p:cond evt="onBegin" delay="0">
+                          <p:tn val="2"/>
+                        </p:cond>
                       </p:stCondLst>
                       <p:childTnLst>
                         <p:par>
@@ -30758,7 +30940,7 @@
                             </p:stCondLst>
                             <p:childTnLst>
                               <p:par>
-                                <p:cTn id="5" presetID="1" presetClass="entr" presetSubtype="0" fill="hold" grpId="0" nodeType="clickEffect">
+                                <p:cTn id="5" presetID="1" presetClass="entr" presetSubtype="0" fill="hold" grpId="0" nodeType="withEffect">
                                   <p:stCondLst>
                                     <p:cond delay="0"/>
                                   </p:stCondLst>
@@ -31135,10 +31317,10 @@
           <a:lstStyle/>
           <a:p>
             <a:r>
-              <a:rPr lang="bg-BG"/>
+              <a:rPr lang="bg-BG" dirty="0"/>
               <a:t>Вложени условни конструкции</a:t>
             </a:r>
-            <a:endParaRPr lang="en-GB"/>
+            <a:endParaRPr lang="en-GB" dirty="0"/>
           </a:p>
         </p:txBody>
       </p:sp>
@@ -31702,7 +31884,7 @@
           </a:lstStyle>
           <a:p>
             <a:pPr algn="ctr"/>
-            <a:endParaRPr lang="en-US" sz="2799">
+            <a:endParaRPr lang="en-US" sz="2799" dirty="0">
               <a:solidFill>
                 <a:schemeClr val="tx1"/>
               </a:solidFill>
@@ -31777,7 +31959,7 @@
           <a:p>
             <a:pPr algn="ctr"/>
             <a:r>
-              <a:rPr lang="bg-BG" sz="2800" b="1">
+              <a:rPr lang="bg-BG" sz="2800" b="1" dirty="0">
                 <a:solidFill>
                   <a:srgbClr val="FFFFFF"/>
                 </a:solidFill>
@@ -31785,7 +31967,7 @@
               <a:t>Вложена </a:t>
             </a:r>
             <a:r>
-              <a:rPr lang="en-US" sz="2800" b="1">
+              <a:rPr lang="en-US" sz="2800" b="1" dirty="0">
                 <a:solidFill>
                   <a:srgbClr val="FFFFFF"/>
                 </a:solidFill>
@@ -32268,21 +32450,13 @@
         </p:spPr>
         <p:txBody>
           <a:bodyPr>
-            <a:normAutofit fontScale="90000"/>
+            <a:normAutofit/>
           </a:bodyPr>
           <a:lstStyle/>
           <a:p>
             <a:r>
               <a:rPr lang="ru-RU" dirty="0"/>
-              <a:t>Обръщение според възраст и пол</a:t>
-            </a:r>
-            <a:r>
-              <a:rPr lang="en-US" dirty="0"/>
-              <a:t> – </a:t>
-            </a:r>
-            <a:r>
-              <a:rPr lang="bg-BG" dirty="0"/>
-              <a:t>условие</a:t>
+              <a:t>Задача: Обръщение според възраст и пол</a:t>
             </a:r>
             <a:endParaRPr lang="en-US" dirty="0"/>
           </a:p>
@@ -32302,7 +32476,7 @@
         </p:nvGrpSpPr>
         <p:grpSpPr>
           <a:xfrm>
-            <a:off x="558613" y="4598397"/>
+            <a:off x="971329" y="4782370"/>
             <a:ext cx="2589170" cy="891833"/>
             <a:chOff x="1684152" y="5496496"/>
             <a:chExt cx="2121547" cy="781674"/>
@@ -32486,7 +32660,7 @@
             <a:lstStyle/>
             <a:p>
               <a:pPr algn="ctr"/>
-              <a:endParaRPr lang="en-US" sz="2798"/>
+              <a:endParaRPr lang="en-US" sz="2798" dirty="0"/>
             </a:p>
           </p:txBody>
         </p:sp>
@@ -32505,7 +32679,7 @@
         </p:nvGrpSpPr>
         <p:grpSpPr>
           <a:xfrm>
-            <a:off x="3712242" y="4598397"/>
+            <a:off x="4124958" y="4782370"/>
             <a:ext cx="2361351" cy="891833"/>
             <a:chOff x="4307530" y="5496496"/>
             <a:chExt cx="1863082" cy="781674"/>
@@ -32689,7 +32863,7 @@
             <a:lstStyle/>
             <a:p>
               <a:pPr algn="ctr"/>
-              <a:endParaRPr lang="en-US" sz="2798"/>
+              <a:endParaRPr lang="en-US" sz="2798" dirty="0"/>
             </a:p>
           </p:txBody>
         </p:sp>
@@ -35156,8 +35330,8 @@
           <a:lstStyle/>
           <a:p>
             <a:r>
-              <a:rPr lang="ru-RU" sz="3599"/>
-              <a:t>Обръщение според възраст и пол – решение</a:t>
+              <a:rPr lang="ru-RU" sz="3599" dirty="0"/>
+              <a:t>Решение: Обръщение според възраст и пол</a:t>
             </a:r>
             <a:endParaRPr lang="en-US" sz="3799" dirty="0"/>
           </a:p>
@@ -35439,7 +35613,7 @@
         </p:nvSpPr>
         <p:spPr>
           <a:xfrm>
-            <a:off x="346649" y="6389270"/>
+            <a:off x="346647" y="6441744"/>
             <a:ext cx="11498705" cy="400006"/>
           </a:xfrm>
           <a:prstGeom prst="rect">
@@ -35568,14 +35742,23 @@
               <a:t>Judge: </a:t>
             </a:r>
             <a:r>
-              <a:rPr lang="en-US" sz="1999" dirty="0">
-                <a:hlinkClick r:id="rId2"/>
+              <a:rPr lang="en-US" sz="1999" u="sng" dirty="0">
+                <a:solidFill>
+                  <a:schemeClr val="bg1"/>
+                </a:solidFill>
+                <a:hlinkClick r:id="rId3">
+                  <a:extLst>
+                    <a:ext uri="{A12FA001-AC4F-418D-AE19-62706E023703}">
+                      <ahyp:hlinkClr xmlns:ahyp="http://schemas.microsoft.com/office/drawing/2018/hyperlinkcolor" val="tx"/>
+                    </a:ext>
+                  </a:extLst>
+                </a:hlinkClick>
               </a:rPr>
-              <a:t>https://judge.softuni.bg/Contests/Practice/Index/3155#9</a:t>
-            </a:r>
-            <a:endParaRPr lang="en-US" sz="1999" dirty="0">
+              <a:t>https://judge.softuni.org/Contests/Practice/Index/3896#1</a:t>
+            </a:r>
+            <a:endParaRPr lang="en-US" sz="1999" u="sng" dirty="0">
               <a:solidFill>
-                <a:prstClr val="white"/>
+                <a:schemeClr val="bg1"/>
               </a:solidFill>
             </a:endParaRPr>
           </a:p>

</xml_diff>

<commit_message>
Updated judge links for conditional statements advanced
</commit_message>
<xml_diff>
--- a/Courses/Software-Sciences/Module-1-OOP-New/03.2-Conditional-Statements-Advanced/03.2-Conditional-Statements-Advanced.pptx
+++ b/Courses/Software-Sciences/Module-1-OOP-New/03.2-Conditional-Statements-Advanced/03.2-Conditional-Statements-Advanced.pptx
@@ -5,10 +5,10 @@
     <p:sldMasterId id="2147483675" r:id="rId1"/>
   </p:sldMasterIdLst>
   <p:notesMasterIdLst>
-    <p:notesMasterId r:id="rId34"/>
+    <p:notesMasterId r:id="rId32"/>
   </p:notesMasterIdLst>
   <p:handoutMasterIdLst>
-    <p:handoutMasterId r:id="rId35"/>
+    <p:handoutMasterId r:id="rId33"/>
   </p:handoutMasterIdLst>
   <p:sldIdLst>
     <p:sldId id="274" r:id="rId2"/>
@@ -28,21 +28,19 @@
     <p:sldId id="635" r:id="rId16"/>
     <p:sldId id="636" r:id="rId17"/>
     <p:sldId id="637" r:id="rId18"/>
-    <p:sldId id="638" r:id="rId19"/>
-    <p:sldId id="639" r:id="rId20"/>
-    <p:sldId id="640" r:id="rId21"/>
-    <p:sldId id="641" r:id="rId22"/>
-    <p:sldId id="642" r:id="rId23"/>
-    <p:sldId id="643" r:id="rId24"/>
-    <p:sldId id="644" r:id="rId25"/>
-    <p:sldId id="645" r:id="rId26"/>
-    <p:sldId id="646" r:id="rId27"/>
-    <p:sldId id="648" r:id="rId28"/>
-    <p:sldId id="647" r:id="rId29"/>
-    <p:sldId id="577" r:id="rId30"/>
-    <p:sldId id="504" r:id="rId31"/>
-    <p:sldId id="505" r:id="rId32"/>
-    <p:sldId id="506" r:id="rId33"/>
+    <p:sldId id="640" r:id="rId19"/>
+    <p:sldId id="641" r:id="rId20"/>
+    <p:sldId id="642" r:id="rId21"/>
+    <p:sldId id="643" r:id="rId22"/>
+    <p:sldId id="644" r:id="rId23"/>
+    <p:sldId id="645" r:id="rId24"/>
+    <p:sldId id="646" r:id="rId25"/>
+    <p:sldId id="648" r:id="rId26"/>
+    <p:sldId id="647" r:id="rId27"/>
+    <p:sldId id="577" r:id="rId28"/>
+    <p:sldId id="504" r:id="rId29"/>
+    <p:sldId id="505" r:id="rId30"/>
+    <p:sldId id="506" r:id="rId31"/>
   </p:sldIdLst>
   <p:sldSz cx="12192000" cy="6858000"/>
   <p:notesSz cx="6858000" cy="9144000"/>
@@ -175,8 +173,6 @@
             <p14:sldId id="635"/>
             <p14:sldId id="636"/>
             <p14:sldId id="637"/>
-            <p14:sldId id="638"/>
-            <p14:sldId id="639"/>
             <p14:sldId id="640"/>
             <p14:sldId id="641"/>
             <p14:sldId id="642"/>
@@ -317,7 +313,7 @@
           <a:p>
             <a:fld id="{4E087215-0C8F-4762-A664-737A353EC9A4}" type="datetimeFigureOut">
               <a:rPr lang="bg-BG" smtClean="0"/>
-              <a:t>9.2.2023 г.</a:t>
+              <a:t>4.05.23 г.</a:t>
             </a:fld>
             <a:endParaRPr lang="bg-BG" dirty="0"/>
           </a:p>
@@ -508,7 +504,7 @@
           <a:p>
             <a:fld id="{72D84649-876A-46C9-8472-14CB09C070D8}" type="datetimeFigureOut">
               <a:rPr lang="en-US" smtClean="0"/>
-              <a:t>9-Feb-23</a:t>
+              <a:t>5/4/23</a:t>
             </a:fld>
             <a:endParaRPr lang="en-US" dirty="0"/>
           </a:p>
@@ -1249,7 +1245,7 @@
           <a:p>
             <a:fld id="{2BF067CD-8E6B-4360-9AA8-C5DF2A48A6D1}" type="slidenum">
               <a:rPr lang="en-US" smtClean="0"/>
-              <a:t>28</a:t>
+              <a:t>26</a:t>
             </a:fld>
             <a:endParaRPr lang="en-US" dirty="0"/>
           </a:p>
@@ -1366,7 +1362,7 @@
             <a:fld id="{3EBA5BD7-F043-4D1B-AA17-CD412FC534DE}" type="slidenum">
               <a:rPr lang="en-US" smtClean="0"/>
               <a:pPr/>
-              <a:t>29</a:t>
+              <a:t>27</a:t>
             </a:fld>
             <a:endParaRPr lang="en-US" dirty="0"/>
           </a:p>
@@ -1607,7 +1603,7 @@
             <a:fld id="{3EBA5BD7-F043-4D1B-AA17-CD412FC534DE}" type="slidenum">
               <a:rPr lang="en-US" smtClean="0"/>
               <a:pPr/>
-              <a:t>30</a:t>
+              <a:t>28</a:t>
             </a:fld>
             <a:endParaRPr lang="en-US" dirty="0"/>
           </a:p>
@@ -1848,7 +1844,7 @@
             <a:fld id="{3EBA5BD7-F043-4D1B-AA17-CD412FC534DE}" type="slidenum">
               <a:rPr lang="en-US" smtClean="0"/>
               <a:pPr/>
-              <a:t>31</a:t>
+              <a:t>29</a:t>
             </a:fld>
             <a:endParaRPr lang="en-US" dirty="0"/>
           </a:p>
@@ -2089,7 +2085,7 @@
             <a:fld id="{3EBA5BD7-F043-4D1B-AA17-CD412FC534DE}" type="slidenum">
               <a:rPr lang="en-US" smtClean="0"/>
               <a:pPr/>
-              <a:t>32</a:t>
+              <a:t>30</a:t>
             </a:fld>
             <a:endParaRPr lang="en-US" dirty="0"/>
           </a:p>
@@ -14878,7 +14874,7 @@
                 </a:solidFill>
                 <a:hlinkClick r:id="rId2"/>
               </a:rPr>
-              <a:t>https://judge.softuni.org/Contests/Practice/Index/3896#2</a:t>
+              <a:t>https://judge.softuni.org/Contests/Practice/Index/3896#4</a:t>
             </a:r>
             <a:endParaRPr lang="en-US" sz="1999" u="sng" dirty="0">
               <a:solidFill>
@@ -18408,2458 +18404,6 @@
             <p:ph type="body" sz="quarter" idx="10"/>
           </p:nvPr>
         </p:nvSpPr>
-        <p:spPr/>
-        <p:txBody>
-          <a:bodyPr>
-            <a:normAutofit/>
-          </a:bodyPr>
-          <a:lstStyle/>
-          <a:p>
-            <a:r>
-              <a:rPr lang="bg-BG" sz="3599" dirty="0"/>
-              <a:t>Напишете програма, която:</a:t>
-            </a:r>
-          </a:p>
-          <a:p>
-            <a:pPr lvl="1"/>
-            <a:r>
-              <a:rPr lang="bg-BG" sz="3199" dirty="0"/>
-              <a:t>Проверява дали въведеното число от потребителя е в </a:t>
-            </a:r>
-            <a:br>
-              <a:rPr lang="bg-BG" sz="3199" dirty="0"/>
-            </a:br>
-            <a:r>
-              <a:rPr lang="bg-BG" sz="3199" dirty="0"/>
-              <a:t>интервала </a:t>
-            </a:r>
-            <a:r>
-              <a:rPr lang="en-US" sz="3199" dirty="0"/>
-              <a:t>[</a:t>
-            </a:r>
-            <a:r>
-              <a:rPr lang="bg-BG" sz="3199" b="1" dirty="0">
-                <a:solidFill>
-                  <a:schemeClr val="bg1"/>
-                </a:solidFill>
-              </a:rPr>
-              <a:t>-100</a:t>
-            </a:r>
-            <a:r>
-              <a:rPr lang="en-US" sz="3199" dirty="0"/>
-              <a:t>,</a:t>
-            </a:r>
-            <a:r>
-              <a:rPr lang="bg-BG" sz="3199" dirty="0"/>
-              <a:t> </a:t>
-            </a:r>
-            <a:r>
-              <a:rPr lang="bg-BG" sz="3199" b="1" dirty="0">
-                <a:solidFill>
-                  <a:schemeClr val="bg1"/>
-                </a:solidFill>
-              </a:rPr>
-              <a:t>100</a:t>
-            </a:r>
-            <a:r>
-              <a:rPr lang="en-US" sz="3199" dirty="0"/>
-              <a:t>] </a:t>
-            </a:r>
-            <a:r>
-              <a:rPr lang="bg-BG" sz="3199" dirty="0"/>
-              <a:t>и е различно от </a:t>
-            </a:r>
-            <a:r>
-              <a:rPr lang="bg-BG" sz="3199" b="1" dirty="0">
-                <a:solidFill>
-                  <a:schemeClr val="bg1"/>
-                </a:solidFill>
-              </a:rPr>
-              <a:t>0</a:t>
-            </a:r>
-          </a:p>
-          <a:p>
-            <a:pPr lvl="1"/>
-            <a:r>
-              <a:rPr lang="bg-BG" sz="3199" dirty="0"/>
-              <a:t>Извежда </a:t>
-            </a:r>
-            <a:r>
-              <a:rPr lang="en-US" sz="3199" dirty="0"/>
-              <a:t>"</a:t>
-            </a:r>
-            <a:r>
-              <a:rPr lang="en-US" sz="3199" b="1" dirty="0">
-                <a:latin typeface="Consolas" panose="020B0609020204030204" pitchFamily="49" charset="0"/>
-              </a:rPr>
-              <a:t>Yes</a:t>
-            </a:r>
-            <a:r>
-              <a:rPr lang="en-US" sz="3199" dirty="0"/>
-              <a:t>"</a:t>
-            </a:r>
-            <a:r>
-              <a:rPr lang="bg-BG" sz="3199" dirty="0"/>
-              <a:t>,</a:t>
-            </a:r>
-            <a:r>
-              <a:rPr lang="en-US" sz="3199" dirty="0"/>
-              <a:t> </a:t>
-            </a:r>
-            <a:r>
-              <a:rPr lang="bg-BG" sz="3199" dirty="0"/>
-              <a:t>ако е в интервала и различно от 0, или </a:t>
-            </a:r>
-            <a:r>
-              <a:rPr lang="en-US" sz="3199" dirty="0"/>
-              <a:t>"</a:t>
-            </a:r>
-            <a:r>
-              <a:rPr lang="en-US" sz="3199" b="1" dirty="0">
-                <a:latin typeface="Consolas" panose="020B0609020204030204" pitchFamily="49" charset="0"/>
-              </a:rPr>
-              <a:t>No</a:t>
-            </a:r>
-            <a:r>
-              <a:rPr lang="en-US" sz="3199" dirty="0"/>
-              <a:t>" </a:t>
-            </a:r>
-            <a:br>
-              <a:rPr lang="bg-BG" sz="3199" dirty="0"/>
-            </a:br>
-            <a:r>
-              <a:rPr lang="bg-BG" sz="3199" dirty="0"/>
-              <a:t>ако е извън тях.</a:t>
-            </a:r>
-          </a:p>
-          <a:p>
-            <a:pPr>
-              <a:spcBef>
-                <a:spcPts val="1000"/>
-              </a:spcBef>
-            </a:pPr>
-            <a:r>
-              <a:rPr lang="bg-BG" sz="3599" dirty="0"/>
-              <a:t>Примерен вход и изход:</a:t>
-            </a:r>
-            <a:endParaRPr lang="en-US" sz="3199" dirty="0"/>
-          </a:p>
-        </p:txBody>
-      </p:sp>
-      <p:sp>
-        <p:nvSpPr>
-          <p:cNvPr id="4" name="Title 3"/>
-          <p:cNvSpPr>
-            <a:spLocks noGrp="1"/>
-          </p:cNvSpPr>
-          <p:nvPr>
-            <p:ph type="title"/>
-          </p:nvPr>
-        </p:nvSpPr>
-        <p:spPr/>
-        <p:txBody>
-          <a:bodyPr>
-            <a:normAutofit/>
-          </a:bodyPr>
-          <a:lstStyle/>
-          <a:p>
-            <a:r>
-              <a:rPr lang="bg-BG" dirty="0"/>
-              <a:t>Задача: Число в интервала</a:t>
-            </a:r>
-            <a:endParaRPr lang="en-US" dirty="0"/>
-          </a:p>
-        </p:txBody>
-      </p:sp>
-      <p:grpSp>
-        <p:nvGrpSpPr>
-          <p:cNvPr id="19" name="Group 5">
-            <a:extLst>
-              <a:ext uri="{FF2B5EF4-FFF2-40B4-BE49-F238E27FC236}">
-                <a16:creationId xmlns:a16="http://schemas.microsoft.com/office/drawing/2014/main" id="{06252BF0-6C25-47DB-8706-9A261444E90C}"/>
-              </a:ext>
-            </a:extLst>
-          </p:cNvPr>
-          <p:cNvGrpSpPr/>
-          <p:nvPr/>
-        </p:nvGrpSpPr>
-        <p:grpSpPr>
-          <a:xfrm>
-            <a:off x="1551000" y="5675345"/>
-            <a:ext cx="2202255" cy="553998"/>
-            <a:chOff x="650909" y="5821489"/>
-            <a:chExt cx="2202255" cy="553998"/>
-          </a:xfrm>
-        </p:grpSpPr>
-        <p:sp>
-          <p:nvSpPr>
-            <p:cNvPr id="21" name="Rectangle 6">
-              <a:extLst>
-                <a:ext uri="{FF2B5EF4-FFF2-40B4-BE49-F238E27FC236}">
-                  <a16:creationId xmlns:a16="http://schemas.microsoft.com/office/drawing/2014/main" id="{20053DF5-03AB-4011-AEE1-78786F3979A7}"/>
-                </a:ext>
-              </a:extLst>
-            </p:cNvPr>
-            <p:cNvSpPr>
-              <a:spLocks noChangeArrowheads="1"/>
-            </p:cNvSpPr>
-            <p:nvPr/>
-          </p:nvSpPr>
-          <p:spPr bwMode="auto">
-            <a:xfrm>
-              <a:off x="650909" y="5821489"/>
-              <a:ext cx="839217" cy="553998"/>
-            </a:xfrm>
-            <a:prstGeom prst="rect">
-              <a:avLst/>
-            </a:prstGeom>
-            <a:solidFill>
-              <a:schemeClr val="accent5">
-                <a:lumMod val="40000"/>
-                <a:lumOff val="60000"/>
-                <a:alpha val="20000"/>
-              </a:schemeClr>
-            </a:solidFill>
-            <a:ln w="12700">
-              <a:solidFill>
-                <a:schemeClr val="accent5">
-                  <a:lumMod val="60000"/>
-                  <a:lumOff val="40000"/>
-                </a:schemeClr>
-              </a:solidFill>
-            </a:ln>
-          </p:spPr>
-          <p:txBody>
-            <a:bodyPr wrap="square">
-              <a:spAutoFit/>
-            </a:bodyPr>
-            <a:lstStyle/>
-            <a:p>
-              <a:pPr eaLnBrk="0" hangingPunct="0">
-                <a:buClr>
-                  <a:schemeClr val="accent5">
-                    <a:lumMod val="40000"/>
-                    <a:lumOff val="60000"/>
-                  </a:schemeClr>
-                </a:buClr>
-                <a:buSzPct val="70000"/>
-              </a:pPr>
-              <a:r>
-                <a:rPr lang="bg-BG" sz="3000" b="1" noProof="1">
-                  <a:latin typeface="Consolas" pitchFamily="49" charset="0"/>
-                  <a:cs typeface="Consolas" pitchFamily="49" charset="0"/>
-                </a:rPr>
-                <a:t>-25</a:t>
-              </a:r>
-              <a:endParaRPr lang="en-US" sz="3000" b="1" noProof="1">
-                <a:latin typeface="Consolas" pitchFamily="49" charset="0"/>
-                <a:cs typeface="Consolas" pitchFamily="49" charset="0"/>
-              </a:endParaRPr>
-            </a:p>
-          </p:txBody>
-        </p:sp>
-        <p:sp>
-          <p:nvSpPr>
-            <p:cNvPr id="22" name="Rectangle 7">
-              <a:extLst>
-                <a:ext uri="{FF2B5EF4-FFF2-40B4-BE49-F238E27FC236}">
-                  <a16:creationId xmlns:a16="http://schemas.microsoft.com/office/drawing/2014/main" id="{586FFA88-0FBF-4C6C-A844-B26241E5015F}"/>
-                </a:ext>
-              </a:extLst>
-            </p:cNvPr>
-            <p:cNvSpPr>
-              <a:spLocks noChangeArrowheads="1"/>
-            </p:cNvSpPr>
-            <p:nvPr/>
-          </p:nvSpPr>
-          <p:spPr bwMode="auto">
-            <a:xfrm>
-              <a:off x="2013947" y="5821489"/>
-              <a:ext cx="839217" cy="553997"/>
-            </a:xfrm>
-            <a:prstGeom prst="rect">
-              <a:avLst/>
-            </a:prstGeom>
-            <a:solidFill>
-              <a:schemeClr val="accent5">
-                <a:lumMod val="40000"/>
-                <a:lumOff val="60000"/>
-                <a:alpha val="20000"/>
-              </a:schemeClr>
-            </a:solidFill>
-            <a:ln w="12700">
-              <a:solidFill>
-                <a:schemeClr val="accent5">
-                  <a:lumMod val="60000"/>
-                  <a:lumOff val="40000"/>
-                </a:schemeClr>
-              </a:solidFill>
-            </a:ln>
-          </p:spPr>
-          <p:txBody>
-            <a:bodyPr wrap="square">
-              <a:noAutofit/>
-            </a:bodyPr>
-            <a:lstStyle/>
-            <a:p>
-              <a:pPr eaLnBrk="0" hangingPunct="0">
-                <a:buClr>
-                  <a:schemeClr val="accent5">
-                    <a:lumMod val="40000"/>
-                    <a:lumOff val="60000"/>
-                  </a:schemeClr>
-                </a:buClr>
-                <a:buSzPct val="70000"/>
-              </a:pPr>
-              <a:r>
-                <a:rPr lang="en-US" sz="3000" b="1" noProof="1">
-                  <a:latin typeface="Consolas" pitchFamily="49" charset="0"/>
-                  <a:cs typeface="Consolas" pitchFamily="49" charset="0"/>
-                </a:rPr>
-                <a:t>Yes</a:t>
-              </a:r>
-              <a:endParaRPr lang="bg-BG" sz="3000" b="1" noProof="1">
-                <a:latin typeface="Consolas" pitchFamily="49" charset="0"/>
-                <a:cs typeface="Consolas" pitchFamily="49" charset="0"/>
-              </a:endParaRPr>
-            </a:p>
-          </p:txBody>
-        </p:sp>
-        <p:sp>
-          <p:nvSpPr>
-            <p:cNvPr id="23" name="Right Arrow 4">
-              <a:extLst>
-                <a:ext uri="{FF2B5EF4-FFF2-40B4-BE49-F238E27FC236}">
-                  <a16:creationId xmlns:a16="http://schemas.microsoft.com/office/drawing/2014/main" id="{8523CAA6-86D3-4B09-82C2-C5F8FF7D48C0}"/>
-                </a:ext>
-              </a:extLst>
-            </p:cNvPr>
-            <p:cNvSpPr/>
-            <p:nvPr/>
-          </p:nvSpPr>
-          <p:spPr>
-            <a:xfrm>
-              <a:off x="1595657" y="5975376"/>
-              <a:ext cx="304800" cy="246222"/>
-            </a:xfrm>
-            <a:prstGeom prst="rightArrow">
-              <a:avLst/>
-            </a:prstGeom>
-          </p:spPr>
-          <p:style>
-            <a:lnRef idx="2">
-              <a:schemeClr val="accent1">
-                <a:shade val="50000"/>
-              </a:schemeClr>
-            </a:lnRef>
-            <a:fillRef idx="1">
-              <a:schemeClr val="accent1"/>
-            </a:fillRef>
-            <a:effectRef idx="0">
-              <a:schemeClr val="accent1"/>
-            </a:effectRef>
-            <a:fontRef idx="minor">
-              <a:schemeClr val="lt1"/>
-            </a:fontRef>
-          </p:style>
-          <p:txBody>
-            <a:bodyPr rtlCol="0" anchor="ctr"/>
-            <a:lstStyle/>
-            <a:p>
-              <a:pPr algn="ctr"/>
-              <a:endParaRPr lang="en-US" sz="2800" dirty="0"/>
-            </a:p>
-          </p:txBody>
-        </p:sp>
-      </p:grpSp>
-      <p:grpSp>
-        <p:nvGrpSpPr>
-          <p:cNvPr id="24" name="Group 9">
-            <a:extLst>
-              <a:ext uri="{FF2B5EF4-FFF2-40B4-BE49-F238E27FC236}">
-                <a16:creationId xmlns:a16="http://schemas.microsoft.com/office/drawing/2014/main" id="{F6FDD7CB-0617-4289-BE2B-CBDB3AD14A8B}"/>
-              </a:ext>
-            </a:extLst>
-          </p:cNvPr>
-          <p:cNvGrpSpPr/>
-          <p:nvPr/>
-        </p:nvGrpSpPr>
-        <p:grpSpPr>
-          <a:xfrm>
-            <a:off x="8211000" y="5674475"/>
-            <a:ext cx="2128166" cy="553998"/>
-            <a:chOff x="8902663" y="5766487"/>
-            <a:chExt cx="2128166" cy="553998"/>
-          </a:xfrm>
-        </p:grpSpPr>
-        <p:sp>
-          <p:nvSpPr>
-            <p:cNvPr id="25" name="Rectangle 11">
-              <a:extLst>
-                <a:ext uri="{FF2B5EF4-FFF2-40B4-BE49-F238E27FC236}">
-                  <a16:creationId xmlns:a16="http://schemas.microsoft.com/office/drawing/2014/main" id="{2125608C-E757-4F6B-AF84-70BF13F12EF6}"/>
-                </a:ext>
-              </a:extLst>
-            </p:cNvPr>
-            <p:cNvSpPr>
-              <a:spLocks noChangeArrowheads="1"/>
-            </p:cNvSpPr>
-            <p:nvPr/>
-          </p:nvSpPr>
-          <p:spPr bwMode="auto">
-            <a:xfrm>
-              <a:off x="8902663" y="5766487"/>
-              <a:ext cx="636013" cy="553998"/>
-            </a:xfrm>
-            <a:prstGeom prst="rect">
-              <a:avLst/>
-            </a:prstGeom>
-            <a:solidFill>
-              <a:schemeClr val="accent5">
-                <a:lumMod val="40000"/>
-                <a:lumOff val="60000"/>
-                <a:alpha val="20000"/>
-              </a:schemeClr>
-            </a:solidFill>
-            <a:ln w="12700">
-              <a:solidFill>
-                <a:schemeClr val="accent5">
-                  <a:lumMod val="60000"/>
-                  <a:lumOff val="40000"/>
-                </a:schemeClr>
-              </a:solidFill>
-            </a:ln>
-          </p:spPr>
-          <p:txBody>
-            <a:bodyPr wrap="square">
-              <a:spAutoFit/>
-            </a:bodyPr>
-            <a:lstStyle/>
-            <a:p>
-              <a:pPr eaLnBrk="0" hangingPunct="0">
-                <a:buClr>
-                  <a:schemeClr val="accent5">
-                    <a:lumMod val="40000"/>
-                    <a:lumOff val="60000"/>
-                  </a:schemeClr>
-                </a:buClr>
-                <a:buSzPct val="70000"/>
-              </a:pPr>
-              <a:r>
-                <a:rPr lang="en-US" sz="3000" b="1" noProof="1">
-                  <a:latin typeface="Consolas" pitchFamily="49" charset="0"/>
-                  <a:cs typeface="Consolas" pitchFamily="49" charset="0"/>
-                </a:rPr>
-                <a:t>25</a:t>
-              </a:r>
-            </a:p>
-          </p:txBody>
-        </p:sp>
-        <p:sp>
-          <p:nvSpPr>
-            <p:cNvPr id="26" name="Rectangle 12">
-              <a:extLst>
-                <a:ext uri="{FF2B5EF4-FFF2-40B4-BE49-F238E27FC236}">
-                  <a16:creationId xmlns:a16="http://schemas.microsoft.com/office/drawing/2014/main" id="{28964611-2F99-4039-894F-F4334E230973}"/>
-                </a:ext>
-              </a:extLst>
-            </p:cNvPr>
-            <p:cNvSpPr>
-              <a:spLocks noChangeArrowheads="1"/>
-            </p:cNvSpPr>
-            <p:nvPr/>
-          </p:nvSpPr>
-          <p:spPr bwMode="auto">
-            <a:xfrm>
-              <a:off x="10200316" y="5766488"/>
-              <a:ext cx="830513" cy="553996"/>
-            </a:xfrm>
-            <a:prstGeom prst="rect">
-              <a:avLst/>
-            </a:prstGeom>
-            <a:solidFill>
-              <a:schemeClr val="accent5">
-                <a:lumMod val="40000"/>
-                <a:lumOff val="60000"/>
-                <a:alpha val="20000"/>
-              </a:schemeClr>
-            </a:solidFill>
-            <a:ln w="12700">
-              <a:solidFill>
-                <a:schemeClr val="accent5">
-                  <a:lumMod val="60000"/>
-                  <a:lumOff val="40000"/>
-                </a:schemeClr>
-              </a:solidFill>
-            </a:ln>
-          </p:spPr>
-          <p:txBody>
-            <a:bodyPr wrap="square">
-              <a:noAutofit/>
-            </a:bodyPr>
-            <a:lstStyle/>
-            <a:p>
-              <a:pPr eaLnBrk="0" hangingPunct="0">
-                <a:buClr>
-                  <a:schemeClr val="accent5">
-                    <a:lumMod val="40000"/>
-                    <a:lumOff val="60000"/>
-                  </a:schemeClr>
-                </a:buClr>
-                <a:buSzPct val="70000"/>
-              </a:pPr>
-              <a:r>
-                <a:rPr lang="en-US" sz="3000" b="1" noProof="1">
-                  <a:latin typeface="Consolas" pitchFamily="49" charset="0"/>
-                  <a:cs typeface="Consolas" pitchFamily="49" charset="0"/>
-                </a:rPr>
-                <a:t>Yes</a:t>
-              </a:r>
-              <a:endParaRPr lang="bg-BG" sz="3000" b="1" noProof="1">
-                <a:latin typeface="Consolas" pitchFamily="49" charset="0"/>
-                <a:cs typeface="Consolas" pitchFamily="49" charset="0"/>
-              </a:endParaRPr>
-            </a:p>
-          </p:txBody>
-        </p:sp>
-        <p:sp>
-          <p:nvSpPr>
-            <p:cNvPr id="27" name="Right Arrow 13">
-              <a:extLst>
-                <a:ext uri="{FF2B5EF4-FFF2-40B4-BE49-F238E27FC236}">
-                  <a16:creationId xmlns:a16="http://schemas.microsoft.com/office/drawing/2014/main" id="{BB2BEA64-1563-4EBA-A84D-BB468F327191}"/>
-                </a:ext>
-              </a:extLst>
-            </p:cNvPr>
-            <p:cNvSpPr/>
-            <p:nvPr/>
-          </p:nvSpPr>
-          <p:spPr>
-            <a:xfrm>
-              <a:off x="9717096" y="5920374"/>
-              <a:ext cx="304800" cy="246222"/>
-            </a:xfrm>
-            <a:prstGeom prst="rightArrow">
-              <a:avLst/>
-            </a:prstGeom>
-          </p:spPr>
-          <p:style>
-            <a:lnRef idx="2">
-              <a:schemeClr val="accent1">
-                <a:shade val="50000"/>
-              </a:schemeClr>
-            </a:lnRef>
-            <a:fillRef idx="1">
-              <a:schemeClr val="accent1"/>
-            </a:fillRef>
-            <a:effectRef idx="0">
-              <a:schemeClr val="accent1"/>
-            </a:effectRef>
-            <a:fontRef idx="minor">
-              <a:schemeClr val="lt1"/>
-            </a:fontRef>
-          </p:style>
-          <p:txBody>
-            <a:bodyPr rtlCol="0" anchor="ctr"/>
-            <a:lstStyle/>
-            <a:p>
-              <a:pPr algn="ctr"/>
-              <a:endParaRPr lang="en-US" sz="2800" dirty="0"/>
-            </a:p>
-          </p:txBody>
-        </p:sp>
-      </p:grpSp>
-      <p:grpSp>
-        <p:nvGrpSpPr>
-          <p:cNvPr id="28" name="Group 8">
-            <a:extLst>
-              <a:ext uri="{FF2B5EF4-FFF2-40B4-BE49-F238E27FC236}">
-                <a16:creationId xmlns:a16="http://schemas.microsoft.com/office/drawing/2014/main" id="{2B43E1CC-BF50-4C14-8AF2-B965FE33269C}"/>
-              </a:ext>
-            </a:extLst>
-          </p:cNvPr>
-          <p:cNvGrpSpPr/>
-          <p:nvPr/>
-        </p:nvGrpSpPr>
-        <p:grpSpPr>
-          <a:xfrm>
-            <a:off x="5188211" y="5674475"/>
-            <a:ext cx="1587833" cy="553998"/>
-            <a:chOff x="5037444" y="5798858"/>
-            <a:chExt cx="1587833" cy="553998"/>
-          </a:xfrm>
-        </p:grpSpPr>
-        <p:sp>
-          <p:nvSpPr>
-            <p:cNvPr id="29" name="Rectangle 15">
-              <a:extLst>
-                <a:ext uri="{FF2B5EF4-FFF2-40B4-BE49-F238E27FC236}">
-                  <a16:creationId xmlns:a16="http://schemas.microsoft.com/office/drawing/2014/main" id="{3EFE6DEF-964B-42E0-9387-42FCC3FB2A22}"/>
-                </a:ext>
-              </a:extLst>
-            </p:cNvPr>
-            <p:cNvSpPr>
-              <a:spLocks noChangeArrowheads="1"/>
-            </p:cNvSpPr>
-            <p:nvPr/>
-          </p:nvSpPr>
-          <p:spPr bwMode="auto">
-            <a:xfrm>
-              <a:off x="5037444" y="5798858"/>
-              <a:ext cx="386432" cy="553998"/>
-            </a:xfrm>
-            <a:prstGeom prst="rect">
-              <a:avLst/>
-            </a:prstGeom>
-            <a:solidFill>
-              <a:schemeClr val="accent5">
-                <a:lumMod val="40000"/>
-                <a:lumOff val="60000"/>
-                <a:alpha val="20000"/>
-              </a:schemeClr>
-            </a:solidFill>
-            <a:ln w="12700">
-              <a:solidFill>
-                <a:schemeClr val="accent5">
-                  <a:lumMod val="60000"/>
-                  <a:lumOff val="40000"/>
-                </a:schemeClr>
-              </a:solidFill>
-            </a:ln>
-          </p:spPr>
-          <p:txBody>
-            <a:bodyPr wrap="square">
-              <a:spAutoFit/>
-            </a:bodyPr>
-            <a:lstStyle/>
-            <a:p>
-              <a:pPr eaLnBrk="0" hangingPunct="0">
-                <a:buClr>
-                  <a:schemeClr val="accent5">
-                    <a:lumMod val="40000"/>
-                    <a:lumOff val="60000"/>
-                  </a:schemeClr>
-                </a:buClr>
-                <a:buSzPct val="70000"/>
-              </a:pPr>
-              <a:r>
-                <a:rPr lang="en-US" sz="3000" b="1" noProof="1">
-                  <a:latin typeface="Consolas" pitchFamily="49" charset="0"/>
-                  <a:cs typeface="Consolas" pitchFamily="49" charset="0"/>
-                </a:rPr>
-                <a:t>0</a:t>
-              </a:r>
-            </a:p>
-          </p:txBody>
-        </p:sp>
-        <p:sp>
-          <p:nvSpPr>
-            <p:cNvPr id="30" name="Rectangle 16">
-              <a:extLst>
-                <a:ext uri="{FF2B5EF4-FFF2-40B4-BE49-F238E27FC236}">
-                  <a16:creationId xmlns:a16="http://schemas.microsoft.com/office/drawing/2014/main" id="{D59891EE-1423-4281-801C-1B67BDC52886}"/>
-                </a:ext>
-              </a:extLst>
-            </p:cNvPr>
-            <p:cNvSpPr>
-              <a:spLocks noChangeArrowheads="1"/>
-            </p:cNvSpPr>
-            <p:nvPr/>
-          </p:nvSpPr>
-          <p:spPr bwMode="auto">
-            <a:xfrm>
-              <a:off x="5989264" y="5798858"/>
-              <a:ext cx="636013" cy="553998"/>
-            </a:xfrm>
-            <a:prstGeom prst="rect">
-              <a:avLst/>
-            </a:prstGeom>
-            <a:solidFill>
-              <a:schemeClr val="accent5">
-                <a:lumMod val="40000"/>
-                <a:lumOff val="60000"/>
-                <a:alpha val="20000"/>
-              </a:schemeClr>
-            </a:solidFill>
-            <a:ln w="12700">
-              <a:solidFill>
-                <a:schemeClr val="accent5">
-                  <a:lumMod val="60000"/>
-                  <a:lumOff val="40000"/>
-                </a:schemeClr>
-              </a:solidFill>
-            </a:ln>
-          </p:spPr>
-          <p:txBody>
-            <a:bodyPr wrap="square">
-              <a:noAutofit/>
-            </a:bodyPr>
-            <a:lstStyle/>
-            <a:p>
-              <a:pPr eaLnBrk="0" hangingPunct="0">
-                <a:buClr>
-                  <a:schemeClr val="accent5">
-                    <a:lumMod val="40000"/>
-                    <a:lumOff val="60000"/>
-                  </a:schemeClr>
-                </a:buClr>
-                <a:buSzPct val="70000"/>
-              </a:pPr>
-              <a:r>
-                <a:rPr lang="en-US" sz="3000" b="1" noProof="1">
-                  <a:latin typeface="Consolas" pitchFamily="49" charset="0"/>
-                  <a:cs typeface="Consolas" pitchFamily="49" charset="0"/>
-                </a:rPr>
-                <a:t>No</a:t>
-              </a:r>
-              <a:endParaRPr lang="bg-BG" sz="3000" b="1" noProof="1">
-                <a:latin typeface="Consolas" pitchFamily="49" charset="0"/>
-                <a:cs typeface="Consolas" pitchFamily="49" charset="0"/>
-              </a:endParaRPr>
-            </a:p>
-          </p:txBody>
-        </p:sp>
-        <p:sp>
-          <p:nvSpPr>
-            <p:cNvPr id="31" name="Right Arrow 4">
-              <a:extLst>
-                <a:ext uri="{FF2B5EF4-FFF2-40B4-BE49-F238E27FC236}">
-                  <a16:creationId xmlns:a16="http://schemas.microsoft.com/office/drawing/2014/main" id="{E53C097B-FBC5-4CD2-8F05-80FAAFE4927F}"/>
-                </a:ext>
-              </a:extLst>
-            </p:cNvPr>
-            <p:cNvSpPr/>
-            <p:nvPr/>
-          </p:nvSpPr>
-          <p:spPr>
-            <a:xfrm>
-              <a:off x="5554170" y="5952745"/>
-              <a:ext cx="304800" cy="246222"/>
-            </a:xfrm>
-            <a:prstGeom prst="rightArrow">
-              <a:avLst/>
-            </a:prstGeom>
-          </p:spPr>
-          <p:style>
-            <a:lnRef idx="2">
-              <a:schemeClr val="accent1">
-                <a:shade val="50000"/>
-              </a:schemeClr>
-            </a:lnRef>
-            <a:fillRef idx="1">
-              <a:schemeClr val="accent1"/>
-            </a:fillRef>
-            <a:effectRef idx="0">
-              <a:schemeClr val="accent1"/>
-            </a:effectRef>
-            <a:fontRef idx="minor">
-              <a:schemeClr val="lt1"/>
-            </a:fontRef>
-          </p:style>
-          <p:txBody>
-            <a:bodyPr rtlCol="0" anchor="ctr"/>
-            <a:lstStyle/>
-            <a:p>
-              <a:pPr algn="ctr"/>
-              <a:endParaRPr lang="en-US" sz="2800" dirty="0"/>
-            </a:p>
-          </p:txBody>
-        </p:sp>
-      </p:grpSp>
-      <p:sp>
-        <p:nvSpPr>
-          <p:cNvPr id="17" name="Slide Number">
-            <a:extLst>
-              <a:ext uri="{FF2B5EF4-FFF2-40B4-BE49-F238E27FC236}">
-                <a16:creationId xmlns:a16="http://schemas.microsoft.com/office/drawing/2014/main" id="{42D6A1A3-7D8A-45DD-AB5C-87E5A2DC28F0}"/>
-              </a:ext>
-            </a:extLst>
-          </p:cNvPr>
-          <p:cNvSpPr>
-            <a:spLocks noGrp="1"/>
-          </p:cNvSpPr>
-          <p:nvPr>
-            <p:ph type="sldNum" sz="quarter" idx="5"/>
-          </p:nvPr>
-        </p:nvSpPr>
-        <p:spPr>
-          <a:xfrm>
-            <a:off x="11753030" y="6507000"/>
-            <a:ext cx="367414" cy="297000"/>
-          </a:xfrm>
-          <a:prstGeom prst="rect">
-            <a:avLst/>
-          </a:prstGeom>
-        </p:spPr>
-        <p:txBody>
-          <a:bodyPr vert="horz" lIns="91440" tIns="45720" rIns="91440" bIns="45720" rtlCol="0" anchor="b"/>
-          <a:lstStyle>
-            <a:lvl1pPr algn="r">
-              <a:defRPr sz="1000"/>
-            </a:lvl1pPr>
-          </a:lstStyle>
-          <a:p>
-            <a:fld id="{2BF067CD-8E6B-4360-9AA8-C5DF2A48A6D1}" type="slidenum">
-              <a:rPr lang="en-US" noProof="0" smtClean="0"/>
-              <a:pPr/>
-              <a:t>18</a:t>
-            </a:fld>
-            <a:endParaRPr lang="en-US" noProof="0" dirty="0"/>
-          </a:p>
-        </p:txBody>
-      </p:sp>
-    </p:spTree>
-    <p:extLst>
-      <p:ext uri="{BB962C8B-B14F-4D97-AF65-F5344CB8AC3E}">
-        <p14:creationId xmlns:p14="http://schemas.microsoft.com/office/powerpoint/2010/main" val="3600199906"/>
-      </p:ext>
-    </p:extLst>
-  </p:cSld>
-  <p:clrMapOvr>
-    <a:masterClrMapping/>
-  </p:clrMapOvr>
-  <mc:AlternateContent xmlns:mc="http://schemas.openxmlformats.org/markup-compatibility/2006" xmlns:p14="http://schemas.microsoft.com/office/powerpoint/2010/main">
-    <mc:Choice Requires="p14">
-      <p:transition p14:dur="0" advClick="0" advTm="5000"/>
-    </mc:Choice>
-    <mc:Fallback xmlns="">
-      <p:transition advClick="0" advTm="5000"/>
-    </mc:Fallback>
-  </mc:AlternateContent>
-  <p:timing>
-    <p:tnLst>
-      <p:par>
-        <p:cTn id="1" dur="indefinite" restart="never" nodeType="tmRoot">
-          <p:childTnLst>
-            <p:seq concurrent="1" nextAc="seek">
-              <p:cTn id="2" dur="indefinite" nodeType="mainSeq">
-                <p:childTnLst>
-                  <p:par>
-                    <p:cTn id="3" fill="hold">
-                      <p:stCondLst>
-                        <p:cond delay="indefinite"/>
-                      </p:stCondLst>
-                      <p:childTnLst>
-                        <p:par>
-                          <p:cTn id="4" fill="hold">
-                            <p:stCondLst>
-                              <p:cond delay="0"/>
-                            </p:stCondLst>
-                            <p:childTnLst>
-                              <p:par>
-                                <p:cTn id="5" presetID="1" presetClass="entr" presetSubtype="0" fill="hold" nodeType="clickEffect">
-                                  <p:stCondLst>
-                                    <p:cond delay="0"/>
-                                  </p:stCondLst>
-                                  <p:childTnLst>
-                                    <p:set>
-                                      <p:cBhvr>
-                                        <p:cTn id="6" dur="1" fill="hold">
-                                          <p:stCondLst>
-                                            <p:cond delay="0"/>
-                                          </p:stCondLst>
-                                        </p:cTn>
-                                        <p:tgtEl>
-                                          <p:spTgt spid="3">
-                                            <p:txEl>
-                                              <p:pRg st="2" end="2"/>
-                                            </p:txEl>
-                                          </p:spTgt>
-                                        </p:tgtEl>
-                                        <p:attrNameLst>
-                                          <p:attrName>style.visibility</p:attrName>
-                                        </p:attrNameLst>
-                                      </p:cBhvr>
-                                      <p:to>
-                                        <p:strVal val="visible"/>
-                                      </p:to>
-                                    </p:set>
-                                  </p:childTnLst>
-                                </p:cTn>
-                              </p:par>
-                            </p:childTnLst>
-                          </p:cTn>
-                        </p:par>
-                      </p:childTnLst>
-                    </p:cTn>
-                  </p:par>
-                  <p:par>
-                    <p:cTn id="7" fill="hold">
-                      <p:stCondLst>
-                        <p:cond delay="indefinite"/>
-                      </p:stCondLst>
-                      <p:childTnLst>
-                        <p:par>
-                          <p:cTn id="8" fill="hold">
-                            <p:stCondLst>
-                              <p:cond delay="0"/>
-                            </p:stCondLst>
-                            <p:childTnLst>
-                              <p:par>
-                                <p:cTn id="9" presetID="1" presetClass="entr" presetSubtype="0" fill="hold" nodeType="clickEffect">
-                                  <p:stCondLst>
-                                    <p:cond delay="0"/>
-                                  </p:stCondLst>
-                                  <p:childTnLst>
-                                    <p:set>
-                                      <p:cBhvr>
-                                        <p:cTn id="10" dur="1" fill="hold">
-                                          <p:stCondLst>
-                                            <p:cond delay="0"/>
-                                          </p:stCondLst>
-                                        </p:cTn>
-                                        <p:tgtEl>
-                                          <p:spTgt spid="3">
-                                            <p:txEl>
-                                              <p:pRg st="3" end="3"/>
-                                            </p:txEl>
-                                          </p:spTgt>
-                                        </p:tgtEl>
-                                        <p:attrNameLst>
-                                          <p:attrName>style.visibility</p:attrName>
-                                        </p:attrNameLst>
-                                      </p:cBhvr>
-                                      <p:to>
-                                        <p:strVal val="visible"/>
-                                      </p:to>
-                                    </p:set>
-                                  </p:childTnLst>
-                                </p:cTn>
-                              </p:par>
-                              <p:par>
-                                <p:cTn id="11" presetID="1" presetClass="entr" presetSubtype="0" fill="hold" nodeType="withEffect">
-                                  <p:stCondLst>
-                                    <p:cond delay="0"/>
-                                  </p:stCondLst>
-                                  <p:childTnLst>
-                                    <p:set>
-                                      <p:cBhvr>
-                                        <p:cTn id="12" dur="1" fill="hold">
-                                          <p:stCondLst>
-                                            <p:cond delay="0"/>
-                                          </p:stCondLst>
-                                        </p:cTn>
-                                        <p:tgtEl>
-                                          <p:spTgt spid="19"/>
-                                        </p:tgtEl>
-                                        <p:attrNameLst>
-                                          <p:attrName>style.visibility</p:attrName>
-                                        </p:attrNameLst>
-                                      </p:cBhvr>
-                                      <p:to>
-                                        <p:strVal val="visible"/>
-                                      </p:to>
-                                    </p:set>
-                                  </p:childTnLst>
-                                </p:cTn>
-                              </p:par>
-                            </p:childTnLst>
-                          </p:cTn>
-                        </p:par>
-                      </p:childTnLst>
-                    </p:cTn>
-                  </p:par>
-                  <p:par>
-                    <p:cTn id="13" fill="hold">
-                      <p:stCondLst>
-                        <p:cond delay="indefinite"/>
-                      </p:stCondLst>
-                      <p:childTnLst>
-                        <p:par>
-                          <p:cTn id="14" fill="hold">
-                            <p:stCondLst>
-                              <p:cond delay="0"/>
-                            </p:stCondLst>
-                            <p:childTnLst>
-                              <p:par>
-                                <p:cTn id="15" presetID="1" presetClass="entr" presetSubtype="0" fill="hold" nodeType="clickEffect">
-                                  <p:stCondLst>
-                                    <p:cond delay="0"/>
-                                  </p:stCondLst>
-                                  <p:childTnLst>
-                                    <p:set>
-                                      <p:cBhvr>
-                                        <p:cTn id="16" dur="1" fill="hold">
-                                          <p:stCondLst>
-                                            <p:cond delay="0"/>
-                                          </p:stCondLst>
-                                        </p:cTn>
-                                        <p:tgtEl>
-                                          <p:spTgt spid="28"/>
-                                        </p:tgtEl>
-                                        <p:attrNameLst>
-                                          <p:attrName>style.visibility</p:attrName>
-                                        </p:attrNameLst>
-                                      </p:cBhvr>
-                                      <p:to>
-                                        <p:strVal val="visible"/>
-                                      </p:to>
-                                    </p:set>
-                                  </p:childTnLst>
-                                </p:cTn>
-                              </p:par>
-                            </p:childTnLst>
-                          </p:cTn>
-                        </p:par>
-                      </p:childTnLst>
-                    </p:cTn>
-                  </p:par>
-                  <p:par>
-                    <p:cTn id="17" fill="hold">
-                      <p:stCondLst>
-                        <p:cond delay="indefinite"/>
-                      </p:stCondLst>
-                      <p:childTnLst>
-                        <p:par>
-                          <p:cTn id="18" fill="hold">
-                            <p:stCondLst>
-                              <p:cond delay="0"/>
-                            </p:stCondLst>
-                            <p:childTnLst>
-                              <p:par>
-                                <p:cTn id="19" presetID="1" presetClass="entr" presetSubtype="0" fill="hold" nodeType="clickEffect">
-                                  <p:stCondLst>
-                                    <p:cond delay="0"/>
-                                  </p:stCondLst>
-                                  <p:childTnLst>
-                                    <p:set>
-                                      <p:cBhvr>
-                                        <p:cTn id="20" dur="1" fill="hold">
-                                          <p:stCondLst>
-                                            <p:cond delay="0"/>
-                                          </p:stCondLst>
-                                        </p:cTn>
-                                        <p:tgtEl>
-                                          <p:spTgt spid="24"/>
-                                        </p:tgtEl>
-                                        <p:attrNameLst>
-                                          <p:attrName>style.visibility</p:attrName>
-                                        </p:attrNameLst>
-                                      </p:cBhvr>
-                                      <p:to>
-                                        <p:strVal val="visible"/>
-                                      </p:to>
-                                    </p:set>
-                                  </p:childTnLst>
-                                </p:cTn>
-                              </p:par>
-                            </p:childTnLst>
-                          </p:cTn>
-                        </p:par>
-                      </p:childTnLst>
-                    </p:cTn>
-                  </p:par>
-                </p:childTnLst>
-              </p:cTn>
-              <p:prevCondLst>
-                <p:cond evt="onPrev" delay="0">
-                  <p:tgtEl>
-                    <p:sldTgt/>
-                  </p:tgtEl>
-                </p:cond>
-              </p:prevCondLst>
-              <p:nextCondLst>
-                <p:cond evt="onNext" delay="0">
-                  <p:tgtEl>
-                    <p:sldTgt/>
-                  </p:tgtEl>
-                </p:cond>
-              </p:nextCondLst>
-            </p:seq>
-          </p:childTnLst>
-        </p:cTn>
-      </p:par>
-    </p:tnLst>
-  </p:timing>
-</p:sld>
-</file>
-
-<file path=ppt/slides/slide19.xml><?xml version="1.0" encoding="utf-8"?>
-<p:sld xmlns:a="http://schemas.openxmlformats.org/drawingml/2006/main" xmlns:r="http://schemas.openxmlformats.org/officeDocument/2006/relationships" xmlns:p="http://schemas.openxmlformats.org/presentationml/2006/main">
-  <p:cSld>
-    <p:spTree>
-      <p:nvGrpSpPr>
-        <p:cNvPr id="1" name=""/>
-        <p:cNvGrpSpPr/>
-        <p:nvPr/>
-      </p:nvGrpSpPr>
-      <p:grpSpPr>
-        <a:xfrm>
-          <a:off x="0" y="0"/>
-          <a:ext cx="0" cy="0"/>
-          <a:chOff x="0" y="0"/>
-          <a:chExt cx="0" cy="0"/>
-        </a:xfrm>
-      </p:grpSpPr>
-      <p:sp>
-        <p:nvSpPr>
-          <p:cNvPr id="4" name="Title 3"/>
-          <p:cNvSpPr>
-            <a:spLocks noGrp="1"/>
-          </p:cNvSpPr>
-          <p:nvPr>
-            <p:ph type="title"/>
-          </p:nvPr>
-        </p:nvSpPr>
-        <p:spPr/>
-        <p:txBody>
-          <a:bodyPr/>
-          <a:lstStyle/>
-          <a:p>
-            <a:r>
-              <a:rPr lang="bg-BG" dirty="0"/>
-              <a:t>Решение: Число в интервала</a:t>
-            </a:r>
-            <a:endParaRPr lang="en-US" dirty="0"/>
-          </a:p>
-        </p:txBody>
-      </p:sp>
-      <p:sp>
-        <p:nvSpPr>
-          <p:cNvPr id="9" name="Rectangle 8">
-            <a:extLst>
-              <a:ext uri="{FF2B5EF4-FFF2-40B4-BE49-F238E27FC236}">
-                <a16:creationId xmlns:a16="http://schemas.microsoft.com/office/drawing/2014/main" id="{CBB561F6-A015-4BA8-8EA8-DBA18CBFD719}"/>
-              </a:ext>
-            </a:extLst>
-          </p:cNvPr>
-          <p:cNvSpPr>
-            <a:spLocks noChangeArrowheads="1"/>
-          </p:cNvSpPr>
-          <p:nvPr/>
-        </p:nvSpPr>
-        <p:spPr bwMode="auto">
-          <a:xfrm>
-            <a:off x="590586" y="1412777"/>
-            <a:ext cx="11010827" cy="4723665"/>
-          </a:xfrm>
-          <a:prstGeom prst="rect">
-            <a:avLst/>
-          </a:prstGeom>
-          <a:solidFill>
-            <a:schemeClr val="accent5">
-              <a:lumMod val="40000"/>
-              <a:lumOff val="60000"/>
-              <a:alpha val="20000"/>
-            </a:schemeClr>
-          </a:solidFill>
-          <a:ln w="12700">
-            <a:solidFill>
-              <a:schemeClr val="accent5">
-                <a:lumMod val="60000"/>
-                <a:lumOff val="40000"/>
-              </a:schemeClr>
-            </a:solidFill>
-          </a:ln>
-        </p:spPr>
-        <p:txBody>
-          <a:bodyPr wrap="square">
-            <a:spAutoFit/>
-          </a:bodyPr>
-          <a:lstStyle/>
-          <a:p>
-            <a:pPr eaLnBrk="0" hangingPunct="0">
-              <a:lnSpc>
-                <a:spcPct val="105000"/>
-              </a:lnSpc>
-              <a:buClr>
-                <a:schemeClr val="accent5">
-                  <a:lumMod val="40000"/>
-                  <a:lumOff val="60000"/>
-                </a:schemeClr>
-              </a:buClr>
-              <a:buSzPct val="70000"/>
-            </a:pPr>
-            <a:r>
-              <a:rPr lang="en-US" sz="3000" b="1" noProof="1">
-                <a:latin typeface="Consolas" pitchFamily="49" charset="0"/>
-                <a:cs typeface="Consolas" pitchFamily="49" charset="0"/>
-              </a:rPr>
-              <a:t>int number = int.Parse(Console.ReadLine());</a:t>
-            </a:r>
-            <a:endParaRPr lang="bg-BG" sz="3000" b="1" noProof="1">
-              <a:latin typeface="Consolas" pitchFamily="49" charset="0"/>
-              <a:cs typeface="Consolas" pitchFamily="49" charset="0"/>
-            </a:endParaRPr>
-          </a:p>
-          <a:p>
-            <a:pPr eaLnBrk="0" hangingPunct="0">
-              <a:lnSpc>
-                <a:spcPct val="105000"/>
-              </a:lnSpc>
-              <a:buClr>
-                <a:schemeClr val="accent5">
-                  <a:lumMod val="40000"/>
-                  <a:lumOff val="60000"/>
-                </a:schemeClr>
-              </a:buClr>
-              <a:buSzPct val="70000"/>
-            </a:pPr>
-            <a:endParaRPr lang="en-US" sz="1200" b="1" noProof="1">
-              <a:latin typeface="Consolas" pitchFamily="49" charset="0"/>
-              <a:cs typeface="Consolas" pitchFamily="49" charset="0"/>
-            </a:endParaRPr>
-          </a:p>
-          <a:p>
-            <a:pPr eaLnBrk="0" hangingPunct="0">
-              <a:lnSpc>
-                <a:spcPct val="105000"/>
-              </a:lnSpc>
-              <a:buClr>
-                <a:schemeClr val="accent5">
-                  <a:lumMod val="40000"/>
-                  <a:lumOff val="60000"/>
-                </a:schemeClr>
-              </a:buClr>
-              <a:buSzPct val="70000"/>
-            </a:pPr>
-            <a:r>
-              <a:rPr lang="en-US" sz="3000" b="1" noProof="1">
-                <a:latin typeface="Consolas" pitchFamily="49" charset="0"/>
-                <a:cs typeface="Consolas" pitchFamily="49" charset="0"/>
-              </a:rPr>
-              <a:t>if (number &gt;= -100 </a:t>
-            </a:r>
-            <a:r>
-              <a:rPr lang="en-US" sz="3000" b="1" noProof="1">
-                <a:solidFill>
-                  <a:schemeClr val="bg1"/>
-                </a:solidFill>
-                <a:latin typeface="Consolas" pitchFamily="49" charset="0"/>
-                <a:cs typeface="Consolas" pitchFamily="49" charset="0"/>
-              </a:rPr>
-              <a:t>&amp;&amp;</a:t>
-            </a:r>
-            <a:r>
-              <a:rPr lang="en-US" sz="3000" b="1" noProof="1">
-                <a:latin typeface="Consolas" pitchFamily="49" charset="0"/>
-                <a:cs typeface="Consolas" pitchFamily="49" charset="0"/>
-              </a:rPr>
-              <a:t> number &lt;= 100 </a:t>
-            </a:r>
-            <a:r>
-              <a:rPr lang="en-US" sz="3000" b="1" noProof="1">
-                <a:solidFill>
-                  <a:schemeClr val="bg1"/>
-                </a:solidFill>
-                <a:latin typeface="Consolas" pitchFamily="49" charset="0"/>
-                <a:cs typeface="Consolas" pitchFamily="49" charset="0"/>
-              </a:rPr>
-              <a:t>&amp;&amp;</a:t>
-            </a:r>
-            <a:r>
-              <a:rPr lang="en-US" sz="3000" b="1" noProof="1">
-                <a:latin typeface="Consolas" pitchFamily="49" charset="0"/>
-                <a:cs typeface="Consolas" pitchFamily="49" charset="0"/>
-              </a:rPr>
-              <a:t> number != 0</a:t>
-            </a:r>
-            <a:r>
-              <a:rPr lang="bg-BG" sz="3000" b="1" noProof="1">
-                <a:latin typeface="Consolas" pitchFamily="49" charset="0"/>
-                <a:cs typeface="Consolas" pitchFamily="49" charset="0"/>
-              </a:rPr>
-              <a:t>)</a:t>
-            </a:r>
-            <a:endParaRPr lang="en-US" sz="3000" b="1" noProof="1">
-              <a:latin typeface="Consolas" pitchFamily="49" charset="0"/>
-              <a:cs typeface="Consolas" pitchFamily="49" charset="0"/>
-            </a:endParaRPr>
-          </a:p>
-          <a:p>
-            <a:pPr eaLnBrk="0" hangingPunct="0">
-              <a:lnSpc>
-                <a:spcPct val="105000"/>
-              </a:lnSpc>
-              <a:buClr>
-                <a:schemeClr val="accent5">
-                  <a:lumMod val="40000"/>
-                  <a:lumOff val="60000"/>
-                </a:schemeClr>
-              </a:buClr>
-              <a:buSzPct val="70000"/>
-            </a:pPr>
-            <a:r>
-              <a:rPr lang="en-US" sz="3000" b="1" noProof="1">
-                <a:latin typeface="Consolas" pitchFamily="49" charset="0"/>
-                <a:cs typeface="Consolas" pitchFamily="49" charset="0"/>
-              </a:rPr>
-              <a:t>{</a:t>
-            </a:r>
-            <a:endParaRPr lang="bg-BG" sz="3000" b="1" noProof="1">
-              <a:latin typeface="Consolas" pitchFamily="49" charset="0"/>
-              <a:cs typeface="Consolas" pitchFamily="49" charset="0"/>
-            </a:endParaRPr>
-          </a:p>
-          <a:p>
-            <a:pPr eaLnBrk="0" hangingPunct="0">
-              <a:lnSpc>
-                <a:spcPct val="105000"/>
-              </a:lnSpc>
-              <a:buClr>
-                <a:schemeClr val="accent5">
-                  <a:lumMod val="40000"/>
-                  <a:lumOff val="60000"/>
-                </a:schemeClr>
-              </a:buClr>
-              <a:buSzPct val="70000"/>
-            </a:pPr>
-            <a:r>
-              <a:rPr lang="en-US" sz="3000" b="1" noProof="1">
-                <a:latin typeface="Consolas" pitchFamily="49" charset="0"/>
-                <a:cs typeface="Consolas" pitchFamily="49" charset="0"/>
-              </a:rPr>
-              <a:t>    Console.WriteLine</a:t>
-            </a:r>
-            <a:r>
-              <a:rPr lang="en-US" sz="3000" noProof="1">
-                <a:latin typeface="Consolas" pitchFamily="49" charset="0"/>
-                <a:cs typeface="Consolas" pitchFamily="49" charset="0"/>
-              </a:rPr>
-              <a:t>("</a:t>
-            </a:r>
-            <a:r>
-              <a:rPr lang="en-US" sz="3000" b="1" noProof="1">
-                <a:latin typeface="Consolas" pitchFamily="49" charset="0"/>
-                <a:cs typeface="Consolas" pitchFamily="49" charset="0"/>
-              </a:rPr>
-              <a:t>Yes</a:t>
-            </a:r>
-            <a:r>
-              <a:rPr lang="en-US" sz="3000" noProof="1">
-                <a:latin typeface="Consolas" pitchFamily="49" charset="0"/>
-                <a:cs typeface="Consolas" pitchFamily="49" charset="0"/>
-              </a:rPr>
-              <a:t>");</a:t>
-            </a:r>
-          </a:p>
-          <a:p>
-            <a:pPr eaLnBrk="0" hangingPunct="0">
-              <a:lnSpc>
-                <a:spcPct val="105000"/>
-              </a:lnSpc>
-              <a:buClr>
-                <a:schemeClr val="accent5">
-                  <a:lumMod val="40000"/>
-                  <a:lumOff val="60000"/>
-                </a:schemeClr>
-              </a:buClr>
-              <a:buSzPct val="70000"/>
-            </a:pPr>
-            <a:r>
-              <a:rPr lang="en-US" sz="3000" b="1" noProof="1">
-                <a:latin typeface="Consolas" pitchFamily="49" charset="0"/>
-                <a:cs typeface="Consolas" pitchFamily="49" charset="0"/>
-              </a:rPr>
-              <a:t>} </a:t>
-            </a:r>
-          </a:p>
-          <a:p>
-            <a:pPr eaLnBrk="0" hangingPunct="0">
-              <a:lnSpc>
-                <a:spcPct val="105000"/>
-              </a:lnSpc>
-              <a:buClr>
-                <a:schemeClr val="accent5">
-                  <a:lumMod val="40000"/>
-                  <a:lumOff val="60000"/>
-                </a:schemeClr>
-              </a:buClr>
-              <a:buSzPct val="70000"/>
-            </a:pPr>
-            <a:r>
-              <a:rPr lang="en-US" sz="3000" b="1" noProof="1">
-                <a:latin typeface="Consolas" pitchFamily="49" charset="0"/>
-                <a:cs typeface="Consolas" pitchFamily="49" charset="0"/>
-              </a:rPr>
-              <a:t>else </a:t>
-            </a:r>
-          </a:p>
-          <a:p>
-            <a:pPr eaLnBrk="0" hangingPunct="0">
-              <a:lnSpc>
-                <a:spcPct val="105000"/>
-              </a:lnSpc>
-              <a:buClr>
-                <a:schemeClr val="accent5">
-                  <a:lumMod val="40000"/>
-                  <a:lumOff val="60000"/>
-                </a:schemeClr>
-              </a:buClr>
-              <a:buSzPct val="70000"/>
-            </a:pPr>
-            <a:r>
-              <a:rPr lang="en-US" sz="3000" b="1" noProof="1">
-                <a:latin typeface="Consolas" pitchFamily="49" charset="0"/>
-                <a:cs typeface="Consolas" pitchFamily="49" charset="0"/>
-              </a:rPr>
-              <a:t>{</a:t>
-            </a:r>
-          </a:p>
-          <a:p>
-            <a:pPr eaLnBrk="0" hangingPunct="0">
-              <a:lnSpc>
-                <a:spcPct val="105000"/>
-              </a:lnSpc>
-              <a:buClr>
-                <a:schemeClr val="accent5">
-                  <a:lumMod val="40000"/>
-                  <a:lumOff val="60000"/>
-                </a:schemeClr>
-              </a:buClr>
-              <a:buSzPct val="70000"/>
-            </a:pPr>
-            <a:r>
-              <a:rPr lang="en-US" sz="3000" b="1" noProof="1">
-                <a:latin typeface="Consolas" pitchFamily="49" charset="0"/>
-                <a:cs typeface="Consolas" pitchFamily="49" charset="0"/>
-              </a:rPr>
-              <a:t>    Console.WriteLine</a:t>
-            </a:r>
-            <a:r>
-              <a:rPr lang="en-US" sz="3000" noProof="1">
-                <a:latin typeface="Consolas" pitchFamily="49" charset="0"/>
-                <a:cs typeface="Consolas" pitchFamily="49" charset="0"/>
-              </a:rPr>
-              <a:t>("</a:t>
-            </a:r>
-            <a:r>
-              <a:rPr lang="en-US" sz="3000" b="1" noProof="1">
-                <a:latin typeface="Consolas" pitchFamily="49" charset="0"/>
-                <a:cs typeface="Consolas" pitchFamily="49" charset="0"/>
-              </a:rPr>
-              <a:t>No</a:t>
-            </a:r>
-            <a:r>
-              <a:rPr lang="en-US" sz="3000" noProof="1">
-                <a:latin typeface="Consolas" pitchFamily="49" charset="0"/>
-                <a:cs typeface="Consolas" pitchFamily="49" charset="0"/>
-              </a:rPr>
-              <a:t>");</a:t>
-            </a:r>
-          </a:p>
-          <a:p>
-            <a:pPr eaLnBrk="0" hangingPunct="0">
-              <a:lnSpc>
-                <a:spcPct val="105000"/>
-              </a:lnSpc>
-              <a:buClr>
-                <a:schemeClr val="accent5">
-                  <a:lumMod val="40000"/>
-                  <a:lumOff val="60000"/>
-                </a:schemeClr>
-              </a:buClr>
-              <a:buSzPct val="70000"/>
-            </a:pPr>
-            <a:r>
-              <a:rPr lang="en-US" sz="3000" b="1" noProof="1">
-                <a:latin typeface="Consolas" pitchFamily="49" charset="0"/>
-                <a:cs typeface="Consolas" pitchFamily="49" charset="0"/>
-              </a:rPr>
-              <a:t>}</a:t>
-            </a:r>
-          </a:p>
-        </p:txBody>
-      </p:sp>
-      <p:sp>
-        <p:nvSpPr>
-          <p:cNvPr id="6" name="Rectangle 6">
-            <a:extLst>
-              <a:ext uri="{FF2B5EF4-FFF2-40B4-BE49-F238E27FC236}">
-                <a16:creationId xmlns:a16="http://schemas.microsoft.com/office/drawing/2014/main" id="{D0923C16-B726-4D3F-BDA5-5F6A82B8CA48}"/>
-              </a:ext>
-            </a:extLst>
-          </p:cNvPr>
-          <p:cNvSpPr/>
-          <p:nvPr/>
-        </p:nvSpPr>
-        <p:spPr>
-          <a:xfrm>
-            <a:off x="346646" y="6306997"/>
-            <a:ext cx="11498705" cy="400006"/>
-          </a:xfrm>
-          <a:prstGeom prst="rect">
-            <a:avLst/>
-          </a:prstGeom>
-        </p:spPr>
-        <p:txBody>
-          <a:bodyPr wrap="square">
-            <a:spAutoFit/>
-          </a:bodyPr>
-          <a:lstStyle>
-            <a:defPPr>
-              <a:defRPr lang="en-US"/>
-            </a:defPPr>
-            <a:lvl1pPr marL="0" algn="l" defTabSz="914400" rtl="0" eaLnBrk="1" latinLnBrk="0" hangingPunct="1">
-              <a:defRPr sz="1800" kern="1200">
-                <a:solidFill>
-                  <a:schemeClr val="tx1"/>
-                </a:solidFill>
-                <a:latin typeface="+mn-lt"/>
-                <a:ea typeface="+mn-ea"/>
-                <a:cs typeface="+mn-cs"/>
-              </a:defRPr>
-            </a:lvl1pPr>
-            <a:lvl2pPr marL="457200" algn="l" defTabSz="914400" rtl="0" eaLnBrk="1" latinLnBrk="0" hangingPunct="1">
-              <a:defRPr sz="1800" kern="1200">
-                <a:solidFill>
-                  <a:schemeClr val="tx1"/>
-                </a:solidFill>
-                <a:latin typeface="+mn-lt"/>
-                <a:ea typeface="+mn-ea"/>
-                <a:cs typeface="+mn-cs"/>
-              </a:defRPr>
-            </a:lvl2pPr>
-            <a:lvl3pPr marL="914400" algn="l" defTabSz="914400" rtl="0" eaLnBrk="1" latinLnBrk="0" hangingPunct="1">
-              <a:defRPr sz="1800" kern="1200">
-                <a:solidFill>
-                  <a:schemeClr val="tx1"/>
-                </a:solidFill>
-                <a:latin typeface="+mn-lt"/>
-                <a:ea typeface="+mn-ea"/>
-                <a:cs typeface="+mn-cs"/>
-              </a:defRPr>
-            </a:lvl3pPr>
-            <a:lvl4pPr marL="1371600" algn="l" defTabSz="914400" rtl="0" eaLnBrk="1" latinLnBrk="0" hangingPunct="1">
-              <a:defRPr sz="1800" kern="1200">
-                <a:solidFill>
-                  <a:schemeClr val="tx1"/>
-                </a:solidFill>
-                <a:latin typeface="+mn-lt"/>
-                <a:ea typeface="+mn-ea"/>
-                <a:cs typeface="+mn-cs"/>
-              </a:defRPr>
-            </a:lvl4pPr>
-            <a:lvl5pPr marL="1828800" algn="l" defTabSz="914400" rtl="0" eaLnBrk="1" latinLnBrk="0" hangingPunct="1">
-              <a:defRPr sz="1800" kern="1200">
-                <a:solidFill>
-                  <a:schemeClr val="tx1"/>
-                </a:solidFill>
-                <a:latin typeface="+mn-lt"/>
-                <a:ea typeface="+mn-ea"/>
-                <a:cs typeface="+mn-cs"/>
-              </a:defRPr>
-            </a:lvl5pPr>
-            <a:lvl6pPr marL="2286000" algn="l" defTabSz="914400" rtl="0" eaLnBrk="1" latinLnBrk="0" hangingPunct="1">
-              <a:defRPr sz="1800" kern="1200">
-                <a:solidFill>
-                  <a:schemeClr val="tx1"/>
-                </a:solidFill>
-                <a:latin typeface="+mn-lt"/>
-                <a:ea typeface="+mn-ea"/>
-                <a:cs typeface="+mn-cs"/>
-              </a:defRPr>
-            </a:lvl6pPr>
-            <a:lvl7pPr marL="2743200" algn="l" defTabSz="914400" rtl="0" eaLnBrk="1" latinLnBrk="0" hangingPunct="1">
-              <a:defRPr sz="1800" kern="1200">
-                <a:solidFill>
-                  <a:schemeClr val="tx1"/>
-                </a:solidFill>
-                <a:latin typeface="+mn-lt"/>
-                <a:ea typeface="+mn-ea"/>
-                <a:cs typeface="+mn-cs"/>
-              </a:defRPr>
-            </a:lvl7pPr>
-            <a:lvl8pPr marL="3200400" algn="l" defTabSz="914400" rtl="0" eaLnBrk="1" latinLnBrk="0" hangingPunct="1">
-              <a:defRPr sz="1800" kern="1200">
-                <a:solidFill>
-                  <a:schemeClr val="tx1"/>
-                </a:solidFill>
-                <a:latin typeface="+mn-lt"/>
-                <a:ea typeface="+mn-ea"/>
-                <a:cs typeface="+mn-cs"/>
-              </a:defRPr>
-            </a:lvl8pPr>
-            <a:lvl9pPr marL="3657600" algn="l" defTabSz="914400" rtl="0" eaLnBrk="1" latinLnBrk="0" hangingPunct="1">
-              <a:defRPr sz="1800" kern="1200">
-                <a:solidFill>
-                  <a:schemeClr val="tx1"/>
-                </a:solidFill>
-                <a:latin typeface="+mn-lt"/>
-                <a:ea typeface="+mn-ea"/>
-                <a:cs typeface="+mn-cs"/>
-              </a:defRPr>
-            </a:lvl9pPr>
-          </a:lstStyle>
-          <a:p>
-            <a:pPr algn="ctr"/>
-            <a:r>
-              <a:rPr lang="bg-BG" sz="1999" dirty="0"/>
-              <a:t>Тествайте</a:t>
-            </a:r>
-            <a:r>
-              <a:rPr lang="bg-BG" sz="1999" dirty="0">
-                <a:solidFill>
-                  <a:prstClr val="white"/>
-                </a:solidFill>
-              </a:rPr>
-              <a:t> </a:t>
-            </a:r>
-            <a:r>
-              <a:rPr lang="bg-BG" sz="1999" dirty="0"/>
-              <a:t>решението си в </a:t>
-            </a:r>
-            <a:r>
-              <a:rPr lang="en-US" sz="1999" dirty="0"/>
-              <a:t>Judge: </a:t>
-            </a:r>
-            <a:r>
-              <a:rPr lang="en-US" sz="1999" u="sng" dirty="0">
-                <a:solidFill>
-                  <a:schemeClr val="bg1"/>
-                </a:solidFill>
-                <a:hlinkClick r:id="rId2"/>
-              </a:rPr>
-              <a:t>https://judge.softuni.org/Contests/Practice/Index/3896#3</a:t>
-            </a:r>
-            <a:endParaRPr lang="en-US" sz="1999" u="sng" dirty="0">
-              <a:solidFill>
-                <a:schemeClr val="bg1"/>
-              </a:solidFill>
-            </a:endParaRPr>
-          </a:p>
-        </p:txBody>
-      </p:sp>
-      <p:sp>
-        <p:nvSpPr>
-          <p:cNvPr id="8" name="Slide Number">
-            <a:extLst>
-              <a:ext uri="{FF2B5EF4-FFF2-40B4-BE49-F238E27FC236}">
-                <a16:creationId xmlns:a16="http://schemas.microsoft.com/office/drawing/2014/main" id="{B7930EF2-9DA2-4AC5-9930-9004F5152EB5}"/>
-              </a:ext>
-            </a:extLst>
-          </p:cNvPr>
-          <p:cNvSpPr>
-            <a:spLocks noGrp="1"/>
-          </p:cNvSpPr>
-          <p:nvPr>
-            <p:ph type="sldNum" sz="quarter" idx="5"/>
-          </p:nvPr>
-        </p:nvSpPr>
-        <p:spPr>
-          <a:xfrm>
-            <a:off x="11753030" y="6507000"/>
-            <a:ext cx="367414" cy="297000"/>
-          </a:xfrm>
-          <a:prstGeom prst="rect">
-            <a:avLst/>
-          </a:prstGeom>
-        </p:spPr>
-        <p:txBody>
-          <a:bodyPr vert="horz" lIns="91440" tIns="45720" rIns="91440" bIns="45720" rtlCol="0" anchor="b"/>
-          <a:lstStyle>
-            <a:lvl1pPr algn="r">
-              <a:defRPr sz="1000"/>
-            </a:lvl1pPr>
-          </a:lstStyle>
-          <a:p>
-            <a:fld id="{2BF067CD-8E6B-4360-9AA8-C5DF2A48A6D1}" type="slidenum">
-              <a:rPr lang="en-US" noProof="0" smtClean="0"/>
-              <a:pPr/>
-              <a:t>19</a:t>
-            </a:fld>
-            <a:endParaRPr lang="en-US" noProof="0" dirty="0"/>
-          </a:p>
-        </p:txBody>
-      </p:sp>
-    </p:spTree>
-    <p:extLst>
-      <p:ext uri="{BB962C8B-B14F-4D97-AF65-F5344CB8AC3E}">
-        <p14:creationId xmlns:p14="http://schemas.microsoft.com/office/powerpoint/2010/main" val="676093887"/>
-      </p:ext>
-    </p:extLst>
-  </p:cSld>
-  <p:clrMapOvr>
-    <a:masterClrMapping/>
-  </p:clrMapOvr>
-  <mc:AlternateContent xmlns:mc="http://schemas.openxmlformats.org/markup-compatibility/2006" xmlns:p14="http://schemas.microsoft.com/office/powerpoint/2010/main">
-    <mc:Choice Requires="p14">
-      <p:transition p14:dur="0" advClick="0" advTm="5000"/>
-    </mc:Choice>
-    <mc:Fallback xmlns="">
-      <p:transition advClick="0" advTm="5000"/>
-    </mc:Fallback>
-  </mc:AlternateContent>
-  <p:timing>
-    <p:tnLst>
-      <p:par>
-        <p:cTn id="1" dur="indefinite" restart="never" nodeType="tmRoot">
-          <p:childTnLst>
-            <p:seq concurrent="1" nextAc="seek">
-              <p:cTn id="2" dur="indefinite" nodeType="mainSeq">
-                <p:childTnLst>
-                  <p:par>
-                    <p:cTn id="3" fill="hold">
-                      <p:stCondLst>
-                        <p:cond delay="indefinite"/>
-                      </p:stCondLst>
-                      <p:childTnLst>
-                        <p:par>
-                          <p:cTn id="4" fill="hold">
-                            <p:stCondLst>
-                              <p:cond delay="0"/>
-                            </p:stCondLst>
-                            <p:childTnLst>
-                              <p:par>
-                                <p:cTn id="5" presetID="1" presetClass="entr" presetSubtype="0" fill="hold" nodeType="clickEffect">
-                                  <p:stCondLst>
-                                    <p:cond delay="0"/>
-                                  </p:stCondLst>
-                                  <p:childTnLst>
-                                    <p:set>
-                                      <p:cBhvr>
-                                        <p:cTn id="6" dur="1" fill="hold">
-                                          <p:stCondLst>
-                                            <p:cond delay="0"/>
-                                          </p:stCondLst>
-                                        </p:cTn>
-                                        <p:tgtEl>
-                                          <p:spTgt spid="9">
-                                            <p:txEl>
-                                              <p:pRg st="2" end="2"/>
-                                            </p:txEl>
-                                          </p:spTgt>
-                                        </p:tgtEl>
-                                        <p:attrNameLst>
-                                          <p:attrName>style.visibility</p:attrName>
-                                        </p:attrNameLst>
-                                      </p:cBhvr>
-                                      <p:to>
-                                        <p:strVal val="visible"/>
-                                      </p:to>
-                                    </p:set>
-                                  </p:childTnLst>
-                                </p:cTn>
-                              </p:par>
-                              <p:par>
-                                <p:cTn id="7" presetID="1" presetClass="entr" presetSubtype="0" fill="hold" nodeType="withEffect">
-                                  <p:stCondLst>
-                                    <p:cond delay="0"/>
-                                  </p:stCondLst>
-                                  <p:childTnLst>
-                                    <p:set>
-                                      <p:cBhvr>
-                                        <p:cTn id="8" dur="1" fill="hold">
-                                          <p:stCondLst>
-                                            <p:cond delay="0"/>
-                                          </p:stCondLst>
-                                        </p:cTn>
-                                        <p:tgtEl>
-                                          <p:spTgt spid="9">
-                                            <p:txEl>
-                                              <p:pRg st="3" end="3"/>
-                                            </p:txEl>
-                                          </p:spTgt>
-                                        </p:tgtEl>
-                                        <p:attrNameLst>
-                                          <p:attrName>style.visibility</p:attrName>
-                                        </p:attrNameLst>
-                                      </p:cBhvr>
-                                      <p:to>
-                                        <p:strVal val="visible"/>
-                                      </p:to>
-                                    </p:set>
-                                  </p:childTnLst>
-                                </p:cTn>
-                              </p:par>
-                              <p:par>
-                                <p:cTn id="9" presetID="1" presetClass="entr" presetSubtype="0" fill="hold" nodeType="withEffect">
-                                  <p:stCondLst>
-                                    <p:cond delay="0"/>
-                                  </p:stCondLst>
-                                  <p:childTnLst>
-                                    <p:set>
-                                      <p:cBhvr>
-                                        <p:cTn id="10" dur="1" fill="hold">
-                                          <p:stCondLst>
-                                            <p:cond delay="0"/>
-                                          </p:stCondLst>
-                                        </p:cTn>
-                                        <p:tgtEl>
-                                          <p:spTgt spid="9">
-                                            <p:txEl>
-                                              <p:pRg st="4" end="4"/>
-                                            </p:txEl>
-                                          </p:spTgt>
-                                        </p:tgtEl>
-                                        <p:attrNameLst>
-                                          <p:attrName>style.visibility</p:attrName>
-                                        </p:attrNameLst>
-                                      </p:cBhvr>
-                                      <p:to>
-                                        <p:strVal val="visible"/>
-                                      </p:to>
-                                    </p:set>
-                                  </p:childTnLst>
-                                </p:cTn>
-                              </p:par>
-                              <p:par>
-                                <p:cTn id="11" presetID="1" presetClass="entr" presetSubtype="0" fill="hold" nodeType="withEffect">
-                                  <p:stCondLst>
-                                    <p:cond delay="0"/>
-                                  </p:stCondLst>
-                                  <p:childTnLst>
-                                    <p:set>
-                                      <p:cBhvr>
-                                        <p:cTn id="12" dur="1" fill="hold">
-                                          <p:stCondLst>
-                                            <p:cond delay="0"/>
-                                          </p:stCondLst>
-                                        </p:cTn>
-                                        <p:tgtEl>
-                                          <p:spTgt spid="9">
-                                            <p:txEl>
-                                              <p:pRg st="5" end="5"/>
-                                            </p:txEl>
-                                          </p:spTgt>
-                                        </p:tgtEl>
-                                        <p:attrNameLst>
-                                          <p:attrName>style.visibility</p:attrName>
-                                        </p:attrNameLst>
-                                      </p:cBhvr>
-                                      <p:to>
-                                        <p:strVal val="visible"/>
-                                      </p:to>
-                                    </p:set>
-                                  </p:childTnLst>
-                                </p:cTn>
-                              </p:par>
-                            </p:childTnLst>
-                          </p:cTn>
-                        </p:par>
-                      </p:childTnLst>
-                    </p:cTn>
-                  </p:par>
-                  <p:par>
-                    <p:cTn id="13" fill="hold">
-                      <p:stCondLst>
-                        <p:cond delay="indefinite"/>
-                      </p:stCondLst>
-                      <p:childTnLst>
-                        <p:par>
-                          <p:cTn id="14" fill="hold">
-                            <p:stCondLst>
-                              <p:cond delay="0"/>
-                            </p:stCondLst>
-                            <p:childTnLst>
-                              <p:par>
-                                <p:cTn id="15" presetID="1" presetClass="entr" presetSubtype="0" fill="hold" nodeType="clickEffect">
-                                  <p:stCondLst>
-                                    <p:cond delay="0"/>
-                                  </p:stCondLst>
-                                  <p:childTnLst>
-                                    <p:set>
-                                      <p:cBhvr>
-                                        <p:cTn id="16" dur="1" fill="hold">
-                                          <p:stCondLst>
-                                            <p:cond delay="0"/>
-                                          </p:stCondLst>
-                                        </p:cTn>
-                                        <p:tgtEl>
-                                          <p:spTgt spid="9">
-                                            <p:txEl>
-                                              <p:pRg st="6" end="6"/>
-                                            </p:txEl>
-                                          </p:spTgt>
-                                        </p:tgtEl>
-                                        <p:attrNameLst>
-                                          <p:attrName>style.visibility</p:attrName>
-                                        </p:attrNameLst>
-                                      </p:cBhvr>
-                                      <p:to>
-                                        <p:strVal val="visible"/>
-                                      </p:to>
-                                    </p:set>
-                                  </p:childTnLst>
-                                </p:cTn>
-                              </p:par>
-                              <p:par>
-                                <p:cTn id="17" presetID="1" presetClass="entr" presetSubtype="0" fill="hold" nodeType="withEffect">
-                                  <p:stCondLst>
-                                    <p:cond delay="0"/>
-                                  </p:stCondLst>
-                                  <p:childTnLst>
-                                    <p:set>
-                                      <p:cBhvr>
-                                        <p:cTn id="18" dur="1" fill="hold">
-                                          <p:stCondLst>
-                                            <p:cond delay="0"/>
-                                          </p:stCondLst>
-                                        </p:cTn>
-                                        <p:tgtEl>
-                                          <p:spTgt spid="9">
-                                            <p:txEl>
-                                              <p:pRg st="7" end="7"/>
-                                            </p:txEl>
-                                          </p:spTgt>
-                                        </p:tgtEl>
-                                        <p:attrNameLst>
-                                          <p:attrName>style.visibility</p:attrName>
-                                        </p:attrNameLst>
-                                      </p:cBhvr>
-                                      <p:to>
-                                        <p:strVal val="visible"/>
-                                      </p:to>
-                                    </p:set>
-                                  </p:childTnLst>
-                                </p:cTn>
-                              </p:par>
-                              <p:par>
-                                <p:cTn id="19" presetID="1" presetClass="entr" presetSubtype="0" fill="hold" nodeType="withEffect">
-                                  <p:stCondLst>
-                                    <p:cond delay="0"/>
-                                  </p:stCondLst>
-                                  <p:childTnLst>
-                                    <p:set>
-                                      <p:cBhvr>
-                                        <p:cTn id="20" dur="1" fill="hold">
-                                          <p:stCondLst>
-                                            <p:cond delay="0"/>
-                                          </p:stCondLst>
-                                        </p:cTn>
-                                        <p:tgtEl>
-                                          <p:spTgt spid="9">
-                                            <p:txEl>
-                                              <p:pRg st="8" end="8"/>
-                                            </p:txEl>
-                                          </p:spTgt>
-                                        </p:tgtEl>
-                                        <p:attrNameLst>
-                                          <p:attrName>style.visibility</p:attrName>
-                                        </p:attrNameLst>
-                                      </p:cBhvr>
-                                      <p:to>
-                                        <p:strVal val="visible"/>
-                                      </p:to>
-                                    </p:set>
-                                  </p:childTnLst>
-                                </p:cTn>
-                              </p:par>
-                              <p:par>
-                                <p:cTn id="21" presetID="1" presetClass="entr" presetSubtype="0" fill="hold" nodeType="withEffect">
-                                  <p:stCondLst>
-                                    <p:cond delay="0"/>
-                                  </p:stCondLst>
-                                  <p:childTnLst>
-                                    <p:set>
-                                      <p:cBhvr>
-                                        <p:cTn id="22" dur="1" fill="hold">
-                                          <p:stCondLst>
-                                            <p:cond delay="0"/>
-                                          </p:stCondLst>
-                                        </p:cTn>
-                                        <p:tgtEl>
-                                          <p:spTgt spid="9">
-                                            <p:txEl>
-                                              <p:pRg st="9" end="9"/>
-                                            </p:txEl>
-                                          </p:spTgt>
-                                        </p:tgtEl>
-                                        <p:attrNameLst>
-                                          <p:attrName>style.visibility</p:attrName>
-                                        </p:attrNameLst>
-                                      </p:cBhvr>
-                                      <p:to>
-                                        <p:strVal val="visible"/>
-                                      </p:to>
-                                    </p:set>
-                                  </p:childTnLst>
-                                </p:cTn>
-                              </p:par>
-                            </p:childTnLst>
-                          </p:cTn>
-                        </p:par>
-                      </p:childTnLst>
-                    </p:cTn>
-                  </p:par>
-                </p:childTnLst>
-              </p:cTn>
-              <p:prevCondLst>
-                <p:cond evt="onPrev" delay="0">
-                  <p:tgtEl>
-                    <p:sldTgt/>
-                  </p:tgtEl>
-                </p:cond>
-              </p:prevCondLst>
-              <p:nextCondLst>
-                <p:cond evt="onNext" delay="0">
-                  <p:tgtEl>
-                    <p:sldTgt/>
-                  </p:tgtEl>
-                </p:cond>
-              </p:nextCondLst>
-            </p:seq>
-          </p:childTnLst>
-        </p:cTn>
-      </p:par>
-    </p:tnLst>
-  </p:timing>
-</p:sld>
-</file>
-
-<file path=ppt/slides/slide2.xml><?xml version="1.0" encoding="utf-8"?>
-<p:sld xmlns:a="http://schemas.openxmlformats.org/drawingml/2006/main" xmlns:r="http://schemas.openxmlformats.org/officeDocument/2006/relationships" xmlns:p="http://schemas.openxmlformats.org/presentationml/2006/main">
-  <p:cSld>
-    <p:spTree>
-      <p:nvGrpSpPr>
-        <p:cNvPr id="1" name=""/>
-        <p:cNvGrpSpPr/>
-        <p:nvPr/>
-      </p:nvGrpSpPr>
-      <p:grpSpPr>
-        <a:xfrm>
-          <a:off x="0" y="0"/>
-          <a:ext cx="0" cy="0"/>
-          <a:chOff x="0" y="0"/>
-          <a:chExt cx="0" cy="0"/>
-        </a:xfrm>
-      </p:grpSpPr>
-      <p:sp>
-        <p:nvSpPr>
-          <p:cNvPr id="3" name="Text Placeholder 2">
-            <a:extLst>
-              <a:ext uri="{FF2B5EF4-FFF2-40B4-BE49-F238E27FC236}">
-                <a16:creationId xmlns:a16="http://schemas.microsoft.com/office/drawing/2014/main" id="{BE03A285-4FAA-4FB7-87E0-09866E0974A5}"/>
-              </a:ext>
-            </a:extLst>
-          </p:cNvPr>
-          <p:cNvSpPr>
-            <a:spLocks noGrp="1"/>
-          </p:cNvSpPr>
-          <p:nvPr>
-            <p:ph type="body" sz="quarter" idx="13"/>
-          </p:nvPr>
-        </p:nvSpPr>
-        <p:spPr>
-          <a:xfrm>
-            <a:off x="381000" y="1384183"/>
-            <a:ext cx="9191820" cy="5207396"/>
-          </a:xfrm>
-        </p:spPr>
-        <p:txBody>
-          <a:bodyPr>
-            <a:noAutofit/>
-          </a:bodyPr>
-          <a:lstStyle/>
-          <a:p>
-            <a:r>
-              <a:rPr lang="bg-BG" sz="3400" dirty="0"/>
-              <a:t>Живот на променливите</a:t>
-            </a:r>
-          </a:p>
-          <a:p>
-            <a:r>
-              <a:rPr lang="bg-BG" sz="3400" dirty="0"/>
-              <a:t>Вложени</a:t>
-            </a:r>
-            <a:r>
-              <a:rPr lang="en-US" sz="3400" dirty="0"/>
-              <a:t> </a:t>
-            </a:r>
-            <a:r>
-              <a:rPr lang="bg-BG" sz="3400" dirty="0"/>
-              <a:t>условни конструкции</a:t>
-            </a:r>
-          </a:p>
-          <a:p>
-            <a:r>
-              <a:rPr lang="bg-BG" sz="3400" dirty="0"/>
-              <a:t>Логически оператори</a:t>
-            </a:r>
-          </a:p>
-          <a:p>
-            <a:r>
-              <a:rPr lang="bg-BG" sz="3400" dirty="0"/>
-              <a:t>Приоритет на условия</a:t>
-            </a:r>
-          </a:p>
-          <a:p>
-            <a:pPr marL="442912" lvl="1" indent="0">
-              <a:buNone/>
-            </a:pPr>
-            <a:endParaRPr lang="bg-BG" dirty="0"/>
-          </a:p>
-        </p:txBody>
-      </p:sp>
-      <p:sp>
-        <p:nvSpPr>
-          <p:cNvPr id="444418" name="Rectangle 2"/>
-          <p:cNvSpPr>
-            <a:spLocks noGrp="1" noChangeArrowheads="1"/>
-          </p:cNvSpPr>
-          <p:nvPr>
-            <p:ph type="title"/>
-          </p:nvPr>
-        </p:nvSpPr>
-        <p:spPr/>
-        <p:txBody>
-          <a:bodyPr>
-            <a:normAutofit/>
-          </a:bodyPr>
-          <a:lstStyle/>
-          <a:p>
-            <a:r>
-              <a:rPr lang="bg-BG" dirty="0"/>
-              <a:t>Съдържание</a:t>
-            </a:r>
-          </a:p>
-        </p:txBody>
-      </p:sp>
-      <p:sp>
-        <p:nvSpPr>
-          <p:cNvPr id="6" name="Slide Number">
-            <a:extLst>
-              <a:ext uri="{FF2B5EF4-FFF2-40B4-BE49-F238E27FC236}">
-                <a16:creationId xmlns:a16="http://schemas.microsoft.com/office/drawing/2014/main" id="{3286F22E-C3A1-4C4F-9115-DF31D8ACD16C}"/>
-              </a:ext>
-            </a:extLst>
-          </p:cNvPr>
-          <p:cNvSpPr txBox="1">
-            <a:spLocks/>
-          </p:cNvSpPr>
-          <p:nvPr/>
-        </p:nvSpPr>
-        <p:spPr>
-          <a:xfrm>
-            <a:off x="11753030" y="6507000"/>
-            <a:ext cx="367414" cy="297000"/>
-          </a:xfrm>
-          <a:prstGeom prst="rect">
-            <a:avLst/>
-          </a:prstGeom>
-        </p:spPr>
-        <p:txBody>
-          <a:bodyPr vert="horz" lIns="91440" tIns="45720" rIns="91440" bIns="45720" rtlCol="0" anchor="b"/>
-          <a:lstStyle>
-            <a:defPPr>
-              <a:defRPr lang="en-US"/>
-            </a:defPPr>
-            <a:lvl1pPr marL="0" algn="r" defTabSz="914400" rtl="0" eaLnBrk="1" latinLnBrk="0" hangingPunct="1">
-              <a:defRPr sz="1000" kern="1200">
-                <a:solidFill>
-                  <a:schemeClr val="tx1"/>
-                </a:solidFill>
-                <a:latin typeface="+mn-lt"/>
-                <a:ea typeface="+mn-ea"/>
-                <a:cs typeface="+mn-cs"/>
-              </a:defRPr>
-            </a:lvl1pPr>
-            <a:lvl2pPr marL="457200" algn="l" defTabSz="914400" rtl="0" eaLnBrk="1" latinLnBrk="0" hangingPunct="1">
-              <a:defRPr sz="1800" kern="1200">
-                <a:solidFill>
-                  <a:schemeClr val="tx1"/>
-                </a:solidFill>
-                <a:latin typeface="+mn-lt"/>
-                <a:ea typeface="+mn-ea"/>
-                <a:cs typeface="+mn-cs"/>
-              </a:defRPr>
-            </a:lvl2pPr>
-            <a:lvl3pPr marL="914400" algn="l" defTabSz="914400" rtl="0" eaLnBrk="1" latinLnBrk="0" hangingPunct="1">
-              <a:defRPr sz="1800" kern="1200">
-                <a:solidFill>
-                  <a:schemeClr val="tx1"/>
-                </a:solidFill>
-                <a:latin typeface="+mn-lt"/>
-                <a:ea typeface="+mn-ea"/>
-                <a:cs typeface="+mn-cs"/>
-              </a:defRPr>
-            </a:lvl3pPr>
-            <a:lvl4pPr marL="1371600" algn="l" defTabSz="914400" rtl="0" eaLnBrk="1" latinLnBrk="0" hangingPunct="1">
-              <a:defRPr sz="1800" kern="1200">
-                <a:solidFill>
-                  <a:schemeClr val="tx1"/>
-                </a:solidFill>
-                <a:latin typeface="+mn-lt"/>
-                <a:ea typeface="+mn-ea"/>
-                <a:cs typeface="+mn-cs"/>
-              </a:defRPr>
-            </a:lvl4pPr>
-            <a:lvl5pPr marL="1828800" algn="l" defTabSz="914400" rtl="0" eaLnBrk="1" latinLnBrk="0" hangingPunct="1">
-              <a:defRPr sz="1800" kern="1200">
-                <a:solidFill>
-                  <a:schemeClr val="tx1"/>
-                </a:solidFill>
-                <a:latin typeface="+mn-lt"/>
-                <a:ea typeface="+mn-ea"/>
-                <a:cs typeface="+mn-cs"/>
-              </a:defRPr>
-            </a:lvl5pPr>
-            <a:lvl6pPr marL="2286000" algn="l" defTabSz="914400" rtl="0" eaLnBrk="1" latinLnBrk="0" hangingPunct="1">
-              <a:defRPr sz="1800" kern="1200">
-                <a:solidFill>
-                  <a:schemeClr val="tx1"/>
-                </a:solidFill>
-                <a:latin typeface="+mn-lt"/>
-                <a:ea typeface="+mn-ea"/>
-                <a:cs typeface="+mn-cs"/>
-              </a:defRPr>
-            </a:lvl6pPr>
-            <a:lvl7pPr marL="2743200" algn="l" defTabSz="914400" rtl="0" eaLnBrk="1" latinLnBrk="0" hangingPunct="1">
-              <a:defRPr sz="1800" kern="1200">
-                <a:solidFill>
-                  <a:schemeClr val="tx1"/>
-                </a:solidFill>
-                <a:latin typeface="+mn-lt"/>
-                <a:ea typeface="+mn-ea"/>
-                <a:cs typeface="+mn-cs"/>
-              </a:defRPr>
-            </a:lvl7pPr>
-            <a:lvl8pPr marL="3200400" algn="l" defTabSz="914400" rtl="0" eaLnBrk="1" latinLnBrk="0" hangingPunct="1">
-              <a:defRPr sz="1800" kern="1200">
-                <a:solidFill>
-                  <a:schemeClr val="tx1"/>
-                </a:solidFill>
-                <a:latin typeface="+mn-lt"/>
-                <a:ea typeface="+mn-ea"/>
-                <a:cs typeface="+mn-cs"/>
-              </a:defRPr>
-            </a:lvl8pPr>
-            <a:lvl9pPr marL="3657600" algn="l" defTabSz="914400" rtl="0" eaLnBrk="1" latinLnBrk="0" hangingPunct="1">
-              <a:defRPr sz="1800" kern="1200">
-                <a:solidFill>
-                  <a:schemeClr val="tx1"/>
-                </a:solidFill>
-                <a:latin typeface="+mn-lt"/>
-                <a:ea typeface="+mn-ea"/>
-                <a:cs typeface="+mn-cs"/>
-              </a:defRPr>
-            </a:lvl9pPr>
-          </a:lstStyle>
-          <a:p>
-            <a:fld id="{2BF067CD-8E6B-4360-9AA8-C5DF2A48A6D1}" type="slidenum">
-              <a:rPr lang="en-US" smtClean="0"/>
-              <a:pPr/>
-              <a:t>2</a:t>
-            </a:fld>
-            <a:endParaRPr lang="en-US" dirty="0"/>
-          </a:p>
-        </p:txBody>
-      </p:sp>
-    </p:spTree>
-    <p:extLst>
-      <p:ext uri="{BB962C8B-B14F-4D97-AF65-F5344CB8AC3E}">
-        <p14:creationId xmlns:p14="http://schemas.microsoft.com/office/powerpoint/2010/main" val="1119166992"/>
-      </p:ext>
-    </p:extLst>
-  </p:cSld>
-  <p:clrMapOvr>
-    <a:masterClrMapping/>
-  </p:clrMapOvr>
-  <mc:AlternateContent xmlns:mc="http://schemas.openxmlformats.org/markup-compatibility/2006" xmlns:p14="http://schemas.microsoft.com/office/powerpoint/2010/main">
-    <mc:Choice Requires="p14">
-      <p:transition p14:dur="0" advClick="0" advTm="5000"/>
-    </mc:Choice>
-    <mc:Fallback xmlns="">
-      <p:transition advClick="0" advTm="5000"/>
-    </mc:Fallback>
-  </mc:AlternateContent>
-  <p:timing>
-    <p:tnLst>
-      <p:par>
-        <p:cTn id="1" dur="indefinite" restart="never" nodeType="tmRoot">
-          <p:childTnLst>
-            <p:seq concurrent="1" nextAc="seek">
-              <p:cTn id="2" dur="indefinite" nodeType="mainSeq">
-                <p:childTnLst>
-                  <p:par>
-                    <p:cTn id="3" fill="hold">
-                      <p:stCondLst>
-                        <p:cond delay="indefinite"/>
-                      </p:stCondLst>
-                      <p:childTnLst>
-                        <p:par>
-                          <p:cTn id="4" fill="hold">
-                            <p:stCondLst>
-                              <p:cond delay="0"/>
-                            </p:stCondLst>
-                            <p:childTnLst>
-                              <p:par>
-                                <p:cTn id="5" presetID="1" presetClass="entr" presetSubtype="0" fill="hold" nodeType="clickEffect">
-                                  <p:stCondLst>
-                                    <p:cond delay="0"/>
-                                  </p:stCondLst>
-                                  <p:childTnLst>
-                                    <p:set>
-                                      <p:cBhvr>
-                                        <p:cTn id="6" dur="1" fill="hold">
-                                          <p:stCondLst>
-                                            <p:cond delay="0"/>
-                                          </p:stCondLst>
-                                        </p:cTn>
-                                        <p:tgtEl>
-                                          <p:spTgt spid="3">
-                                            <p:txEl>
-                                              <p:pRg st="1" end="1"/>
-                                            </p:txEl>
-                                          </p:spTgt>
-                                        </p:tgtEl>
-                                        <p:attrNameLst>
-                                          <p:attrName>style.visibility</p:attrName>
-                                        </p:attrNameLst>
-                                      </p:cBhvr>
-                                      <p:to>
-                                        <p:strVal val="visible"/>
-                                      </p:to>
-                                    </p:set>
-                                  </p:childTnLst>
-                                </p:cTn>
-                              </p:par>
-                            </p:childTnLst>
-                          </p:cTn>
-                        </p:par>
-                      </p:childTnLst>
-                    </p:cTn>
-                  </p:par>
-                  <p:par>
-                    <p:cTn id="7" fill="hold">
-                      <p:stCondLst>
-                        <p:cond delay="indefinite"/>
-                      </p:stCondLst>
-                      <p:childTnLst>
-                        <p:par>
-                          <p:cTn id="8" fill="hold">
-                            <p:stCondLst>
-                              <p:cond delay="0"/>
-                            </p:stCondLst>
-                            <p:childTnLst>
-                              <p:par>
-                                <p:cTn id="9" presetID="1" presetClass="entr" presetSubtype="0" fill="hold" nodeType="clickEffect">
-                                  <p:stCondLst>
-                                    <p:cond delay="0"/>
-                                  </p:stCondLst>
-                                  <p:childTnLst>
-                                    <p:set>
-                                      <p:cBhvr>
-                                        <p:cTn id="10" dur="1" fill="hold">
-                                          <p:stCondLst>
-                                            <p:cond delay="0"/>
-                                          </p:stCondLst>
-                                        </p:cTn>
-                                        <p:tgtEl>
-                                          <p:spTgt spid="3">
-                                            <p:txEl>
-                                              <p:pRg st="2" end="2"/>
-                                            </p:txEl>
-                                          </p:spTgt>
-                                        </p:tgtEl>
-                                        <p:attrNameLst>
-                                          <p:attrName>style.visibility</p:attrName>
-                                        </p:attrNameLst>
-                                      </p:cBhvr>
-                                      <p:to>
-                                        <p:strVal val="visible"/>
-                                      </p:to>
-                                    </p:set>
-                                  </p:childTnLst>
-                                </p:cTn>
-                              </p:par>
-                            </p:childTnLst>
-                          </p:cTn>
-                        </p:par>
-                      </p:childTnLst>
-                    </p:cTn>
-                  </p:par>
-                  <p:par>
-                    <p:cTn id="11" fill="hold">
-                      <p:stCondLst>
-                        <p:cond delay="indefinite"/>
-                      </p:stCondLst>
-                      <p:childTnLst>
-                        <p:par>
-                          <p:cTn id="12" fill="hold">
-                            <p:stCondLst>
-                              <p:cond delay="0"/>
-                            </p:stCondLst>
-                            <p:childTnLst>
-                              <p:par>
-                                <p:cTn id="13" presetID="1" presetClass="entr" presetSubtype="0" fill="hold" nodeType="clickEffect">
-                                  <p:stCondLst>
-                                    <p:cond delay="0"/>
-                                  </p:stCondLst>
-                                  <p:childTnLst>
-                                    <p:set>
-                                      <p:cBhvr>
-                                        <p:cTn id="14" dur="1" fill="hold">
-                                          <p:stCondLst>
-                                            <p:cond delay="0"/>
-                                          </p:stCondLst>
-                                        </p:cTn>
-                                        <p:tgtEl>
-                                          <p:spTgt spid="3">
-                                            <p:txEl>
-                                              <p:pRg st="3" end="3"/>
-                                            </p:txEl>
-                                          </p:spTgt>
-                                        </p:tgtEl>
-                                        <p:attrNameLst>
-                                          <p:attrName>style.visibility</p:attrName>
-                                        </p:attrNameLst>
-                                      </p:cBhvr>
-                                      <p:to>
-                                        <p:strVal val="visible"/>
-                                      </p:to>
-                                    </p:set>
-                                  </p:childTnLst>
-                                </p:cTn>
-                              </p:par>
-                            </p:childTnLst>
-                          </p:cTn>
-                        </p:par>
-                      </p:childTnLst>
-                    </p:cTn>
-                  </p:par>
-                </p:childTnLst>
-              </p:cTn>
-              <p:prevCondLst>
-                <p:cond evt="onPrev" delay="0">
-                  <p:tgtEl>
-                    <p:sldTgt/>
-                  </p:tgtEl>
-                </p:cond>
-              </p:prevCondLst>
-              <p:nextCondLst>
-                <p:cond evt="onNext" delay="0">
-                  <p:tgtEl>
-                    <p:sldTgt/>
-                  </p:tgtEl>
-                </p:cond>
-              </p:nextCondLst>
-            </p:seq>
-          </p:childTnLst>
-        </p:cTn>
-      </p:par>
-    </p:tnLst>
-  </p:timing>
-</p:sld>
-</file>
-
-<file path=ppt/slides/slide20.xml><?xml version="1.0" encoding="utf-8"?>
-<p:sld xmlns:a="http://schemas.openxmlformats.org/drawingml/2006/main" xmlns:r="http://schemas.openxmlformats.org/officeDocument/2006/relationships" xmlns:p="http://schemas.openxmlformats.org/presentationml/2006/main">
-  <p:cSld>
-    <p:spTree>
-      <p:nvGrpSpPr>
-        <p:cNvPr id="1" name=""/>
-        <p:cNvGrpSpPr/>
-        <p:nvPr/>
-      </p:nvGrpSpPr>
-      <p:grpSpPr>
-        <a:xfrm>
-          <a:off x="0" y="0"/>
-          <a:ext cx="0" cy="0"/>
-          <a:chOff x="0" y="0"/>
-          <a:chExt cx="0" cy="0"/>
-        </a:xfrm>
-      </p:grpSpPr>
-      <p:sp>
-        <p:nvSpPr>
-          <p:cNvPr id="3" name="Content Placeholder 2"/>
-          <p:cNvSpPr>
-            <a:spLocks noGrp="1"/>
-          </p:cNvSpPr>
-          <p:nvPr>
-            <p:ph type="body" sz="quarter" idx="10"/>
-          </p:nvPr>
-        </p:nvSpPr>
         <p:spPr>
           <a:xfrm>
             <a:off x="193481" y="1196706"/>
@@ -21168,7 +18712,7 @@
             <a:fld id="{2BF067CD-8E6B-4360-9AA8-C5DF2A48A6D1}" type="slidenum">
               <a:rPr lang="en-US" noProof="0" smtClean="0"/>
               <a:pPr/>
-              <a:t>20</a:t>
+              <a:t>18</a:t>
             </a:fld>
             <a:endParaRPr lang="en-US" noProof="0" dirty="0"/>
           </a:p>
@@ -21353,7 +18897,7 @@
 </p:sld>
 </file>
 
-<file path=ppt/slides/slide21.xml><?xml version="1.0" encoding="utf-8"?>
+<file path=ppt/slides/slide19.xml><?xml version="1.0" encoding="utf-8"?>
 <p:sld xmlns:a="http://schemas.openxmlformats.org/drawingml/2006/main" xmlns:r="http://schemas.openxmlformats.org/officeDocument/2006/relationships" xmlns:p="http://schemas.openxmlformats.org/presentationml/2006/main">
   <p:cSld>
     <p:spTree>
@@ -21924,7 +19468,7 @@
             <a:fld id="{2BF067CD-8E6B-4360-9AA8-C5DF2A48A6D1}" type="slidenum">
               <a:rPr lang="en-US" smtClean="0"/>
               <a:pPr/>
-              <a:t>21</a:t>
+              <a:t>19</a:t>
             </a:fld>
             <a:endParaRPr lang="en-US" dirty="0"/>
           </a:p>
@@ -22223,7 +19767,443 @@
 </p:sld>
 </file>
 
-<file path=ppt/slides/slide22.xml><?xml version="1.0" encoding="utf-8"?>
+<file path=ppt/slides/slide2.xml><?xml version="1.0" encoding="utf-8"?>
+<p:sld xmlns:a="http://schemas.openxmlformats.org/drawingml/2006/main" xmlns:r="http://schemas.openxmlformats.org/officeDocument/2006/relationships" xmlns:p="http://schemas.openxmlformats.org/presentationml/2006/main">
+  <p:cSld>
+    <p:spTree>
+      <p:nvGrpSpPr>
+        <p:cNvPr id="1" name=""/>
+        <p:cNvGrpSpPr/>
+        <p:nvPr/>
+      </p:nvGrpSpPr>
+      <p:grpSpPr>
+        <a:xfrm>
+          <a:off x="0" y="0"/>
+          <a:ext cx="0" cy="0"/>
+          <a:chOff x="0" y="0"/>
+          <a:chExt cx="0" cy="0"/>
+        </a:xfrm>
+      </p:grpSpPr>
+      <p:sp>
+        <p:nvSpPr>
+          <p:cNvPr id="3" name="Text Placeholder 2">
+            <a:extLst>
+              <a:ext uri="{FF2B5EF4-FFF2-40B4-BE49-F238E27FC236}">
+                <a16:creationId xmlns:a16="http://schemas.microsoft.com/office/drawing/2014/main" id="{BE03A285-4FAA-4FB7-87E0-09866E0974A5}"/>
+              </a:ext>
+            </a:extLst>
+          </p:cNvPr>
+          <p:cNvSpPr>
+            <a:spLocks noGrp="1"/>
+          </p:cNvSpPr>
+          <p:nvPr>
+            <p:ph type="body" sz="quarter" idx="13"/>
+          </p:nvPr>
+        </p:nvSpPr>
+        <p:spPr>
+          <a:xfrm>
+            <a:off x="381000" y="1384183"/>
+            <a:ext cx="9191820" cy="5207396"/>
+          </a:xfrm>
+        </p:spPr>
+        <p:txBody>
+          <a:bodyPr>
+            <a:noAutofit/>
+          </a:bodyPr>
+          <a:lstStyle/>
+          <a:p>
+            <a:r>
+              <a:rPr lang="bg-BG" sz="3400" dirty="0"/>
+              <a:t>Живот на променливите</a:t>
+            </a:r>
+          </a:p>
+          <a:p>
+            <a:r>
+              <a:rPr lang="bg-BG" sz="3400" dirty="0"/>
+              <a:t>Вложени</a:t>
+            </a:r>
+            <a:r>
+              <a:rPr lang="en-US" sz="3400" dirty="0"/>
+              <a:t> </a:t>
+            </a:r>
+            <a:r>
+              <a:rPr lang="bg-BG" sz="3400" dirty="0"/>
+              <a:t>условни конструкции</a:t>
+            </a:r>
+          </a:p>
+          <a:p>
+            <a:r>
+              <a:rPr lang="bg-BG" sz="3400" dirty="0"/>
+              <a:t>Логически оператори</a:t>
+            </a:r>
+          </a:p>
+          <a:p>
+            <a:r>
+              <a:rPr lang="bg-BG" sz="3400" dirty="0"/>
+              <a:t>Приоритет на условия</a:t>
+            </a:r>
+          </a:p>
+          <a:p>
+            <a:pPr marL="442912" lvl="1" indent="0">
+              <a:buNone/>
+            </a:pPr>
+            <a:endParaRPr lang="bg-BG" dirty="0"/>
+          </a:p>
+        </p:txBody>
+      </p:sp>
+      <p:sp>
+        <p:nvSpPr>
+          <p:cNvPr id="444418" name="Rectangle 2"/>
+          <p:cNvSpPr>
+            <a:spLocks noGrp="1" noChangeArrowheads="1"/>
+          </p:cNvSpPr>
+          <p:nvPr>
+            <p:ph type="title"/>
+          </p:nvPr>
+        </p:nvSpPr>
+        <p:spPr/>
+        <p:txBody>
+          <a:bodyPr>
+            <a:normAutofit/>
+          </a:bodyPr>
+          <a:lstStyle/>
+          <a:p>
+            <a:r>
+              <a:rPr lang="bg-BG" dirty="0"/>
+              <a:t>Съдържание</a:t>
+            </a:r>
+          </a:p>
+        </p:txBody>
+      </p:sp>
+      <p:sp>
+        <p:nvSpPr>
+          <p:cNvPr id="6" name="Slide Number">
+            <a:extLst>
+              <a:ext uri="{FF2B5EF4-FFF2-40B4-BE49-F238E27FC236}">
+                <a16:creationId xmlns:a16="http://schemas.microsoft.com/office/drawing/2014/main" id="{3286F22E-C3A1-4C4F-9115-DF31D8ACD16C}"/>
+              </a:ext>
+            </a:extLst>
+          </p:cNvPr>
+          <p:cNvSpPr txBox="1">
+            <a:spLocks/>
+          </p:cNvSpPr>
+          <p:nvPr/>
+        </p:nvSpPr>
+        <p:spPr>
+          <a:xfrm>
+            <a:off x="11753030" y="6507000"/>
+            <a:ext cx="367414" cy="297000"/>
+          </a:xfrm>
+          <a:prstGeom prst="rect">
+            <a:avLst/>
+          </a:prstGeom>
+        </p:spPr>
+        <p:txBody>
+          <a:bodyPr vert="horz" lIns="91440" tIns="45720" rIns="91440" bIns="45720" rtlCol="0" anchor="b"/>
+          <a:lstStyle>
+            <a:defPPr>
+              <a:defRPr lang="en-US"/>
+            </a:defPPr>
+            <a:lvl1pPr marL="0" algn="r" defTabSz="914400" rtl="0" eaLnBrk="1" latinLnBrk="0" hangingPunct="1">
+              <a:defRPr sz="1000" kern="1200">
+                <a:solidFill>
+                  <a:schemeClr val="tx1"/>
+                </a:solidFill>
+                <a:latin typeface="+mn-lt"/>
+                <a:ea typeface="+mn-ea"/>
+                <a:cs typeface="+mn-cs"/>
+              </a:defRPr>
+            </a:lvl1pPr>
+            <a:lvl2pPr marL="457200" algn="l" defTabSz="914400" rtl="0" eaLnBrk="1" latinLnBrk="0" hangingPunct="1">
+              <a:defRPr sz="1800" kern="1200">
+                <a:solidFill>
+                  <a:schemeClr val="tx1"/>
+                </a:solidFill>
+                <a:latin typeface="+mn-lt"/>
+                <a:ea typeface="+mn-ea"/>
+                <a:cs typeface="+mn-cs"/>
+              </a:defRPr>
+            </a:lvl2pPr>
+            <a:lvl3pPr marL="914400" algn="l" defTabSz="914400" rtl="0" eaLnBrk="1" latinLnBrk="0" hangingPunct="1">
+              <a:defRPr sz="1800" kern="1200">
+                <a:solidFill>
+                  <a:schemeClr val="tx1"/>
+                </a:solidFill>
+                <a:latin typeface="+mn-lt"/>
+                <a:ea typeface="+mn-ea"/>
+                <a:cs typeface="+mn-cs"/>
+              </a:defRPr>
+            </a:lvl3pPr>
+            <a:lvl4pPr marL="1371600" algn="l" defTabSz="914400" rtl="0" eaLnBrk="1" latinLnBrk="0" hangingPunct="1">
+              <a:defRPr sz="1800" kern="1200">
+                <a:solidFill>
+                  <a:schemeClr val="tx1"/>
+                </a:solidFill>
+                <a:latin typeface="+mn-lt"/>
+                <a:ea typeface="+mn-ea"/>
+                <a:cs typeface="+mn-cs"/>
+              </a:defRPr>
+            </a:lvl4pPr>
+            <a:lvl5pPr marL="1828800" algn="l" defTabSz="914400" rtl="0" eaLnBrk="1" latinLnBrk="0" hangingPunct="1">
+              <a:defRPr sz="1800" kern="1200">
+                <a:solidFill>
+                  <a:schemeClr val="tx1"/>
+                </a:solidFill>
+                <a:latin typeface="+mn-lt"/>
+                <a:ea typeface="+mn-ea"/>
+                <a:cs typeface="+mn-cs"/>
+              </a:defRPr>
+            </a:lvl5pPr>
+            <a:lvl6pPr marL="2286000" algn="l" defTabSz="914400" rtl="0" eaLnBrk="1" latinLnBrk="0" hangingPunct="1">
+              <a:defRPr sz="1800" kern="1200">
+                <a:solidFill>
+                  <a:schemeClr val="tx1"/>
+                </a:solidFill>
+                <a:latin typeface="+mn-lt"/>
+                <a:ea typeface="+mn-ea"/>
+                <a:cs typeface="+mn-cs"/>
+              </a:defRPr>
+            </a:lvl6pPr>
+            <a:lvl7pPr marL="2743200" algn="l" defTabSz="914400" rtl="0" eaLnBrk="1" latinLnBrk="0" hangingPunct="1">
+              <a:defRPr sz="1800" kern="1200">
+                <a:solidFill>
+                  <a:schemeClr val="tx1"/>
+                </a:solidFill>
+                <a:latin typeface="+mn-lt"/>
+                <a:ea typeface="+mn-ea"/>
+                <a:cs typeface="+mn-cs"/>
+              </a:defRPr>
+            </a:lvl7pPr>
+            <a:lvl8pPr marL="3200400" algn="l" defTabSz="914400" rtl="0" eaLnBrk="1" latinLnBrk="0" hangingPunct="1">
+              <a:defRPr sz="1800" kern="1200">
+                <a:solidFill>
+                  <a:schemeClr val="tx1"/>
+                </a:solidFill>
+                <a:latin typeface="+mn-lt"/>
+                <a:ea typeface="+mn-ea"/>
+                <a:cs typeface="+mn-cs"/>
+              </a:defRPr>
+            </a:lvl8pPr>
+            <a:lvl9pPr marL="3657600" algn="l" defTabSz="914400" rtl="0" eaLnBrk="1" latinLnBrk="0" hangingPunct="1">
+              <a:defRPr sz="1800" kern="1200">
+                <a:solidFill>
+                  <a:schemeClr val="tx1"/>
+                </a:solidFill>
+                <a:latin typeface="+mn-lt"/>
+                <a:ea typeface="+mn-ea"/>
+                <a:cs typeface="+mn-cs"/>
+              </a:defRPr>
+            </a:lvl9pPr>
+          </a:lstStyle>
+          <a:p>
+            <a:fld id="{2BF067CD-8E6B-4360-9AA8-C5DF2A48A6D1}" type="slidenum">
+              <a:rPr lang="en-US" smtClean="0"/>
+              <a:pPr/>
+              <a:t>2</a:t>
+            </a:fld>
+            <a:endParaRPr lang="en-US" dirty="0"/>
+          </a:p>
+        </p:txBody>
+      </p:sp>
+    </p:spTree>
+    <p:extLst>
+      <p:ext uri="{BB962C8B-B14F-4D97-AF65-F5344CB8AC3E}">
+        <p14:creationId xmlns:p14="http://schemas.microsoft.com/office/powerpoint/2010/main" val="1119166992"/>
+      </p:ext>
+    </p:extLst>
+  </p:cSld>
+  <p:clrMapOvr>
+    <a:masterClrMapping/>
+  </p:clrMapOvr>
+  <mc:AlternateContent xmlns:mc="http://schemas.openxmlformats.org/markup-compatibility/2006" xmlns:p14="http://schemas.microsoft.com/office/powerpoint/2010/main">
+    <mc:Choice Requires="p14">
+      <p:transition p14:dur="0" advClick="0" advTm="5000"/>
+    </mc:Choice>
+    <mc:Fallback xmlns="">
+      <p:transition advClick="0" advTm="5000"/>
+    </mc:Fallback>
+  </mc:AlternateContent>
+  <p:timing>
+    <p:tnLst>
+      <p:par>
+        <p:cTn id="1" dur="indefinite" restart="never" nodeType="tmRoot">
+          <p:childTnLst>
+            <p:seq concurrent="1" nextAc="seek">
+              <p:cTn id="2" dur="indefinite" nodeType="mainSeq">
+                <p:childTnLst>
+                  <p:par>
+                    <p:cTn id="3" fill="hold">
+                      <p:stCondLst>
+                        <p:cond delay="indefinite"/>
+                      </p:stCondLst>
+                      <p:childTnLst>
+                        <p:par>
+                          <p:cTn id="4" fill="hold">
+                            <p:stCondLst>
+                              <p:cond delay="0"/>
+                            </p:stCondLst>
+                            <p:childTnLst>
+                              <p:par>
+                                <p:cTn id="5" presetID="1" presetClass="entr" presetSubtype="0" fill="hold" nodeType="clickEffect">
+                                  <p:stCondLst>
+                                    <p:cond delay="0"/>
+                                  </p:stCondLst>
+                                  <p:childTnLst>
+                                    <p:set>
+                                      <p:cBhvr>
+                                        <p:cTn id="6" dur="1" fill="hold">
+                                          <p:stCondLst>
+                                            <p:cond delay="0"/>
+                                          </p:stCondLst>
+                                        </p:cTn>
+                                        <p:tgtEl>
+                                          <p:spTgt spid="3">
+                                            <p:txEl>
+                                              <p:pRg st="1" end="1"/>
+                                            </p:txEl>
+                                          </p:spTgt>
+                                        </p:tgtEl>
+                                        <p:attrNameLst>
+                                          <p:attrName>style.visibility</p:attrName>
+                                        </p:attrNameLst>
+                                      </p:cBhvr>
+                                      <p:to>
+                                        <p:strVal val="visible"/>
+                                      </p:to>
+                                    </p:set>
+                                  </p:childTnLst>
+                                </p:cTn>
+                              </p:par>
+                            </p:childTnLst>
+                          </p:cTn>
+                        </p:par>
+                      </p:childTnLst>
+                    </p:cTn>
+                  </p:par>
+                  <p:par>
+                    <p:cTn id="7" fill="hold">
+                      <p:stCondLst>
+                        <p:cond delay="indefinite"/>
+                      </p:stCondLst>
+                      <p:childTnLst>
+                        <p:par>
+                          <p:cTn id="8" fill="hold">
+                            <p:stCondLst>
+                              <p:cond delay="0"/>
+                            </p:stCondLst>
+                            <p:childTnLst>
+                              <p:par>
+                                <p:cTn id="9" presetID="1" presetClass="entr" presetSubtype="0" fill="hold" nodeType="clickEffect">
+                                  <p:stCondLst>
+                                    <p:cond delay="0"/>
+                                  </p:stCondLst>
+                                  <p:childTnLst>
+                                    <p:set>
+                                      <p:cBhvr>
+                                        <p:cTn id="10" dur="1" fill="hold">
+                                          <p:stCondLst>
+                                            <p:cond delay="0"/>
+                                          </p:stCondLst>
+                                        </p:cTn>
+                                        <p:tgtEl>
+                                          <p:spTgt spid="3">
+                                            <p:txEl>
+                                              <p:pRg st="2" end="2"/>
+                                            </p:txEl>
+                                          </p:spTgt>
+                                        </p:tgtEl>
+                                        <p:attrNameLst>
+                                          <p:attrName>style.visibility</p:attrName>
+                                        </p:attrNameLst>
+                                      </p:cBhvr>
+                                      <p:to>
+                                        <p:strVal val="visible"/>
+                                      </p:to>
+                                    </p:set>
+                                  </p:childTnLst>
+                                </p:cTn>
+                              </p:par>
+                            </p:childTnLst>
+                          </p:cTn>
+                        </p:par>
+                      </p:childTnLst>
+                    </p:cTn>
+                  </p:par>
+                  <p:par>
+                    <p:cTn id="11" fill="hold">
+                      <p:stCondLst>
+                        <p:cond delay="indefinite"/>
+                      </p:stCondLst>
+                      <p:childTnLst>
+                        <p:par>
+                          <p:cTn id="12" fill="hold">
+                            <p:stCondLst>
+                              <p:cond delay="0"/>
+                            </p:stCondLst>
+                            <p:childTnLst>
+                              <p:par>
+                                <p:cTn id="13" presetID="1" presetClass="entr" presetSubtype="0" fill="hold" nodeType="clickEffect">
+                                  <p:stCondLst>
+                                    <p:cond delay="0"/>
+                                  </p:stCondLst>
+                                  <p:childTnLst>
+                                    <p:set>
+                                      <p:cBhvr>
+                                        <p:cTn id="14" dur="1" fill="hold">
+                                          <p:stCondLst>
+                                            <p:cond delay="0"/>
+                                          </p:stCondLst>
+                                        </p:cTn>
+                                        <p:tgtEl>
+                                          <p:spTgt spid="3">
+                                            <p:txEl>
+                                              <p:pRg st="3" end="3"/>
+                                            </p:txEl>
+                                          </p:spTgt>
+                                        </p:tgtEl>
+                                        <p:attrNameLst>
+                                          <p:attrName>style.visibility</p:attrName>
+                                        </p:attrNameLst>
+                                      </p:cBhvr>
+                                      <p:to>
+                                        <p:strVal val="visible"/>
+                                      </p:to>
+                                    </p:set>
+                                  </p:childTnLst>
+                                </p:cTn>
+                              </p:par>
+                            </p:childTnLst>
+                          </p:cTn>
+                        </p:par>
+                      </p:childTnLst>
+                    </p:cTn>
+                  </p:par>
+                </p:childTnLst>
+              </p:cTn>
+              <p:prevCondLst>
+                <p:cond evt="onPrev" delay="0">
+                  <p:tgtEl>
+                    <p:sldTgt/>
+                  </p:tgtEl>
+                </p:cond>
+              </p:prevCondLst>
+              <p:nextCondLst>
+                <p:cond evt="onNext" delay="0">
+                  <p:tgtEl>
+                    <p:sldTgt/>
+                  </p:tgtEl>
+                </p:cond>
+              </p:nextCondLst>
+            </p:seq>
+          </p:childTnLst>
+        </p:cTn>
+      </p:par>
+    </p:tnLst>
+  </p:timing>
+</p:sld>
+</file>
+
+<file path=ppt/slides/slide20.xml><?xml version="1.0" encoding="utf-8"?>
 <p:sld xmlns:a="http://schemas.openxmlformats.org/drawingml/2006/main" xmlns:r="http://schemas.openxmlformats.org/officeDocument/2006/relationships" xmlns:p="http://schemas.openxmlformats.org/presentationml/2006/main">
   <p:cSld>
     <p:spTree>
@@ -24143,7 +22123,7 @@
             <a:fld id="{2BF067CD-8E6B-4360-9AA8-C5DF2A48A6D1}" type="slidenum">
               <a:rPr lang="en-US" noProof="0" smtClean="0"/>
               <a:pPr/>
-              <a:t>22</a:t>
+              <a:t>20</a:t>
             </a:fld>
             <a:endParaRPr lang="en-US" noProof="0" dirty="0"/>
           </a:p>
@@ -24397,7 +22377,7 @@
 </p:sld>
 </file>
 
-<file path=ppt/slides/slide23.xml><?xml version="1.0" encoding="utf-8"?>
+<file path=ppt/slides/slide21.xml><?xml version="1.0" encoding="utf-8"?>
 <p:sld xmlns:a="http://schemas.openxmlformats.org/drawingml/2006/main" xmlns:r="http://schemas.openxmlformats.org/officeDocument/2006/relationships" xmlns:p="http://schemas.openxmlformats.org/presentationml/2006/main">
   <p:cSld>
     <p:spTree>
@@ -24944,7 +22924,7 @@
                 </a:solidFill>
                 <a:hlinkClick r:id="rId2"/>
               </a:rPr>
-              <a:t>https://judge.softuni.org/Contests/Practice/Index/3896#4</a:t>
+              <a:t>https://judge.softuni.org/Contests/Practice/Index/3896#2</a:t>
             </a:r>
             <a:endParaRPr lang="en-US" sz="1999" u="sng" dirty="0">
               <a:solidFill>
@@ -24990,7 +22970,7 @@
             <a:fld id="{2BF067CD-8E6B-4360-9AA8-C5DF2A48A6D1}" type="slidenum">
               <a:rPr lang="en-US" noProof="0" smtClean="0"/>
               <a:pPr/>
-              <a:t>23</a:t>
+              <a:t>21</a:t>
             </a:fld>
             <a:endParaRPr lang="en-US" noProof="0" dirty="0"/>
           </a:p>
@@ -25416,7 +23396,7 @@
 </p:sld>
 </file>
 
-<file path=ppt/slides/slide24.xml><?xml version="1.0" encoding="utf-8"?>
+<file path=ppt/slides/slide22.xml><?xml version="1.0" encoding="utf-8"?>
 <p:sld xmlns:a="http://schemas.openxmlformats.org/drawingml/2006/main" xmlns:r="http://schemas.openxmlformats.org/officeDocument/2006/relationships" xmlns:p="http://schemas.openxmlformats.org/presentationml/2006/main">
   <p:cSld>
     <p:spTree>
@@ -25819,7 +23799,7 @@
             <a:fld id="{2BF067CD-8E6B-4360-9AA8-C5DF2A48A6D1}" type="slidenum">
               <a:rPr lang="en-US" noProof="0" smtClean="0"/>
               <a:pPr/>
-              <a:t>24</a:t>
+              <a:t>22</a:t>
             </a:fld>
             <a:endParaRPr lang="en-US" noProof="0" dirty="0"/>
           </a:p>
@@ -26004,7 +23984,7 @@
 </p:sld>
 </file>
 
-<file path=ppt/slides/slide25.xml><?xml version="1.0" encoding="utf-8"?>
+<file path=ppt/slides/slide23.xml><?xml version="1.0" encoding="utf-8"?>
 <p:sld xmlns:a="http://schemas.openxmlformats.org/drawingml/2006/main" xmlns:r="http://schemas.openxmlformats.org/officeDocument/2006/relationships" xmlns:p="http://schemas.openxmlformats.org/presentationml/2006/main">
   <p:cSld>
     <p:spTree>
@@ -26622,7 +24602,7 @@
             <a:fld id="{2BF067CD-8E6B-4360-9AA8-C5DF2A48A6D1}" type="slidenum">
               <a:rPr lang="en-US" noProof="0" smtClean="0"/>
               <a:pPr/>
-              <a:t>25</a:t>
+              <a:t>23</a:t>
             </a:fld>
             <a:endParaRPr lang="en-US" noProof="0" dirty="0"/>
           </a:p>
@@ -26898,7 +24878,7 @@
 </p:sld>
 </file>
 
-<file path=ppt/slides/slide26.xml><?xml version="1.0" encoding="utf-8"?>
+<file path=ppt/slides/slide24.xml><?xml version="1.0" encoding="utf-8"?>
 <p:sld xmlns:a="http://schemas.openxmlformats.org/drawingml/2006/main" xmlns:r="http://schemas.openxmlformats.org/officeDocument/2006/relationships" xmlns:p="http://schemas.openxmlformats.org/presentationml/2006/main">
   <p:cSld>
     <p:spTree>
@@ -27226,7 +25206,7 @@
                 </a:solidFill>
                 <a:hlinkClick r:id="rId2"/>
               </a:rPr>
-              <a:t>https://judge.softuni.org/Contests/Practice/Index/3896#5</a:t>
+              <a:t>https://judge.softuni.org/Contests/Practice/Index/3896#3</a:t>
             </a:r>
             <a:endParaRPr lang="en-US" sz="1999" u="sng" dirty="0">
               <a:solidFill>
@@ -27272,7 +25252,7 @@
             <a:fld id="{2BF067CD-8E6B-4360-9AA8-C5DF2A48A6D1}" type="slidenum">
               <a:rPr lang="en-US" noProof="0" smtClean="0"/>
               <a:pPr/>
-              <a:t>26</a:t>
+              <a:t>24</a:t>
             </a:fld>
             <a:endParaRPr lang="en-US" noProof="0" dirty="0"/>
           </a:p>
@@ -27489,7 +25469,7 @@
 </p:sld>
 </file>
 
-<file path=ppt/slides/slide27.xml><?xml version="1.0" encoding="utf-8"?>
+<file path=ppt/slides/slide25.xml><?xml version="1.0" encoding="utf-8"?>
 <p:sld xmlns:a="http://schemas.openxmlformats.org/drawingml/2006/main" xmlns:r="http://schemas.openxmlformats.org/officeDocument/2006/relationships" xmlns:p="http://schemas.openxmlformats.org/presentationml/2006/main">
   <p:cSld>
     <p:spTree>
@@ -27596,7 +25576,7 @@
 </p:sld>
 </file>
 
-<file path=ppt/slides/slide28.xml><?xml version="1.0" encoding="utf-8"?>
+<file path=ppt/slides/slide26.xml><?xml version="1.0" encoding="utf-8"?>
 <p:sld xmlns:a="http://schemas.openxmlformats.org/drawingml/2006/main" xmlns:r="http://schemas.openxmlformats.org/officeDocument/2006/relationships" xmlns:p="http://schemas.openxmlformats.org/presentationml/2006/main">
   <p:cSld>
     <p:spTree>
@@ -28147,7 +26127,7 @@
             <a:fld id="{2BF067CD-8E6B-4360-9AA8-C5DF2A48A6D1}" type="slidenum">
               <a:rPr lang="en-US" noProof="0" smtClean="0"/>
               <a:pPr/>
-              <a:t>28</a:t>
+              <a:t>26</a:t>
             </a:fld>
             <a:endParaRPr lang="en-US" noProof="0" dirty="0"/>
           </a:p>
@@ -28488,7 +26468,7 @@
 </p:sld>
 </file>
 
-<file path=ppt/slides/slide29.xml><?xml version="1.0" encoding="utf-8"?>
+<file path=ppt/slides/slide27.xml><?xml version="1.0" encoding="utf-8"?>
 <p:sld xmlns:a="http://schemas.openxmlformats.org/drawingml/2006/main" xmlns:r="http://schemas.openxmlformats.org/officeDocument/2006/relationships" xmlns:p="http://schemas.openxmlformats.org/presentationml/2006/main">
   <p:cSld>
     <p:spTree>
@@ -29290,7 +27270,7 @@
             <a:fld id="{2BF067CD-8E6B-4360-9AA8-C5DF2A48A6D1}" type="slidenum">
               <a:rPr lang="en-US" noProof="0" smtClean="0"/>
               <a:pPr/>
-              <a:t>29</a:t>
+              <a:t>27</a:t>
             </a:fld>
             <a:endParaRPr lang="en-US" noProof="0" dirty="0"/>
           </a:p>
@@ -29525,6 +27505,376 @@
 </p:sld>
 </file>
 
+<file path=ppt/slides/slide28.xml><?xml version="1.0" encoding="utf-8"?>
+<p:sld xmlns:a="http://schemas.openxmlformats.org/drawingml/2006/main" xmlns:r="http://schemas.openxmlformats.org/officeDocument/2006/relationships" xmlns:p="http://schemas.openxmlformats.org/presentationml/2006/main">
+  <p:cSld>
+    <p:spTree>
+      <p:nvGrpSpPr>
+        <p:cNvPr id="1" name=""/>
+        <p:cNvGrpSpPr/>
+        <p:nvPr/>
+      </p:nvGrpSpPr>
+      <p:grpSpPr>
+        <a:xfrm>
+          <a:off x="0" y="0"/>
+          <a:ext cx="0" cy="0"/>
+          <a:chOff x="0" y="0"/>
+          <a:chExt cx="0" cy="0"/>
+        </a:xfrm>
+      </p:grpSpPr>
+      <p:sp>
+        <p:nvSpPr>
+          <p:cNvPr id="5" name="Slide Title">
+            <a:extLst>
+              <a:ext uri="{FF2B5EF4-FFF2-40B4-BE49-F238E27FC236}">
+                <a16:creationId xmlns:a16="http://schemas.microsoft.com/office/drawing/2014/main" id="{FA0703FC-0F8F-4C80-A615-E4B381EC0E0C}"/>
+              </a:ext>
+            </a:extLst>
+          </p:cNvPr>
+          <p:cNvSpPr>
+            <a:spLocks noGrp="1"/>
+          </p:cNvSpPr>
+          <p:nvPr>
+            <p:ph type="title"/>
+          </p:nvPr>
+        </p:nvSpPr>
+        <p:spPr/>
+        <p:txBody>
+          <a:bodyPr/>
+          <a:lstStyle/>
+          <a:p>
+            <a:r>
+              <a:rPr lang="bg-BG" sz="8800" dirty="0">
+                <a:solidFill>
+                  <a:srgbClr val="234465"/>
+                </a:solidFill>
+              </a:rPr>
+              <a:t>Въпроси</a:t>
+            </a:r>
+            <a:r>
+              <a:rPr lang="en-US" sz="8800" dirty="0">
+                <a:solidFill>
+                  <a:srgbClr val="234465"/>
+                </a:solidFill>
+              </a:rPr>
+              <a:t>?</a:t>
+            </a:r>
+            <a:endParaRPr lang="en-US" sz="8800" dirty="0"/>
+          </a:p>
+        </p:txBody>
+      </p:sp>
+    </p:spTree>
+    <p:extLst>
+      <p:ext uri="{BB962C8B-B14F-4D97-AF65-F5344CB8AC3E}">
+        <p14:creationId xmlns:p14="http://schemas.microsoft.com/office/powerpoint/2010/main" val="365802026"/>
+      </p:ext>
+    </p:extLst>
+  </p:cSld>
+  <p:clrMapOvr>
+    <a:masterClrMapping/>
+  </p:clrMapOvr>
+  <mc:AlternateContent xmlns:mc="http://schemas.openxmlformats.org/markup-compatibility/2006" xmlns:p14="http://schemas.microsoft.com/office/powerpoint/2010/main">
+    <mc:Choice Requires="p14">
+      <p:transition spd="slow" p14:dur="2000" advClick="0" advTm="5000"/>
+    </mc:Choice>
+    <mc:Fallback xmlns="">
+      <p:transition spd="slow" advClick="0" advTm="5000"/>
+    </mc:Fallback>
+  </mc:AlternateContent>
+</p:sld>
+</file>
+
+<file path=ppt/slides/slide29.xml><?xml version="1.0" encoding="utf-8"?>
+<p:sld xmlns:a="http://schemas.openxmlformats.org/drawingml/2006/main" xmlns:r="http://schemas.openxmlformats.org/officeDocument/2006/relationships" xmlns:p="http://schemas.openxmlformats.org/presentationml/2006/main">
+  <p:cSld>
+    <p:spTree>
+      <p:nvGrpSpPr>
+        <p:cNvPr id="1" name=""/>
+        <p:cNvGrpSpPr/>
+        <p:nvPr/>
+      </p:nvGrpSpPr>
+      <p:grpSpPr>
+        <a:xfrm>
+          <a:off x="0" y="0"/>
+          <a:ext cx="0" cy="0"/>
+          <a:chOff x="0" y="0"/>
+          <a:chExt cx="0" cy="0"/>
+        </a:xfrm>
+      </p:grpSpPr>
+      <p:sp>
+        <p:nvSpPr>
+          <p:cNvPr id="2" name="Slide Body">
+            <a:extLst>
+              <a:ext uri="{FF2B5EF4-FFF2-40B4-BE49-F238E27FC236}">
+                <a16:creationId xmlns:a16="http://schemas.microsoft.com/office/drawing/2014/main" id="{980F49B1-E4BE-4389-A747-7AB9B71AD920}"/>
+              </a:ext>
+            </a:extLst>
+          </p:cNvPr>
+          <p:cNvSpPr>
+            <a:spLocks noGrp="1"/>
+          </p:cNvSpPr>
+          <p:nvPr>
+            <p:ph type="body" sz="quarter" idx="10"/>
+          </p:nvPr>
+        </p:nvSpPr>
+        <p:spPr>
+          <a:xfrm>
+            <a:off x="190402" y="1269001"/>
+            <a:ext cx="11818096" cy="5455890"/>
+          </a:xfrm>
+        </p:spPr>
+        <p:txBody>
+          <a:bodyPr/>
+          <a:lstStyle/>
+          <a:p>
+            <a:pPr>
+              <a:lnSpc>
+                <a:spcPct val="120000"/>
+              </a:lnSpc>
+            </a:pPr>
+            <a:r>
+              <a:rPr lang="bg-BG" dirty="0"/>
+              <a:t>Този курс</a:t>
+            </a:r>
+            <a:r>
+              <a:rPr lang="en-US" dirty="0"/>
+              <a:t> (</a:t>
+            </a:r>
+            <a:r>
+              <a:rPr lang="bg-BG" dirty="0"/>
+              <a:t>презентации, примери, демонстрационен код, упражнения, домашни, видео и други активи</a:t>
+            </a:r>
+            <a:r>
+              <a:rPr lang="en-US" dirty="0"/>
+              <a:t>) </a:t>
+            </a:r>
+            <a:r>
+              <a:rPr lang="bg-BG" dirty="0"/>
+              <a:t>представлява</a:t>
+            </a:r>
+            <a:r>
+              <a:rPr lang="en-US" dirty="0"/>
+              <a:t> </a:t>
+            </a:r>
+            <a:r>
+              <a:rPr lang="bg-BG" b="1" dirty="0"/>
+              <a:t>защитено авторско съдържание</a:t>
+            </a:r>
+            <a:endParaRPr lang="en-US" dirty="0"/>
+          </a:p>
+          <a:p>
+            <a:pPr>
+              <a:lnSpc>
+                <a:spcPct val="120000"/>
+              </a:lnSpc>
+            </a:pPr>
+            <a:r>
+              <a:rPr lang="bg-BG" dirty="0"/>
+              <a:t>Нерегламентирано копиране</a:t>
+            </a:r>
+            <a:r>
+              <a:rPr lang="en-US" dirty="0"/>
+              <a:t>,</a:t>
+            </a:r>
+            <a:r>
+              <a:rPr lang="bg-BG" dirty="0"/>
+              <a:t> разпространение или използване е незаконно</a:t>
+            </a:r>
+          </a:p>
+          <a:p>
+            <a:pPr>
+              <a:lnSpc>
+                <a:spcPct val="120000"/>
+              </a:lnSpc>
+            </a:pPr>
+            <a:r>
+              <a:rPr lang="en-US" dirty="0"/>
+              <a:t>© </a:t>
+            </a:r>
+            <a:r>
+              <a:rPr lang="bg-BG" dirty="0"/>
+              <a:t>СофтУни</a:t>
+            </a:r>
+            <a:r>
+              <a:rPr lang="en-US" dirty="0"/>
+              <a:t> – </a:t>
+            </a:r>
+            <a:r>
+              <a:rPr lang="en-US" dirty="0">
+                <a:hlinkClick r:id="rId3"/>
+              </a:rPr>
+              <a:t>https://softuni.org</a:t>
+            </a:r>
+            <a:endParaRPr lang="en-US" dirty="0"/>
+          </a:p>
+          <a:p>
+            <a:pPr>
+              <a:lnSpc>
+                <a:spcPct val="120000"/>
+              </a:lnSpc>
+            </a:pPr>
+            <a:r>
+              <a:rPr lang="en-US" dirty="0"/>
+              <a:t>© </a:t>
+            </a:r>
+            <a:r>
+              <a:rPr lang="bg-BG" dirty="0"/>
+              <a:t>Софтуерен университет</a:t>
+            </a:r>
+            <a:r>
+              <a:rPr lang="en-US" dirty="0"/>
+              <a:t> – </a:t>
+            </a:r>
+            <a:r>
+              <a:rPr lang="en-US" dirty="0">
+                <a:hlinkClick r:id="rId4"/>
+              </a:rPr>
+              <a:t>https://softuni.bg</a:t>
+            </a:r>
+            <a:endParaRPr lang="bg-BG" dirty="0"/>
+          </a:p>
+          <a:p>
+            <a:pPr>
+              <a:lnSpc>
+                <a:spcPct val="120000"/>
+              </a:lnSpc>
+            </a:pPr>
+            <a:endParaRPr lang="bg-BG" dirty="0"/>
+          </a:p>
+        </p:txBody>
+      </p:sp>
+      <p:pic>
+        <p:nvPicPr>
+          <p:cNvPr id="6" name="Picture License" descr="License">
+            <a:extLst>
+              <a:ext uri="{FF2B5EF4-FFF2-40B4-BE49-F238E27FC236}">
+                <a16:creationId xmlns:a16="http://schemas.microsoft.com/office/drawing/2014/main" id="{82BA520F-A037-4E01-AA18-27D9F1E930A6}"/>
+              </a:ext>
+            </a:extLst>
+          </p:cNvPr>
+          <p:cNvPicPr>
+            <a:picLocks noChangeAspect="1"/>
+          </p:cNvPicPr>
+          <p:nvPr/>
+        </p:nvPicPr>
+        <p:blipFill>
+          <a:blip r:embed="rId5">
+            <a:clrChange>
+              <a:clrFrom>
+                <a:srgbClr val="FFFFFF"/>
+              </a:clrFrom>
+              <a:clrTo>
+                <a:srgbClr val="FFFFFF">
+                  <a:alpha val="0"/>
+                </a:srgbClr>
+              </a:clrTo>
+            </a:clrChange>
+          </a:blip>
+          <a:stretch>
+            <a:fillRect/>
+          </a:stretch>
+        </p:blipFill>
+        <p:spPr>
+          <a:xfrm>
+            <a:off x="9745023" y="4445455"/>
+            <a:ext cx="1930977" cy="2043545"/>
+          </a:xfrm>
+          <a:prstGeom prst="rect">
+            <a:avLst/>
+          </a:prstGeom>
+        </p:spPr>
+      </p:pic>
+      <p:sp>
+        <p:nvSpPr>
+          <p:cNvPr id="3" name="Slide Title">
+            <a:extLst>
+              <a:ext uri="{FF2B5EF4-FFF2-40B4-BE49-F238E27FC236}">
+                <a16:creationId xmlns:a16="http://schemas.microsoft.com/office/drawing/2014/main" id="{E5F1FB41-80C3-4816-BC47-CCC50632E6E8}"/>
+              </a:ext>
+            </a:extLst>
+          </p:cNvPr>
+          <p:cNvSpPr>
+            <a:spLocks noGrp="1"/>
+          </p:cNvSpPr>
+          <p:nvPr>
+            <p:ph type="title"/>
+          </p:nvPr>
+        </p:nvSpPr>
+        <p:spPr/>
+        <p:txBody>
+          <a:bodyPr/>
+          <a:lstStyle/>
+          <a:p>
+            <a:r>
+              <a:rPr lang="bg-BG" dirty="0"/>
+              <a:t>Лиценз</a:t>
+            </a:r>
+          </a:p>
+        </p:txBody>
+      </p:sp>
+      <p:sp>
+        <p:nvSpPr>
+          <p:cNvPr id="7" name="Slide Number">
+            <a:extLst>
+              <a:ext uri="{FF2B5EF4-FFF2-40B4-BE49-F238E27FC236}">
+                <a16:creationId xmlns:a16="http://schemas.microsoft.com/office/drawing/2014/main" id="{64A12DD2-2224-475B-B82C-4CCCB5DE2C9F}"/>
+              </a:ext>
+            </a:extLst>
+          </p:cNvPr>
+          <p:cNvSpPr>
+            <a:spLocks noGrp="1"/>
+          </p:cNvSpPr>
+          <p:nvPr>
+            <p:ph type="sldNum" sz="quarter" idx="5"/>
+          </p:nvPr>
+        </p:nvSpPr>
+        <p:spPr>
+          <a:xfrm>
+            <a:off x="11753030" y="6507000"/>
+            <a:ext cx="367414" cy="297000"/>
+          </a:xfrm>
+          <a:prstGeom prst="rect">
+            <a:avLst/>
+          </a:prstGeom>
+        </p:spPr>
+        <p:txBody>
+          <a:bodyPr vert="horz" lIns="91440" tIns="45720" rIns="91440" bIns="45720" rtlCol="0" anchor="b"/>
+          <a:lstStyle>
+            <a:lvl1pPr algn="r">
+              <a:defRPr sz="1000"/>
+            </a:lvl1pPr>
+          </a:lstStyle>
+          <a:p>
+            <a:fld id="{2BF067CD-8E6B-4360-9AA8-C5DF2A48A6D1}" type="slidenum">
+              <a:rPr lang="en-US" noProof="0" smtClean="0"/>
+              <a:pPr/>
+              <a:t>29</a:t>
+            </a:fld>
+            <a:endParaRPr lang="en-US" noProof="0" dirty="0"/>
+          </a:p>
+        </p:txBody>
+      </p:sp>
+    </p:spTree>
+    <p:extLst>
+      <p:ext uri="{BB962C8B-B14F-4D97-AF65-F5344CB8AC3E}">
+        <p14:creationId xmlns:p14="http://schemas.microsoft.com/office/powerpoint/2010/main" val="3646633285"/>
+      </p:ext>
+    </p:extLst>
+  </p:cSld>
+  <p:clrMapOvr>
+    <a:masterClrMapping/>
+  </p:clrMapOvr>
+  <mc:AlternateContent xmlns:mc="http://schemas.openxmlformats.org/markup-compatibility/2006" xmlns:p14="http://schemas.microsoft.com/office/powerpoint/2010/main">
+    <mc:Choice Requires="p14">
+      <p:transition spd="slow" p14:dur="2000" advClick="0" advTm="5000"/>
+    </mc:Choice>
+    <mc:Fallback xmlns="">
+      <p:transition spd="slow" advClick="0" advTm="5000"/>
+    </mc:Fallback>
+  </mc:AlternateContent>
+</p:sld>
+</file>
+
 <file path=ppt/slides/slide3.xml><?xml version="1.0" encoding="utf-8"?>
 <p:sld xmlns:a="http://schemas.openxmlformats.org/drawingml/2006/main" xmlns:r="http://schemas.openxmlformats.org/officeDocument/2006/relationships" xmlns:p="http://schemas.openxmlformats.org/presentationml/2006/main">
   <p:cSld>
@@ -29653,376 +28003,6 @@
       </p:grpSpPr>
       <p:sp>
         <p:nvSpPr>
-          <p:cNvPr id="5" name="Slide Title">
-            <a:extLst>
-              <a:ext uri="{FF2B5EF4-FFF2-40B4-BE49-F238E27FC236}">
-                <a16:creationId xmlns:a16="http://schemas.microsoft.com/office/drawing/2014/main" id="{FA0703FC-0F8F-4C80-A615-E4B381EC0E0C}"/>
-              </a:ext>
-            </a:extLst>
-          </p:cNvPr>
-          <p:cNvSpPr>
-            <a:spLocks noGrp="1"/>
-          </p:cNvSpPr>
-          <p:nvPr>
-            <p:ph type="title"/>
-          </p:nvPr>
-        </p:nvSpPr>
-        <p:spPr/>
-        <p:txBody>
-          <a:bodyPr/>
-          <a:lstStyle/>
-          <a:p>
-            <a:r>
-              <a:rPr lang="bg-BG" sz="8800" dirty="0">
-                <a:solidFill>
-                  <a:srgbClr val="234465"/>
-                </a:solidFill>
-              </a:rPr>
-              <a:t>Въпроси</a:t>
-            </a:r>
-            <a:r>
-              <a:rPr lang="en-US" sz="8800" dirty="0">
-                <a:solidFill>
-                  <a:srgbClr val="234465"/>
-                </a:solidFill>
-              </a:rPr>
-              <a:t>?</a:t>
-            </a:r>
-            <a:endParaRPr lang="en-US" sz="8800" dirty="0"/>
-          </a:p>
-        </p:txBody>
-      </p:sp>
-    </p:spTree>
-    <p:extLst>
-      <p:ext uri="{BB962C8B-B14F-4D97-AF65-F5344CB8AC3E}">
-        <p14:creationId xmlns:p14="http://schemas.microsoft.com/office/powerpoint/2010/main" val="365802026"/>
-      </p:ext>
-    </p:extLst>
-  </p:cSld>
-  <p:clrMapOvr>
-    <a:masterClrMapping/>
-  </p:clrMapOvr>
-  <mc:AlternateContent xmlns:mc="http://schemas.openxmlformats.org/markup-compatibility/2006" xmlns:p14="http://schemas.microsoft.com/office/powerpoint/2010/main">
-    <mc:Choice Requires="p14">
-      <p:transition spd="slow" p14:dur="2000" advClick="0" advTm="5000"/>
-    </mc:Choice>
-    <mc:Fallback xmlns="">
-      <p:transition spd="slow" advClick="0" advTm="5000"/>
-    </mc:Fallback>
-  </mc:AlternateContent>
-</p:sld>
-</file>
-
-<file path=ppt/slides/slide31.xml><?xml version="1.0" encoding="utf-8"?>
-<p:sld xmlns:a="http://schemas.openxmlformats.org/drawingml/2006/main" xmlns:r="http://schemas.openxmlformats.org/officeDocument/2006/relationships" xmlns:p="http://schemas.openxmlformats.org/presentationml/2006/main">
-  <p:cSld>
-    <p:spTree>
-      <p:nvGrpSpPr>
-        <p:cNvPr id="1" name=""/>
-        <p:cNvGrpSpPr/>
-        <p:nvPr/>
-      </p:nvGrpSpPr>
-      <p:grpSpPr>
-        <a:xfrm>
-          <a:off x="0" y="0"/>
-          <a:ext cx="0" cy="0"/>
-          <a:chOff x="0" y="0"/>
-          <a:chExt cx="0" cy="0"/>
-        </a:xfrm>
-      </p:grpSpPr>
-      <p:sp>
-        <p:nvSpPr>
-          <p:cNvPr id="2" name="Slide Body">
-            <a:extLst>
-              <a:ext uri="{FF2B5EF4-FFF2-40B4-BE49-F238E27FC236}">
-                <a16:creationId xmlns:a16="http://schemas.microsoft.com/office/drawing/2014/main" id="{980F49B1-E4BE-4389-A747-7AB9B71AD920}"/>
-              </a:ext>
-            </a:extLst>
-          </p:cNvPr>
-          <p:cNvSpPr>
-            <a:spLocks noGrp="1"/>
-          </p:cNvSpPr>
-          <p:nvPr>
-            <p:ph type="body" sz="quarter" idx="10"/>
-          </p:nvPr>
-        </p:nvSpPr>
-        <p:spPr>
-          <a:xfrm>
-            <a:off x="190402" y="1269001"/>
-            <a:ext cx="11818096" cy="5455890"/>
-          </a:xfrm>
-        </p:spPr>
-        <p:txBody>
-          <a:bodyPr/>
-          <a:lstStyle/>
-          <a:p>
-            <a:pPr>
-              <a:lnSpc>
-                <a:spcPct val="120000"/>
-              </a:lnSpc>
-            </a:pPr>
-            <a:r>
-              <a:rPr lang="bg-BG" dirty="0"/>
-              <a:t>Този курс</a:t>
-            </a:r>
-            <a:r>
-              <a:rPr lang="en-US" dirty="0"/>
-              <a:t> (</a:t>
-            </a:r>
-            <a:r>
-              <a:rPr lang="bg-BG" dirty="0"/>
-              <a:t>презентации, примери, демонстрационен код, упражнения, домашни, видео и други активи</a:t>
-            </a:r>
-            <a:r>
-              <a:rPr lang="en-US" dirty="0"/>
-              <a:t>) </a:t>
-            </a:r>
-            <a:r>
-              <a:rPr lang="bg-BG" dirty="0"/>
-              <a:t>представлява</a:t>
-            </a:r>
-            <a:r>
-              <a:rPr lang="en-US" dirty="0"/>
-              <a:t> </a:t>
-            </a:r>
-            <a:r>
-              <a:rPr lang="bg-BG" b="1" dirty="0"/>
-              <a:t>защитено авторско съдържание</a:t>
-            </a:r>
-            <a:endParaRPr lang="en-US" dirty="0"/>
-          </a:p>
-          <a:p>
-            <a:pPr>
-              <a:lnSpc>
-                <a:spcPct val="120000"/>
-              </a:lnSpc>
-            </a:pPr>
-            <a:r>
-              <a:rPr lang="bg-BG" dirty="0"/>
-              <a:t>Нерегламентирано копиране</a:t>
-            </a:r>
-            <a:r>
-              <a:rPr lang="en-US" dirty="0"/>
-              <a:t>,</a:t>
-            </a:r>
-            <a:r>
-              <a:rPr lang="bg-BG" dirty="0"/>
-              <a:t> разпространение или използване е незаконно</a:t>
-            </a:r>
-          </a:p>
-          <a:p>
-            <a:pPr>
-              <a:lnSpc>
-                <a:spcPct val="120000"/>
-              </a:lnSpc>
-            </a:pPr>
-            <a:r>
-              <a:rPr lang="en-US" dirty="0"/>
-              <a:t>© </a:t>
-            </a:r>
-            <a:r>
-              <a:rPr lang="bg-BG" dirty="0"/>
-              <a:t>СофтУни</a:t>
-            </a:r>
-            <a:r>
-              <a:rPr lang="en-US" dirty="0"/>
-              <a:t> – </a:t>
-            </a:r>
-            <a:r>
-              <a:rPr lang="en-US" dirty="0">
-                <a:hlinkClick r:id="rId3"/>
-              </a:rPr>
-              <a:t>https://softuni.org</a:t>
-            </a:r>
-            <a:endParaRPr lang="en-US" dirty="0"/>
-          </a:p>
-          <a:p>
-            <a:pPr>
-              <a:lnSpc>
-                <a:spcPct val="120000"/>
-              </a:lnSpc>
-            </a:pPr>
-            <a:r>
-              <a:rPr lang="en-US" dirty="0"/>
-              <a:t>© </a:t>
-            </a:r>
-            <a:r>
-              <a:rPr lang="bg-BG" dirty="0"/>
-              <a:t>Софтуерен университет</a:t>
-            </a:r>
-            <a:r>
-              <a:rPr lang="en-US" dirty="0"/>
-              <a:t> – </a:t>
-            </a:r>
-            <a:r>
-              <a:rPr lang="en-US" dirty="0">
-                <a:hlinkClick r:id="rId4"/>
-              </a:rPr>
-              <a:t>https://softuni.bg</a:t>
-            </a:r>
-            <a:endParaRPr lang="bg-BG" dirty="0"/>
-          </a:p>
-          <a:p>
-            <a:pPr>
-              <a:lnSpc>
-                <a:spcPct val="120000"/>
-              </a:lnSpc>
-            </a:pPr>
-            <a:endParaRPr lang="bg-BG" dirty="0"/>
-          </a:p>
-        </p:txBody>
-      </p:sp>
-      <p:pic>
-        <p:nvPicPr>
-          <p:cNvPr id="6" name="Picture License" descr="License">
-            <a:extLst>
-              <a:ext uri="{FF2B5EF4-FFF2-40B4-BE49-F238E27FC236}">
-                <a16:creationId xmlns:a16="http://schemas.microsoft.com/office/drawing/2014/main" id="{82BA520F-A037-4E01-AA18-27D9F1E930A6}"/>
-              </a:ext>
-            </a:extLst>
-          </p:cNvPr>
-          <p:cNvPicPr>
-            <a:picLocks noChangeAspect="1"/>
-          </p:cNvPicPr>
-          <p:nvPr/>
-        </p:nvPicPr>
-        <p:blipFill>
-          <a:blip r:embed="rId5">
-            <a:clrChange>
-              <a:clrFrom>
-                <a:srgbClr val="FFFFFF"/>
-              </a:clrFrom>
-              <a:clrTo>
-                <a:srgbClr val="FFFFFF">
-                  <a:alpha val="0"/>
-                </a:srgbClr>
-              </a:clrTo>
-            </a:clrChange>
-          </a:blip>
-          <a:stretch>
-            <a:fillRect/>
-          </a:stretch>
-        </p:blipFill>
-        <p:spPr>
-          <a:xfrm>
-            <a:off x="9745023" y="4445455"/>
-            <a:ext cx="1930977" cy="2043545"/>
-          </a:xfrm>
-          <a:prstGeom prst="rect">
-            <a:avLst/>
-          </a:prstGeom>
-        </p:spPr>
-      </p:pic>
-      <p:sp>
-        <p:nvSpPr>
-          <p:cNvPr id="3" name="Slide Title">
-            <a:extLst>
-              <a:ext uri="{FF2B5EF4-FFF2-40B4-BE49-F238E27FC236}">
-                <a16:creationId xmlns:a16="http://schemas.microsoft.com/office/drawing/2014/main" id="{E5F1FB41-80C3-4816-BC47-CCC50632E6E8}"/>
-              </a:ext>
-            </a:extLst>
-          </p:cNvPr>
-          <p:cNvSpPr>
-            <a:spLocks noGrp="1"/>
-          </p:cNvSpPr>
-          <p:nvPr>
-            <p:ph type="title"/>
-          </p:nvPr>
-        </p:nvSpPr>
-        <p:spPr/>
-        <p:txBody>
-          <a:bodyPr/>
-          <a:lstStyle/>
-          <a:p>
-            <a:r>
-              <a:rPr lang="bg-BG" dirty="0"/>
-              <a:t>Лиценз</a:t>
-            </a:r>
-          </a:p>
-        </p:txBody>
-      </p:sp>
-      <p:sp>
-        <p:nvSpPr>
-          <p:cNvPr id="7" name="Slide Number">
-            <a:extLst>
-              <a:ext uri="{FF2B5EF4-FFF2-40B4-BE49-F238E27FC236}">
-                <a16:creationId xmlns:a16="http://schemas.microsoft.com/office/drawing/2014/main" id="{64A12DD2-2224-475B-B82C-4CCCB5DE2C9F}"/>
-              </a:ext>
-            </a:extLst>
-          </p:cNvPr>
-          <p:cNvSpPr>
-            <a:spLocks noGrp="1"/>
-          </p:cNvSpPr>
-          <p:nvPr>
-            <p:ph type="sldNum" sz="quarter" idx="5"/>
-          </p:nvPr>
-        </p:nvSpPr>
-        <p:spPr>
-          <a:xfrm>
-            <a:off x="11753030" y="6507000"/>
-            <a:ext cx="367414" cy="297000"/>
-          </a:xfrm>
-          <a:prstGeom prst="rect">
-            <a:avLst/>
-          </a:prstGeom>
-        </p:spPr>
-        <p:txBody>
-          <a:bodyPr vert="horz" lIns="91440" tIns="45720" rIns="91440" bIns="45720" rtlCol="0" anchor="b"/>
-          <a:lstStyle>
-            <a:lvl1pPr algn="r">
-              <a:defRPr sz="1000"/>
-            </a:lvl1pPr>
-          </a:lstStyle>
-          <a:p>
-            <a:fld id="{2BF067CD-8E6B-4360-9AA8-C5DF2A48A6D1}" type="slidenum">
-              <a:rPr lang="en-US" noProof="0" smtClean="0"/>
-              <a:pPr/>
-              <a:t>31</a:t>
-            </a:fld>
-            <a:endParaRPr lang="en-US" noProof="0" dirty="0"/>
-          </a:p>
-        </p:txBody>
-      </p:sp>
-    </p:spTree>
-    <p:extLst>
-      <p:ext uri="{BB962C8B-B14F-4D97-AF65-F5344CB8AC3E}">
-        <p14:creationId xmlns:p14="http://schemas.microsoft.com/office/powerpoint/2010/main" val="3646633285"/>
-      </p:ext>
-    </p:extLst>
-  </p:cSld>
-  <p:clrMapOvr>
-    <a:masterClrMapping/>
-  </p:clrMapOvr>
-  <mc:AlternateContent xmlns:mc="http://schemas.openxmlformats.org/markup-compatibility/2006" xmlns:p14="http://schemas.microsoft.com/office/powerpoint/2010/main">
-    <mc:Choice Requires="p14">
-      <p:transition spd="slow" p14:dur="2000" advClick="0" advTm="5000"/>
-    </mc:Choice>
-    <mc:Fallback xmlns="">
-      <p:transition spd="slow" advClick="0" advTm="5000"/>
-    </mc:Fallback>
-  </mc:AlternateContent>
-</p:sld>
-</file>
-
-<file path=ppt/slides/slide32.xml><?xml version="1.0" encoding="utf-8"?>
-<p:sld xmlns:a="http://schemas.openxmlformats.org/drawingml/2006/main" xmlns:r="http://schemas.openxmlformats.org/officeDocument/2006/relationships" xmlns:p="http://schemas.openxmlformats.org/presentationml/2006/main">
-  <p:cSld>
-    <p:spTree>
-      <p:nvGrpSpPr>
-        <p:cNvPr id="1" name=""/>
-        <p:cNvGrpSpPr/>
-        <p:nvPr/>
-      </p:nvGrpSpPr>
-      <p:grpSpPr>
-        <a:xfrm>
-          <a:off x="0" y="0"/>
-          <a:ext cx="0" cy="0"/>
-          <a:chOff x="0" y="0"/>
-          <a:chExt cx="0" cy="0"/>
-        </a:xfrm>
-      </p:grpSpPr>
-      <p:sp>
-        <p:nvSpPr>
           <p:cNvPr id="4" name="Slide Body"/>
           <p:cNvSpPr>
             <a:spLocks noGrp="1"/>
@@ -30310,7 +28290,7 @@
             <a:fld id="{2BF067CD-8E6B-4360-9AA8-C5DF2A48A6D1}" type="slidenum">
               <a:rPr lang="en-US" smtClean="0"/>
               <a:pPr/>
-              <a:t>32</a:t>
+              <a:t>30</a:t>
             </a:fld>
             <a:endParaRPr lang="en-US" dirty="0"/>
           </a:p>
@@ -36036,15 +34016,9 @@
                 <a:solidFill>
                   <a:schemeClr val="bg1"/>
                 </a:solidFill>
-                <a:hlinkClick r:id="rId3">
-                  <a:extLst>
-                    <a:ext uri="{A12FA001-AC4F-418D-AE19-62706E023703}">
-                      <ahyp:hlinkClr xmlns:ahyp="http://schemas.microsoft.com/office/drawing/2018/hyperlinkcolor" val="tx"/>
-                    </a:ext>
-                  </a:extLst>
-                </a:hlinkClick>
+                <a:hlinkClick r:id="rId3"/>
               </a:rPr>
-              <a:t>https://judge.softuni.org/Contests/Practice/Index/3896#1</a:t>
+              <a:t>https://judge.softuni.org/Contests/Practice/Index/3896#0</a:t>
             </a:r>
             <a:endParaRPr lang="en-US" sz="1999" u="sng" dirty="0">
               <a:solidFill>

</xml_diff>